<commit_message>
log 10 stepwise glm updates
</commit_message>
<xml_diff>
--- a/pptx/glm_microplastics_water_v3.pptx
+++ b/pptx/glm_microplastics_water_v3.pptx
@@ -6,33 +6,34 @@
   </p:sldMasterIdLst>
   <p:sldIdLst>
     <p:sldId id="257" r:id="rId2"/>
-    <p:sldId id="269" r:id="rId3"/>
-    <p:sldId id="277" r:id="rId4"/>
-    <p:sldId id="258" r:id="rId5"/>
-    <p:sldId id="267" r:id="rId6"/>
-    <p:sldId id="278" r:id="rId7"/>
-    <p:sldId id="259" r:id="rId8"/>
-    <p:sldId id="268" r:id="rId9"/>
-    <p:sldId id="279" r:id="rId10"/>
-    <p:sldId id="260" r:id="rId11"/>
-    <p:sldId id="270" r:id="rId12"/>
-    <p:sldId id="280" r:id="rId13"/>
-    <p:sldId id="261" r:id="rId14"/>
-    <p:sldId id="271" r:id="rId15"/>
-    <p:sldId id="272" r:id="rId16"/>
-    <p:sldId id="281" r:id="rId17"/>
-    <p:sldId id="262" r:id="rId18"/>
-    <p:sldId id="273" r:id="rId19"/>
-    <p:sldId id="282" r:id="rId20"/>
-    <p:sldId id="263" r:id="rId21"/>
-    <p:sldId id="274" r:id="rId22"/>
-    <p:sldId id="283" r:id="rId23"/>
-    <p:sldId id="264" r:id="rId24"/>
-    <p:sldId id="275" r:id="rId25"/>
-    <p:sldId id="284" r:id="rId26"/>
-    <p:sldId id="265" r:id="rId27"/>
-    <p:sldId id="276" r:id="rId28"/>
-    <p:sldId id="266" r:id="rId29"/>
+    <p:sldId id="285" r:id="rId3"/>
+    <p:sldId id="269" r:id="rId4"/>
+    <p:sldId id="277" r:id="rId5"/>
+    <p:sldId id="286" r:id="rId6"/>
+    <p:sldId id="267" r:id="rId7"/>
+    <p:sldId id="278" r:id="rId8"/>
+    <p:sldId id="287" r:id="rId9"/>
+    <p:sldId id="268" r:id="rId10"/>
+    <p:sldId id="279" r:id="rId11"/>
+    <p:sldId id="288" r:id="rId12"/>
+    <p:sldId id="270" r:id="rId13"/>
+    <p:sldId id="280" r:id="rId14"/>
+    <p:sldId id="289" r:id="rId15"/>
+    <p:sldId id="271" r:id="rId16"/>
+    <p:sldId id="272" r:id="rId17"/>
+    <p:sldId id="281" r:id="rId18"/>
+    <p:sldId id="290" r:id="rId19"/>
+    <p:sldId id="273" r:id="rId20"/>
+    <p:sldId id="282" r:id="rId21"/>
+    <p:sldId id="291" r:id="rId22"/>
+    <p:sldId id="274" r:id="rId23"/>
+    <p:sldId id="283" r:id="rId24"/>
+    <p:sldId id="292" r:id="rId25"/>
+    <p:sldId id="275" r:id="rId26"/>
+    <p:sldId id="284" r:id="rId27"/>
+    <p:sldId id="293" r:id="rId28"/>
+    <p:sldId id="276" r:id="rId29"/>
+    <p:sldId id="266" r:id="rId30"/>
   </p:sldIdLst>
   <p:sldSz cx="12192000" cy="6858000"/>
   <p:notesSz cx="6858000" cy="9144000"/>
@@ -286,7 +287,7 @@
           <a:p>
             <a:fld id="{D8B46044-EB6B-44D7-A92E-D50D0E12EF7C}" type="datetimeFigureOut">
               <a:rPr lang="en-US" smtClean="0"/>
-              <a:t>5/30/2024</a:t>
+              <a:t>6/4/2024</a:t>
             </a:fld>
             <a:endParaRPr lang="en-US"/>
           </a:p>
@@ -484,7 +485,7 @@
           <a:p>
             <a:fld id="{D8B46044-EB6B-44D7-A92E-D50D0E12EF7C}" type="datetimeFigureOut">
               <a:rPr lang="en-US" smtClean="0"/>
-              <a:t>5/30/2024</a:t>
+              <a:t>6/4/2024</a:t>
             </a:fld>
             <a:endParaRPr lang="en-US"/>
           </a:p>
@@ -692,7 +693,7 @@
           <a:p>
             <a:fld id="{D8B46044-EB6B-44D7-A92E-D50D0E12EF7C}" type="datetimeFigureOut">
               <a:rPr lang="en-US" smtClean="0"/>
-              <a:t>5/30/2024</a:t>
+              <a:t>6/4/2024</a:t>
             </a:fld>
             <a:endParaRPr lang="en-US"/>
           </a:p>
@@ -890,7 +891,7 @@
           <a:p>
             <a:fld id="{D8B46044-EB6B-44D7-A92E-D50D0E12EF7C}" type="datetimeFigureOut">
               <a:rPr lang="en-US" smtClean="0"/>
-              <a:t>5/30/2024</a:t>
+              <a:t>6/4/2024</a:t>
             </a:fld>
             <a:endParaRPr lang="en-US"/>
           </a:p>
@@ -1165,7 +1166,7 @@
           <a:p>
             <a:fld id="{D8B46044-EB6B-44D7-A92E-D50D0E12EF7C}" type="datetimeFigureOut">
               <a:rPr lang="en-US" smtClean="0"/>
-              <a:t>5/30/2024</a:t>
+              <a:t>6/4/2024</a:t>
             </a:fld>
             <a:endParaRPr lang="en-US"/>
           </a:p>
@@ -1430,7 +1431,7 @@
           <a:p>
             <a:fld id="{D8B46044-EB6B-44D7-A92E-D50D0E12EF7C}" type="datetimeFigureOut">
               <a:rPr lang="en-US" smtClean="0"/>
-              <a:t>5/30/2024</a:t>
+              <a:t>6/4/2024</a:t>
             </a:fld>
             <a:endParaRPr lang="en-US"/>
           </a:p>
@@ -1842,7 +1843,7 @@
           <a:p>
             <a:fld id="{D8B46044-EB6B-44D7-A92E-D50D0E12EF7C}" type="datetimeFigureOut">
               <a:rPr lang="en-US" smtClean="0"/>
-              <a:t>5/30/2024</a:t>
+              <a:t>6/4/2024</a:t>
             </a:fld>
             <a:endParaRPr lang="en-US"/>
           </a:p>
@@ -1983,7 +1984,7 @@
           <a:p>
             <a:fld id="{D8B46044-EB6B-44D7-A92E-D50D0E12EF7C}" type="datetimeFigureOut">
               <a:rPr lang="en-US" smtClean="0"/>
-              <a:t>5/30/2024</a:t>
+              <a:t>6/4/2024</a:t>
             </a:fld>
             <a:endParaRPr lang="en-US"/>
           </a:p>
@@ -2096,7 +2097,7 @@
           <a:p>
             <a:fld id="{D8B46044-EB6B-44D7-A92E-D50D0E12EF7C}" type="datetimeFigureOut">
               <a:rPr lang="en-US" smtClean="0"/>
-              <a:t>5/30/2024</a:t>
+              <a:t>6/4/2024</a:t>
             </a:fld>
             <a:endParaRPr lang="en-US"/>
           </a:p>
@@ -2407,7 +2408,7 @@
           <a:p>
             <a:fld id="{D8B46044-EB6B-44D7-A92E-D50D0E12EF7C}" type="datetimeFigureOut">
               <a:rPr lang="en-US" smtClean="0"/>
-              <a:t>5/30/2024</a:t>
+              <a:t>6/4/2024</a:t>
             </a:fld>
             <a:endParaRPr lang="en-US"/>
           </a:p>
@@ -2695,7 +2696,7 @@
           <a:p>
             <a:fld id="{D8B46044-EB6B-44D7-A92E-D50D0E12EF7C}" type="datetimeFigureOut">
               <a:rPr lang="en-US" smtClean="0"/>
-              <a:t>5/30/2024</a:t>
+              <a:t>6/4/2024</a:t>
             </a:fld>
             <a:endParaRPr lang="en-US"/>
           </a:p>
@@ -2936,7 +2937,7 @@
           <a:p>
             <a:fld id="{D8B46044-EB6B-44D7-A92E-D50D0E12EF7C}" type="datetimeFigureOut">
               <a:rPr lang="en-US" smtClean="0"/>
-              <a:t>5/30/2024</a:t>
+              <a:t>6/4/2024</a:t>
             </a:fld>
             <a:endParaRPr lang="en-US"/>
           </a:p>
@@ -3369,7 +3370,12 @@
             <p:ph type="title"/>
           </p:nvPr>
         </p:nvSpPr>
-        <p:spPr/>
+        <p:spPr>
+          <a:xfrm>
+            <a:off x="838200" y="365126"/>
+            <a:ext cx="10515600" cy="703654"/>
+          </a:xfrm>
+        </p:spPr>
         <p:txBody>
           <a:bodyPr/>
           <a:lstStyle/>
@@ -3397,7 +3403,12 @@
             <p:ph idx="1"/>
           </p:nvPr>
         </p:nvSpPr>
-        <p:spPr/>
+        <p:spPr>
+          <a:xfrm>
+            <a:off x="624444" y="970602"/>
+            <a:ext cx="10515600" cy="4351338"/>
+          </a:xfrm>
+        </p:spPr>
         <p:txBody>
           <a:bodyPr>
             <a:normAutofit lnSpcReduction="10000"/>
@@ -3559,7 +3570,7 @@
           <p:cNvPr id="2" name="Title 1">
             <a:extLst>
               <a:ext uri="{FF2B5EF4-FFF2-40B4-BE49-F238E27FC236}">
-                <a16:creationId xmlns:a16="http://schemas.microsoft.com/office/drawing/2014/main" id="{3E4A6795-1948-05E4-E562-AFED99BDA8EB}"/>
+                <a16:creationId xmlns:a16="http://schemas.microsoft.com/office/drawing/2014/main" id="{9C84FB5B-3548-57AF-0BDE-3735ECDD4D50}"/>
               </a:ext>
             </a:extLst>
           </p:cNvPr>
@@ -3572,8 +3583,8 @@
         </p:nvSpPr>
         <p:spPr>
           <a:xfrm>
-            <a:off x="165093" y="365124"/>
-            <a:ext cx="2205574" cy="3063875"/>
+            <a:off x="1" y="0"/>
+            <a:ext cx="2000992" cy="1603513"/>
           </a:xfrm>
         </p:spPr>
         <p:txBody>
@@ -3583,59 +3594,18 @@
           <a:lstStyle/>
           <a:p>
             <a:r>
-              <a:rPr lang="en-US" sz="3200" dirty="0"/>
-              <a:t>Sul1 </a:t>
-            </a:r>
-            <a:r>
-              <a:rPr lang="en-US" sz="3200" dirty="0" err="1"/>
-              <a:t>mp</a:t>
-            </a:r>
-            <a:r>
-              <a:rPr lang="en-US" sz="3200" dirty="0"/>
-              <a:t> full </a:t>
-            </a:r>
-            <a:r>
-              <a:rPr lang="en-US" sz="3200" dirty="0" err="1"/>
-              <a:t>glm</a:t>
-            </a:r>
-            <a:br>
-              <a:rPr lang="en-US" sz="3200" dirty="0"/>
-            </a:br>
-            <a:r>
-              <a:rPr lang="en-US" sz="3200" dirty="0"/>
-              <a:t>-</a:t>
-            </a:r>
-            <a:r>
-              <a:rPr lang="en-US" sz="3200" dirty="0" err="1"/>
-              <a:t>ldpe</a:t>
-            </a:r>
-            <a:br>
-              <a:rPr lang="en-US" sz="3200" dirty="0"/>
-            </a:br>
-            <a:r>
-              <a:rPr lang="en-US" sz="3200" dirty="0"/>
-              <a:t>-</a:t>
-            </a:r>
-            <a:r>
-              <a:rPr lang="en-US" sz="3200" dirty="0" err="1"/>
-              <a:t>tww</a:t>
-            </a:r>
-            <a:br>
-              <a:rPr lang="en-US" sz="3200" dirty="0"/>
-            </a:br>
-            <a:r>
-              <a:rPr lang="en-US" sz="3200" dirty="0"/>
-              <a:t>-time quadratic</a:t>
+              <a:rPr lang="en-US" sz="2000" dirty="0"/>
+              <a:t>Sul1 data transformation</a:t>
             </a:r>
           </a:p>
         </p:txBody>
       </p:sp>
       <p:pic>
         <p:nvPicPr>
-          <p:cNvPr id="5" name="Picture 4">
-            <a:extLst>
-              <a:ext uri="{FF2B5EF4-FFF2-40B4-BE49-F238E27FC236}">
-                <a16:creationId xmlns:a16="http://schemas.microsoft.com/office/drawing/2014/main" id="{34A95C8F-3B63-CCF5-CED3-67E6F3D400DB}"/>
+          <p:cNvPr id="4" name="Picture 3">
+            <a:extLst>
+              <a:ext uri="{FF2B5EF4-FFF2-40B4-BE49-F238E27FC236}">
+                <a16:creationId xmlns:a16="http://schemas.microsoft.com/office/drawing/2014/main" id="{1275E309-7EDF-4E59-ABE6-E434D4F52E56}"/>
               </a:ext>
             </a:extLst>
           </p:cNvPr>
@@ -3652,8 +3622,8 @@
         </p:blipFill>
         <p:spPr>
           <a:xfrm>
-            <a:off x="2522898" y="269772"/>
-            <a:ext cx="9659258" cy="5868561"/>
+            <a:off x="2000993" y="356259"/>
+            <a:ext cx="9643214" cy="6270171"/>
           </a:xfrm>
           <a:prstGeom prst="rect">
             <a:avLst/>
@@ -3663,7 +3633,7 @@
     </p:spTree>
     <p:extLst>
       <p:ext uri="{BB962C8B-B14F-4D97-AF65-F5344CB8AC3E}">
-        <p14:creationId xmlns:p14="http://schemas.microsoft.com/office/powerpoint/2010/main" val="2800811628"/>
+        <p14:creationId xmlns:p14="http://schemas.microsoft.com/office/powerpoint/2010/main" val="3972327607"/>
       </p:ext>
     </p:extLst>
   </p:cSld>
@@ -3674,6 +3644,106 @@
 </file>
 
 <file path=ppt/slides/slide11.xml><?xml version="1.0" encoding="utf-8"?>
+<p:sld xmlns:a="http://schemas.openxmlformats.org/drawingml/2006/main" xmlns:r="http://schemas.openxmlformats.org/officeDocument/2006/relationships" xmlns:p="http://schemas.openxmlformats.org/presentationml/2006/main">
+  <p:cSld>
+    <p:spTree>
+      <p:nvGrpSpPr>
+        <p:cNvPr id="1" name=""/>
+        <p:cNvGrpSpPr/>
+        <p:nvPr/>
+      </p:nvGrpSpPr>
+      <p:grpSpPr>
+        <a:xfrm>
+          <a:off x="0" y="0"/>
+          <a:ext cx="0" cy="0"/>
+          <a:chOff x="0" y="0"/>
+          <a:chExt cx="0" cy="0"/>
+        </a:xfrm>
+      </p:grpSpPr>
+      <p:sp>
+        <p:nvSpPr>
+          <p:cNvPr id="2" name="Title 1">
+            <a:extLst>
+              <a:ext uri="{FF2B5EF4-FFF2-40B4-BE49-F238E27FC236}">
+                <a16:creationId xmlns:a16="http://schemas.microsoft.com/office/drawing/2014/main" id="{241613D6-757A-FFC0-7AAE-3A0B4FF4F583}"/>
+              </a:ext>
+            </a:extLst>
+          </p:cNvPr>
+          <p:cNvSpPr>
+            <a:spLocks noGrp="1"/>
+          </p:cNvSpPr>
+          <p:nvPr>
+            <p:ph type="title"/>
+          </p:nvPr>
+        </p:nvSpPr>
+        <p:spPr/>
+        <p:txBody>
+          <a:bodyPr/>
+          <a:lstStyle/>
+          <a:p>
+            <a:r>
+              <a:rPr lang="en-US" sz="4400" dirty="0"/>
+              <a:t>Sul1 </a:t>
+            </a:r>
+            <a:r>
+              <a:rPr lang="en-US" sz="4400" dirty="0" err="1"/>
+              <a:t>mp</a:t>
+            </a:r>
+            <a:r>
+              <a:rPr lang="en-US" sz="4400" dirty="0"/>
+              <a:t> </a:t>
+            </a:r>
+            <a:r>
+              <a:rPr lang="en-US" sz="4400" dirty="0" err="1"/>
+              <a:t>glm</a:t>
+            </a:r>
+            <a:r>
+              <a:rPr lang="en-US" sz="4400" dirty="0"/>
+              <a:t> full model</a:t>
+            </a:r>
+            <a:endParaRPr lang="en-US" dirty="0"/>
+          </a:p>
+        </p:txBody>
+      </p:sp>
+      <p:sp>
+        <p:nvSpPr>
+          <p:cNvPr id="3" name="Content Placeholder 2">
+            <a:extLst>
+              <a:ext uri="{FF2B5EF4-FFF2-40B4-BE49-F238E27FC236}">
+                <a16:creationId xmlns:a16="http://schemas.microsoft.com/office/drawing/2014/main" id="{B01146E6-0E81-928A-C44D-735B9D70879C}"/>
+              </a:ext>
+            </a:extLst>
+          </p:cNvPr>
+          <p:cNvSpPr>
+            <a:spLocks noGrp="1"/>
+          </p:cNvSpPr>
+          <p:nvPr>
+            <p:ph idx="1"/>
+          </p:nvPr>
+        </p:nvSpPr>
+        <p:spPr/>
+        <p:txBody>
+          <a:bodyPr/>
+          <a:lstStyle/>
+          <a:p>
+            <a:endParaRPr lang="en-US"/>
+          </a:p>
+        </p:txBody>
+      </p:sp>
+    </p:spTree>
+    <p:extLst>
+      <p:ext uri="{BB962C8B-B14F-4D97-AF65-F5344CB8AC3E}">
+        <p14:creationId xmlns:p14="http://schemas.microsoft.com/office/powerpoint/2010/main" val="392749499"/>
+      </p:ext>
+    </p:extLst>
+  </p:cSld>
+  <p:clrMapOvr>
+    <a:masterClrMapping/>
+  </p:clrMapOvr>
+</p:sld>
+</file>
+
+<file path=ppt/slides/slide12.xml><?xml version="1.0" encoding="utf-8"?>
 <p:sld xmlns:a="http://schemas.openxmlformats.org/drawingml/2006/main" xmlns:r="http://schemas.openxmlformats.org/officeDocument/2006/relationships" xmlns:p="http://schemas.openxmlformats.org/presentationml/2006/main">
   <p:cSld>
     <p:spTree>
@@ -3790,103 +3860,6 @@
 </p:sld>
 </file>
 
-<file path=ppt/slides/slide12.xml><?xml version="1.0" encoding="utf-8"?>
-<p:sld xmlns:a="http://schemas.openxmlformats.org/drawingml/2006/main" xmlns:r="http://schemas.openxmlformats.org/officeDocument/2006/relationships" xmlns:p="http://schemas.openxmlformats.org/presentationml/2006/main">
-  <p:cSld>
-    <p:spTree>
-      <p:nvGrpSpPr>
-        <p:cNvPr id="1" name=""/>
-        <p:cNvGrpSpPr/>
-        <p:nvPr/>
-      </p:nvGrpSpPr>
-      <p:grpSpPr>
-        <a:xfrm>
-          <a:off x="0" y="0"/>
-          <a:ext cx="0" cy="0"/>
-          <a:chOff x="0" y="0"/>
-          <a:chExt cx="0" cy="0"/>
-        </a:xfrm>
-      </p:grpSpPr>
-      <p:pic>
-        <p:nvPicPr>
-          <p:cNvPr id="5" name="Picture 4">
-            <a:extLst>
-              <a:ext uri="{FF2B5EF4-FFF2-40B4-BE49-F238E27FC236}">
-                <a16:creationId xmlns:a16="http://schemas.microsoft.com/office/drawing/2014/main" id="{C89A8D0F-4785-793E-5F59-940560DDD98D}"/>
-              </a:ext>
-            </a:extLst>
-          </p:cNvPr>
-          <p:cNvPicPr>
-            <a:picLocks noChangeAspect="1"/>
-          </p:cNvPicPr>
-          <p:nvPr/>
-        </p:nvPicPr>
-        <p:blipFill>
-          <a:blip r:embed="rId2"/>
-          <a:stretch>
-            <a:fillRect/>
-          </a:stretch>
-        </p:blipFill>
-        <p:spPr>
-          <a:xfrm>
-            <a:off x="3249768" y="1086678"/>
-            <a:ext cx="8472672" cy="5571747"/>
-          </a:xfrm>
-          <a:prstGeom prst="rect">
-            <a:avLst/>
-          </a:prstGeom>
-        </p:spPr>
-      </p:pic>
-      <p:sp>
-        <p:nvSpPr>
-          <p:cNvPr id="2" name="Title 1">
-            <a:extLst>
-              <a:ext uri="{FF2B5EF4-FFF2-40B4-BE49-F238E27FC236}">
-                <a16:creationId xmlns:a16="http://schemas.microsoft.com/office/drawing/2014/main" id="{9C84FB5B-3548-57AF-0BDE-3735ECDD4D50}"/>
-              </a:ext>
-            </a:extLst>
-          </p:cNvPr>
-          <p:cNvSpPr>
-            <a:spLocks noGrp="1"/>
-          </p:cNvSpPr>
-          <p:nvPr>
-            <p:ph type="title"/>
-          </p:nvPr>
-        </p:nvSpPr>
-        <p:spPr>
-          <a:xfrm>
-            <a:off x="0" y="0"/>
-            <a:ext cx="4664765" cy="1603513"/>
-          </a:xfrm>
-        </p:spPr>
-        <p:txBody>
-          <a:bodyPr/>
-          <a:lstStyle/>
-          <a:p>
-            <a:r>
-              <a:rPr lang="en-US" dirty="0" err="1"/>
-              <a:t>S_maltophilia</a:t>
-            </a:r>
-            <a:r>
-              <a:rPr lang="en-US" dirty="0"/>
-              <a:t> data transformation</a:t>
-            </a:r>
-          </a:p>
-        </p:txBody>
-      </p:sp>
-    </p:spTree>
-    <p:extLst>
-      <p:ext uri="{BB962C8B-B14F-4D97-AF65-F5344CB8AC3E}">
-        <p14:creationId xmlns:p14="http://schemas.microsoft.com/office/powerpoint/2010/main" val="2129978245"/>
-      </p:ext>
-    </p:extLst>
-  </p:cSld>
-  <p:clrMapOvr>
-    <a:masterClrMapping/>
-  </p:clrMapOvr>
-</p:sld>
-</file>
-
 <file path=ppt/slides/slide13.xml><?xml version="1.0" encoding="utf-8"?>
 <p:sld xmlns:a="http://schemas.openxmlformats.org/drawingml/2006/main" xmlns:r="http://schemas.openxmlformats.org/officeDocument/2006/relationships" xmlns:p="http://schemas.openxmlformats.org/presentationml/2006/main">
   <p:cSld>
@@ -3909,7 +3882,7 @@
           <p:cNvPr id="2" name="Title 1">
             <a:extLst>
               <a:ext uri="{FF2B5EF4-FFF2-40B4-BE49-F238E27FC236}">
-                <a16:creationId xmlns:a16="http://schemas.microsoft.com/office/drawing/2014/main" id="{3E4A6795-1948-05E4-E562-AFED99BDA8EB}"/>
+                <a16:creationId xmlns:a16="http://schemas.microsoft.com/office/drawing/2014/main" id="{9C84FB5B-3548-57AF-0BDE-3735ECDD4D50}"/>
               </a:ext>
             </a:extLst>
           </p:cNvPr>
@@ -3922,8 +3895,8 @@
         </p:nvSpPr>
         <p:spPr>
           <a:xfrm>
-            <a:off x="97360" y="847724"/>
-            <a:ext cx="2380029" cy="3063875"/>
+            <a:off x="1" y="0"/>
+            <a:ext cx="2101932" cy="1603513"/>
           </a:xfrm>
         </p:spPr>
         <p:txBody>
@@ -3933,37 +3906,18 @@
           <a:lstStyle/>
           <a:p>
             <a:r>
-              <a:rPr lang="en-US" sz="3200" dirty="0"/>
-              <a:t>P. aeruginosa </a:t>
-            </a:r>
-            <a:r>
-              <a:rPr lang="en-US" sz="3200" dirty="0" err="1"/>
-              <a:t>mp</a:t>
-            </a:r>
-            <a:r>
-              <a:rPr lang="en-US" sz="3200" dirty="0"/>
-              <a:t> full </a:t>
-            </a:r>
-            <a:r>
-              <a:rPr lang="en-US" sz="3200" dirty="0" err="1"/>
-              <a:t>glm</a:t>
-            </a:r>
-            <a:br>
-              <a:rPr lang="en-US" sz="3200" dirty="0"/>
-            </a:br>
-            <a:r>
-              <a:rPr lang="en-US" sz="3200" dirty="0"/>
-              <a:t>-time quadratic with p=0.1</a:t>
+              <a:rPr lang="en-US" sz="2000" dirty="0"/>
+              <a:t>P. a data transformation</a:t>
             </a:r>
           </a:p>
         </p:txBody>
       </p:sp>
       <p:pic>
         <p:nvPicPr>
-          <p:cNvPr id="5" name="Picture 4">
-            <a:extLst>
-              <a:ext uri="{FF2B5EF4-FFF2-40B4-BE49-F238E27FC236}">
-                <a16:creationId xmlns:a16="http://schemas.microsoft.com/office/drawing/2014/main" id="{9721CBB1-14D9-DF8C-F14D-DCD4F9809A35}"/>
+          <p:cNvPr id="4" name="Picture 3">
+            <a:extLst>
+              <a:ext uri="{FF2B5EF4-FFF2-40B4-BE49-F238E27FC236}">
+                <a16:creationId xmlns:a16="http://schemas.microsoft.com/office/drawing/2014/main" id="{73557CAA-A6DB-B13D-F106-BE59CFA5EE3F}"/>
               </a:ext>
             </a:extLst>
           </p:cNvPr>
@@ -3980,8 +3934,8 @@
         </p:blipFill>
         <p:spPr>
           <a:xfrm>
-            <a:off x="2545122" y="77159"/>
-            <a:ext cx="9728919" cy="5773308"/>
+            <a:off x="2321625" y="339587"/>
+            <a:ext cx="9269531" cy="6399660"/>
           </a:xfrm>
           <a:prstGeom prst="rect">
             <a:avLst/>
@@ -3991,7 +3945,7 @@
     </p:spTree>
     <p:extLst>
       <p:ext uri="{BB962C8B-B14F-4D97-AF65-F5344CB8AC3E}">
-        <p14:creationId xmlns:p14="http://schemas.microsoft.com/office/powerpoint/2010/main" val="1248416635"/>
+        <p14:creationId xmlns:p14="http://schemas.microsoft.com/office/powerpoint/2010/main" val="2129978245"/>
       </p:ext>
     </p:extLst>
   </p:cSld>
@@ -4002,6 +3956,106 @@
 </file>
 
 <file path=ppt/slides/slide14.xml><?xml version="1.0" encoding="utf-8"?>
+<p:sld xmlns:a="http://schemas.openxmlformats.org/drawingml/2006/main" xmlns:r="http://schemas.openxmlformats.org/officeDocument/2006/relationships" xmlns:p="http://schemas.openxmlformats.org/presentationml/2006/main">
+  <p:cSld>
+    <p:spTree>
+      <p:nvGrpSpPr>
+        <p:cNvPr id="1" name=""/>
+        <p:cNvGrpSpPr/>
+        <p:nvPr/>
+      </p:nvGrpSpPr>
+      <p:grpSpPr>
+        <a:xfrm>
+          <a:off x="0" y="0"/>
+          <a:ext cx="0" cy="0"/>
+          <a:chOff x="0" y="0"/>
+          <a:chExt cx="0" cy="0"/>
+        </a:xfrm>
+      </p:grpSpPr>
+      <p:sp>
+        <p:nvSpPr>
+          <p:cNvPr id="2" name="Title 1">
+            <a:extLst>
+              <a:ext uri="{FF2B5EF4-FFF2-40B4-BE49-F238E27FC236}">
+                <a16:creationId xmlns:a16="http://schemas.microsoft.com/office/drawing/2014/main" id="{D9091B9E-148B-DF17-9E71-14E2B40868AF}"/>
+              </a:ext>
+            </a:extLst>
+          </p:cNvPr>
+          <p:cNvSpPr>
+            <a:spLocks noGrp="1"/>
+          </p:cNvSpPr>
+          <p:nvPr>
+            <p:ph type="title"/>
+          </p:nvPr>
+        </p:nvSpPr>
+        <p:spPr/>
+        <p:txBody>
+          <a:bodyPr/>
+          <a:lstStyle/>
+          <a:p>
+            <a:r>
+              <a:rPr lang="en-US" sz="4400" dirty="0"/>
+              <a:t>P aeruginosa </a:t>
+            </a:r>
+            <a:r>
+              <a:rPr lang="en-US" sz="4400" dirty="0" err="1"/>
+              <a:t>mp</a:t>
+            </a:r>
+            <a:r>
+              <a:rPr lang="en-US" sz="4400" dirty="0"/>
+              <a:t> </a:t>
+            </a:r>
+            <a:r>
+              <a:rPr lang="en-US" sz="4400" dirty="0" err="1"/>
+              <a:t>glm</a:t>
+            </a:r>
+            <a:r>
+              <a:rPr lang="en-US" sz="4400" dirty="0"/>
+              <a:t> full model</a:t>
+            </a:r>
+            <a:endParaRPr lang="en-US" dirty="0"/>
+          </a:p>
+        </p:txBody>
+      </p:sp>
+      <p:sp>
+        <p:nvSpPr>
+          <p:cNvPr id="3" name="Content Placeholder 2">
+            <a:extLst>
+              <a:ext uri="{FF2B5EF4-FFF2-40B4-BE49-F238E27FC236}">
+                <a16:creationId xmlns:a16="http://schemas.microsoft.com/office/drawing/2014/main" id="{BF6AA952-A728-111F-1DCD-E3E1DE5DA24C}"/>
+              </a:ext>
+            </a:extLst>
+          </p:cNvPr>
+          <p:cNvSpPr>
+            <a:spLocks noGrp="1"/>
+          </p:cNvSpPr>
+          <p:nvPr>
+            <p:ph idx="1"/>
+          </p:nvPr>
+        </p:nvSpPr>
+        <p:spPr/>
+        <p:txBody>
+          <a:bodyPr/>
+          <a:lstStyle/>
+          <a:p>
+            <a:endParaRPr lang="en-US"/>
+          </a:p>
+        </p:txBody>
+      </p:sp>
+    </p:spTree>
+    <p:extLst>
+      <p:ext uri="{BB962C8B-B14F-4D97-AF65-F5344CB8AC3E}">
+        <p14:creationId xmlns:p14="http://schemas.microsoft.com/office/powerpoint/2010/main" val="1316122582"/>
+      </p:ext>
+    </p:extLst>
+  </p:cSld>
+  <p:clrMapOvr>
+    <a:masterClrMapping/>
+  </p:clrMapOvr>
+</p:sld>
+</file>
+
+<file path=ppt/slides/slide15.xml><?xml version="1.0" encoding="utf-8"?>
 <p:sld xmlns:a="http://schemas.openxmlformats.org/drawingml/2006/main" xmlns:r="http://schemas.openxmlformats.org/officeDocument/2006/relationships" xmlns:p="http://schemas.openxmlformats.org/presentationml/2006/main">
   <p:cSld>
     <p:spTree>
@@ -4111,7 +4165,7 @@
 </p:sld>
 </file>
 
-<file path=ppt/slides/slide15.xml><?xml version="1.0" encoding="utf-8"?>
+<file path=ppt/slides/slide16.xml><?xml version="1.0" encoding="utf-8"?>
 <p:sld xmlns:a="http://schemas.openxmlformats.org/drawingml/2006/main" xmlns:r="http://schemas.openxmlformats.org/officeDocument/2006/relationships" xmlns:p="http://schemas.openxmlformats.org/presentationml/2006/main">
   <p:cSld>
     <p:spTree>
@@ -4199,103 +4253,6 @@
 </p:sld>
 </file>
 
-<file path=ppt/slides/slide16.xml><?xml version="1.0" encoding="utf-8"?>
-<p:sld xmlns:a="http://schemas.openxmlformats.org/drawingml/2006/main" xmlns:r="http://schemas.openxmlformats.org/officeDocument/2006/relationships" xmlns:p="http://schemas.openxmlformats.org/presentationml/2006/main">
-  <p:cSld>
-    <p:spTree>
-      <p:nvGrpSpPr>
-        <p:cNvPr id="1" name=""/>
-        <p:cNvGrpSpPr/>
-        <p:nvPr/>
-      </p:nvGrpSpPr>
-      <p:grpSpPr>
-        <a:xfrm>
-          <a:off x="0" y="0"/>
-          <a:ext cx="0" cy="0"/>
-          <a:chOff x="0" y="0"/>
-          <a:chExt cx="0" cy="0"/>
-        </a:xfrm>
-      </p:grpSpPr>
-      <p:pic>
-        <p:nvPicPr>
-          <p:cNvPr id="5" name="Picture 4">
-            <a:extLst>
-              <a:ext uri="{FF2B5EF4-FFF2-40B4-BE49-F238E27FC236}">
-                <a16:creationId xmlns:a16="http://schemas.microsoft.com/office/drawing/2014/main" id="{C89A8D0F-4785-793E-5F59-940560DDD98D}"/>
-              </a:ext>
-            </a:extLst>
-          </p:cNvPr>
-          <p:cNvPicPr>
-            <a:picLocks noChangeAspect="1"/>
-          </p:cNvPicPr>
-          <p:nvPr/>
-        </p:nvPicPr>
-        <p:blipFill>
-          <a:blip r:embed="rId2"/>
-          <a:stretch>
-            <a:fillRect/>
-          </a:stretch>
-        </p:blipFill>
-        <p:spPr>
-          <a:xfrm>
-            <a:off x="3249768" y="1086678"/>
-            <a:ext cx="8472672" cy="5571747"/>
-          </a:xfrm>
-          <a:prstGeom prst="rect">
-            <a:avLst/>
-          </a:prstGeom>
-        </p:spPr>
-      </p:pic>
-      <p:sp>
-        <p:nvSpPr>
-          <p:cNvPr id="2" name="Title 1">
-            <a:extLst>
-              <a:ext uri="{FF2B5EF4-FFF2-40B4-BE49-F238E27FC236}">
-                <a16:creationId xmlns:a16="http://schemas.microsoft.com/office/drawing/2014/main" id="{9C84FB5B-3548-57AF-0BDE-3735ECDD4D50}"/>
-              </a:ext>
-            </a:extLst>
-          </p:cNvPr>
-          <p:cNvSpPr>
-            <a:spLocks noGrp="1"/>
-          </p:cNvSpPr>
-          <p:nvPr>
-            <p:ph type="title"/>
-          </p:nvPr>
-        </p:nvSpPr>
-        <p:spPr>
-          <a:xfrm>
-            <a:off x="0" y="0"/>
-            <a:ext cx="4664765" cy="1603513"/>
-          </a:xfrm>
-        </p:spPr>
-        <p:txBody>
-          <a:bodyPr/>
-          <a:lstStyle/>
-          <a:p>
-            <a:r>
-              <a:rPr lang="en-US" dirty="0" err="1"/>
-              <a:t>S_maltophilia</a:t>
-            </a:r>
-            <a:r>
-              <a:rPr lang="en-US" dirty="0"/>
-              <a:t> data transformation</a:t>
-            </a:r>
-          </a:p>
-        </p:txBody>
-      </p:sp>
-    </p:spTree>
-    <p:extLst>
-      <p:ext uri="{BB962C8B-B14F-4D97-AF65-F5344CB8AC3E}">
-        <p14:creationId xmlns:p14="http://schemas.microsoft.com/office/powerpoint/2010/main" val="2425370377"/>
-      </p:ext>
-    </p:extLst>
-  </p:cSld>
-  <p:clrMapOvr>
-    <a:masterClrMapping/>
-  </p:clrMapOvr>
-</p:sld>
-</file>
-
 <file path=ppt/slides/slide17.xml><?xml version="1.0" encoding="utf-8"?>
 <p:sld xmlns:a="http://schemas.openxmlformats.org/drawingml/2006/main" xmlns:r="http://schemas.openxmlformats.org/officeDocument/2006/relationships" xmlns:p="http://schemas.openxmlformats.org/presentationml/2006/main">
   <p:cSld>
@@ -4318,7 +4275,7 @@
           <p:cNvPr id="2" name="Title 1">
             <a:extLst>
               <a:ext uri="{FF2B5EF4-FFF2-40B4-BE49-F238E27FC236}">
-                <a16:creationId xmlns:a16="http://schemas.microsoft.com/office/drawing/2014/main" id="{3E4A6795-1948-05E4-E562-AFED99BDA8EB}"/>
+                <a16:creationId xmlns:a16="http://schemas.microsoft.com/office/drawing/2014/main" id="{9C84FB5B-3548-57AF-0BDE-3735ECDD4D50}"/>
               </a:ext>
             </a:extLst>
           </p:cNvPr>
@@ -4331,48 +4288,33 @@
         </p:nvSpPr>
         <p:spPr>
           <a:xfrm>
-            <a:off x="165093" y="365124"/>
-            <a:ext cx="2802278" cy="3063875"/>
+            <a:off x="47502" y="724395"/>
+            <a:ext cx="2286000" cy="1603513"/>
           </a:xfrm>
         </p:spPr>
         <p:txBody>
           <a:bodyPr>
-            <a:normAutofit fontScale="90000"/>
+            <a:normAutofit/>
           </a:bodyPr>
           <a:lstStyle/>
           <a:p>
             <a:r>
-              <a:rPr lang="en-US" sz="3200" dirty="0"/>
-              <a:t>S </a:t>
-            </a:r>
-            <a:r>
-              <a:rPr lang="en-US" sz="3200" dirty="0" err="1"/>
-              <a:t>maltophilia</a:t>
-            </a:r>
-            <a:r>
-              <a:rPr lang="en-US" sz="3200" dirty="0"/>
-              <a:t> water full </a:t>
-            </a:r>
-            <a:r>
-              <a:rPr lang="en-US" sz="3200" dirty="0" err="1"/>
-              <a:t>glm</a:t>
-            </a:r>
-            <a:br>
-              <a:rPr lang="en-US" sz="3200" dirty="0"/>
-            </a:br>
-            <a:r>
-              <a:rPr lang="en-US" sz="3200" dirty="0"/>
-              <a:t>--there does seem to be a linear/quadratic trend over time here</a:t>
+              <a:rPr lang="en-US" sz="2000" dirty="0" err="1"/>
+              <a:t>S_maltophilia</a:t>
+            </a:r>
+            <a:r>
+              <a:rPr lang="en-US" sz="2000" dirty="0"/>
+              <a:t> water data transformation</a:t>
             </a:r>
           </a:p>
         </p:txBody>
       </p:sp>
       <p:pic>
         <p:nvPicPr>
-          <p:cNvPr id="8" name="Picture 7">
-            <a:extLst>
-              <a:ext uri="{FF2B5EF4-FFF2-40B4-BE49-F238E27FC236}">
-                <a16:creationId xmlns:a16="http://schemas.microsoft.com/office/drawing/2014/main" id="{045CB1C0-171D-431C-03FE-681274DEDD20}"/>
+          <p:cNvPr id="4" name="Picture 3">
+            <a:extLst>
+              <a:ext uri="{FF2B5EF4-FFF2-40B4-BE49-F238E27FC236}">
+                <a16:creationId xmlns:a16="http://schemas.microsoft.com/office/drawing/2014/main" id="{A2CAC5CB-D55D-E92F-D3B1-C851A05BC35D}"/>
               </a:ext>
             </a:extLst>
           </p:cNvPr>
@@ -4389,8 +4331,8 @@
         </p:blipFill>
         <p:spPr>
           <a:xfrm>
-            <a:off x="3400282" y="628573"/>
-            <a:ext cx="8561318" cy="4569959"/>
+            <a:off x="2523505" y="550221"/>
+            <a:ext cx="9082879" cy="5757558"/>
           </a:xfrm>
           <a:prstGeom prst="rect">
             <a:avLst/>
@@ -4400,7 +4342,7 @@
     </p:spTree>
     <p:extLst>
       <p:ext uri="{BB962C8B-B14F-4D97-AF65-F5344CB8AC3E}">
-        <p14:creationId xmlns:p14="http://schemas.microsoft.com/office/powerpoint/2010/main" val="876230889"/>
+        <p14:creationId xmlns:p14="http://schemas.microsoft.com/office/powerpoint/2010/main" val="2425370377"/>
       </p:ext>
     </p:extLst>
   </p:cSld>
@@ -4411,6 +4353,106 @@
 </file>
 
 <file path=ppt/slides/slide18.xml><?xml version="1.0" encoding="utf-8"?>
+<p:sld xmlns:a="http://schemas.openxmlformats.org/drawingml/2006/main" xmlns:r="http://schemas.openxmlformats.org/officeDocument/2006/relationships" xmlns:p="http://schemas.openxmlformats.org/presentationml/2006/main">
+  <p:cSld>
+    <p:spTree>
+      <p:nvGrpSpPr>
+        <p:cNvPr id="1" name=""/>
+        <p:cNvGrpSpPr/>
+        <p:nvPr/>
+      </p:nvGrpSpPr>
+      <p:grpSpPr>
+        <a:xfrm>
+          <a:off x="0" y="0"/>
+          <a:ext cx="0" cy="0"/>
+          <a:chOff x="0" y="0"/>
+          <a:chExt cx="0" cy="0"/>
+        </a:xfrm>
+      </p:grpSpPr>
+      <p:sp>
+        <p:nvSpPr>
+          <p:cNvPr id="2" name="Title 1">
+            <a:extLst>
+              <a:ext uri="{FF2B5EF4-FFF2-40B4-BE49-F238E27FC236}">
+                <a16:creationId xmlns:a16="http://schemas.microsoft.com/office/drawing/2014/main" id="{F4011B0E-14DD-6CDF-55EC-F2789A1244BA}"/>
+              </a:ext>
+            </a:extLst>
+          </p:cNvPr>
+          <p:cNvSpPr>
+            <a:spLocks noGrp="1"/>
+          </p:cNvSpPr>
+          <p:nvPr>
+            <p:ph type="title"/>
+          </p:nvPr>
+        </p:nvSpPr>
+        <p:spPr/>
+        <p:txBody>
+          <a:bodyPr/>
+          <a:lstStyle/>
+          <a:p>
+            <a:r>
+              <a:rPr lang="en-US" sz="4400" dirty="0"/>
+              <a:t>S </a:t>
+            </a:r>
+            <a:r>
+              <a:rPr lang="en-US" sz="4400" dirty="0" err="1"/>
+              <a:t>maltophilia</a:t>
+            </a:r>
+            <a:r>
+              <a:rPr lang="en-US" sz="4400" dirty="0"/>
+              <a:t> water </a:t>
+            </a:r>
+            <a:r>
+              <a:rPr lang="en-US" sz="4400" dirty="0" err="1"/>
+              <a:t>glm</a:t>
+            </a:r>
+            <a:r>
+              <a:rPr lang="en-US" sz="4400" dirty="0"/>
+              <a:t> full model</a:t>
+            </a:r>
+            <a:endParaRPr lang="en-US" dirty="0"/>
+          </a:p>
+        </p:txBody>
+      </p:sp>
+      <p:sp>
+        <p:nvSpPr>
+          <p:cNvPr id="3" name="Content Placeholder 2">
+            <a:extLst>
+              <a:ext uri="{FF2B5EF4-FFF2-40B4-BE49-F238E27FC236}">
+                <a16:creationId xmlns:a16="http://schemas.microsoft.com/office/drawing/2014/main" id="{34567027-72FE-7172-E8D6-D7017A922255}"/>
+              </a:ext>
+            </a:extLst>
+          </p:cNvPr>
+          <p:cNvSpPr>
+            <a:spLocks noGrp="1"/>
+          </p:cNvSpPr>
+          <p:nvPr>
+            <p:ph idx="1"/>
+          </p:nvPr>
+        </p:nvSpPr>
+        <p:spPr/>
+        <p:txBody>
+          <a:bodyPr/>
+          <a:lstStyle/>
+          <a:p>
+            <a:endParaRPr lang="en-US"/>
+          </a:p>
+        </p:txBody>
+      </p:sp>
+    </p:spTree>
+    <p:extLst>
+      <p:ext uri="{BB962C8B-B14F-4D97-AF65-F5344CB8AC3E}">
+        <p14:creationId xmlns:p14="http://schemas.microsoft.com/office/powerpoint/2010/main" val="268798333"/>
+      </p:ext>
+    </p:extLst>
+  </p:cSld>
+  <p:clrMapOvr>
+    <a:masterClrMapping/>
+  </p:clrMapOvr>
+</p:sld>
+</file>
+
+<file path=ppt/slides/slide19.xml><?xml version="1.0" encoding="utf-8"?>
 <p:sld xmlns:a="http://schemas.openxmlformats.org/drawingml/2006/main" xmlns:r="http://schemas.openxmlformats.org/officeDocument/2006/relationships" xmlns:p="http://schemas.openxmlformats.org/presentationml/2006/main">
   <p:cSld>
     <p:spTree>
@@ -4524,7 +4566,7 @@
 </p:sld>
 </file>
 
-<file path=ppt/slides/slide19.xml><?xml version="1.0" encoding="utf-8"?>
+<file path=ppt/slides/slide2.xml><?xml version="1.0" encoding="utf-8"?>
 <p:sld xmlns:a="http://schemas.openxmlformats.org/drawingml/2006/main" xmlns:r="http://schemas.openxmlformats.org/officeDocument/2006/relationships" xmlns:p="http://schemas.openxmlformats.org/presentationml/2006/main">
   <p:cSld>
     <p:spTree>
@@ -4541,12 +4583,169 @@
           <a:chExt cx="0" cy="0"/>
         </a:xfrm>
       </p:grpSpPr>
+      <p:sp>
+        <p:nvSpPr>
+          <p:cNvPr id="2" name="Title 1">
+            <a:extLst>
+              <a:ext uri="{FF2B5EF4-FFF2-40B4-BE49-F238E27FC236}">
+                <a16:creationId xmlns:a16="http://schemas.microsoft.com/office/drawing/2014/main" id="{46A4E85D-C949-9DF3-AC75-AADA1783A0D4}"/>
+              </a:ext>
+            </a:extLst>
+          </p:cNvPr>
+          <p:cNvSpPr>
+            <a:spLocks noGrp="1"/>
+          </p:cNvSpPr>
+          <p:nvPr>
+            <p:ph type="title"/>
+          </p:nvPr>
+        </p:nvSpPr>
+        <p:spPr/>
+        <p:txBody>
+          <a:bodyPr/>
+          <a:lstStyle/>
+          <a:p>
+            <a:r>
+              <a:rPr lang="en-US" dirty="0"/>
+              <a:t>Results</a:t>
+            </a:r>
+          </a:p>
+        </p:txBody>
+      </p:sp>
+      <p:sp>
+        <p:nvSpPr>
+          <p:cNvPr id="3" name="Content Placeholder 2">
+            <a:extLst>
+              <a:ext uri="{FF2B5EF4-FFF2-40B4-BE49-F238E27FC236}">
+                <a16:creationId xmlns:a16="http://schemas.microsoft.com/office/drawing/2014/main" id="{68DDCE00-23AC-3CD9-B823-B37837201982}"/>
+              </a:ext>
+            </a:extLst>
+          </p:cNvPr>
+          <p:cNvSpPr>
+            <a:spLocks noGrp="1"/>
+          </p:cNvSpPr>
+          <p:nvPr>
+            <p:ph idx="1"/>
+          </p:nvPr>
+        </p:nvSpPr>
+        <p:spPr/>
+        <p:txBody>
+          <a:bodyPr/>
+          <a:lstStyle/>
+          <a:p>
+            <a:r>
+              <a:rPr lang="en-US" dirty="0"/>
+              <a:t>For visual inspection, there are plots (histograms, boxplots by week, and </a:t>
+            </a:r>
+            <a:r>
+              <a:rPr lang="en-US" dirty="0" err="1"/>
+              <a:t>qqplots</a:t>
+            </a:r>
+            <a:r>
+              <a:rPr lang="en-US" dirty="0"/>
+              <a:t>) of the untransformed data, box cox with optimal lambda, natural log, and log10.</a:t>
+            </a:r>
+          </a:p>
+          <a:p>
+            <a:r>
+              <a:rPr lang="en-US" dirty="0"/>
+              <a:t>MM said that log10 was most typically used so I stuck with that, the other transformations did not help much.</a:t>
+            </a:r>
+          </a:p>
+          <a:p>
+            <a:r>
+              <a:rPr lang="en-US" dirty="0"/>
+              <a:t>To make the </a:t>
+            </a:r>
+            <a:r>
+              <a:rPr lang="en-US" dirty="0" err="1"/>
+              <a:t>glm</a:t>
+            </a:r>
+            <a:r>
+              <a:rPr lang="en-US" dirty="0"/>
+              <a:t> output easier to process, I present only the log10 results, full results in 1 slide and then the stepwise </a:t>
+            </a:r>
+            <a:r>
+              <a:rPr lang="en-US" dirty="0" err="1"/>
+              <a:t>glm</a:t>
+            </a:r>
+            <a:r>
+              <a:rPr lang="en-US" dirty="0"/>
+              <a:t> in the next slide.</a:t>
+            </a:r>
+          </a:p>
+        </p:txBody>
+      </p:sp>
+    </p:spTree>
+    <p:extLst>
+      <p:ext uri="{BB962C8B-B14F-4D97-AF65-F5344CB8AC3E}">
+        <p14:creationId xmlns:p14="http://schemas.microsoft.com/office/powerpoint/2010/main" val="3203744160"/>
+      </p:ext>
+    </p:extLst>
+  </p:cSld>
+  <p:clrMapOvr>
+    <a:masterClrMapping/>
+  </p:clrMapOvr>
+</p:sld>
+</file>
+
+<file path=ppt/slides/slide20.xml><?xml version="1.0" encoding="utf-8"?>
+<p:sld xmlns:a="http://schemas.openxmlformats.org/drawingml/2006/main" xmlns:r="http://schemas.openxmlformats.org/officeDocument/2006/relationships" xmlns:p="http://schemas.openxmlformats.org/presentationml/2006/main">
+  <p:cSld>
+    <p:spTree>
+      <p:nvGrpSpPr>
+        <p:cNvPr id="1" name=""/>
+        <p:cNvGrpSpPr/>
+        <p:nvPr/>
+      </p:nvGrpSpPr>
+      <p:grpSpPr>
+        <a:xfrm>
+          <a:off x="0" y="0"/>
+          <a:ext cx="0" cy="0"/>
+          <a:chOff x="0" y="0"/>
+          <a:chExt cx="0" cy="0"/>
+        </a:xfrm>
+      </p:grpSpPr>
+      <p:sp>
+        <p:nvSpPr>
+          <p:cNvPr id="2" name="Title 1">
+            <a:extLst>
+              <a:ext uri="{FF2B5EF4-FFF2-40B4-BE49-F238E27FC236}">
+                <a16:creationId xmlns:a16="http://schemas.microsoft.com/office/drawing/2014/main" id="{9C84FB5B-3548-57AF-0BDE-3735ECDD4D50}"/>
+              </a:ext>
+            </a:extLst>
+          </p:cNvPr>
+          <p:cNvSpPr>
+            <a:spLocks noGrp="1"/>
+          </p:cNvSpPr>
+          <p:nvPr>
+            <p:ph type="title"/>
+          </p:nvPr>
+        </p:nvSpPr>
+        <p:spPr>
+          <a:xfrm>
+            <a:off x="0" y="397824"/>
+            <a:ext cx="2565070" cy="1603513"/>
+          </a:xfrm>
+        </p:spPr>
+        <p:txBody>
+          <a:bodyPr>
+            <a:normAutofit/>
+          </a:bodyPr>
+          <a:lstStyle/>
+          <a:p>
+            <a:r>
+              <a:rPr lang="en-US" sz="2000" dirty="0"/>
+              <a:t>intI1 water data transformation</a:t>
+            </a:r>
+          </a:p>
+        </p:txBody>
+      </p:sp>
       <p:pic>
         <p:nvPicPr>
-          <p:cNvPr id="5" name="Picture 4">
-            <a:extLst>
-              <a:ext uri="{FF2B5EF4-FFF2-40B4-BE49-F238E27FC236}">
-                <a16:creationId xmlns:a16="http://schemas.microsoft.com/office/drawing/2014/main" id="{C89A8D0F-4785-793E-5F59-940560DDD98D}"/>
+          <p:cNvPr id="4" name="Picture 3">
+            <a:extLst>
+              <a:ext uri="{FF2B5EF4-FFF2-40B4-BE49-F238E27FC236}">
+                <a16:creationId xmlns:a16="http://schemas.microsoft.com/office/drawing/2014/main" id="{BD1B074E-537B-9AE6-459C-9696D5C8829C}"/>
               </a:ext>
             </a:extLst>
           </p:cNvPr>
@@ -4563,51 +4762,14 @@
         </p:blipFill>
         <p:spPr>
           <a:xfrm>
-            <a:off x="3249768" y="1086678"/>
-            <a:ext cx="8472672" cy="5571747"/>
+            <a:off x="2042556" y="198207"/>
+            <a:ext cx="9636216" cy="6461586"/>
           </a:xfrm>
           <a:prstGeom prst="rect">
             <a:avLst/>
           </a:prstGeom>
         </p:spPr>
       </p:pic>
-      <p:sp>
-        <p:nvSpPr>
-          <p:cNvPr id="2" name="Title 1">
-            <a:extLst>
-              <a:ext uri="{FF2B5EF4-FFF2-40B4-BE49-F238E27FC236}">
-                <a16:creationId xmlns:a16="http://schemas.microsoft.com/office/drawing/2014/main" id="{9C84FB5B-3548-57AF-0BDE-3735ECDD4D50}"/>
-              </a:ext>
-            </a:extLst>
-          </p:cNvPr>
-          <p:cNvSpPr>
-            <a:spLocks noGrp="1"/>
-          </p:cNvSpPr>
-          <p:nvPr>
-            <p:ph type="title"/>
-          </p:nvPr>
-        </p:nvSpPr>
-        <p:spPr>
-          <a:xfrm>
-            <a:off x="0" y="0"/>
-            <a:ext cx="4664765" cy="1603513"/>
-          </a:xfrm>
-        </p:spPr>
-        <p:txBody>
-          <a:bodyPr/>
-          <a:lstStyle/>
-          <a:p>
-            <a:r>
-              <a:rPr lang="en-US" dirty="0" err="1"/>
-              <a:t>S_maltophilia</a:t>
-            </a:r>
-            <a:r>
-              <a:rPr lang="en-US" dirty="0"/>
-              <a:t> data transformation</a:t>
-            </a:r>
-          </a:p>
-        </p:txBody>
-      </p:sp>
     </p:spTree>
     <p:extLst>
       <p:ext uri="{BB962C8B-B14F-4D97-AF65-F5344CB8AC3E}">
@@ -4621,7 +4783,945 @@
 </p:sld>
 </file>
 
-<file path=ppt/slides/slide2.xml><?xml version="1.0" encoding="utf-8"?>
+<file path=ppt/slides/slide21.xml><?xml version="1.0" encoding="utf-8"?>
+<p:sld xmlns:a="http://schemas.openxmlformats.org/drawingml/2006/main" xmlns:r="http://schemas.openxmlformats.org/officeDocument/2006/relationships" xmlns:p="http://schemas.openxmlformats.org/presentationml/2006/main">
+  <p:cSld>
+    <p:spTree>
+      <p:nvGrpSpPr>
+        <p:cNvPr id="1" name=""/>
+        <p:cNvGrpSpPr/>
+        <p:nvPr/>
+      </p:nvGrpSpPr>
+      <p:grpSpPr>
+        <a:xfrm>
+          <a:off x="0" y="0"/>
+          <a:ext cx="0" cy="0"/>
+          <a:chOff x="0" y="0"/>
+          <a:chExt cx="0" cy="0"/>
+        </a:xfrm>
+      </p:grpSpPr>
+      <p:sp>
+        <p:nvSpPr>
+          <p:cNvPr id="2" name="Title 1">
+            <a:extLst>
+              <a:ext uri="{FF2B5EF4-FFF2-40B4-BE49-F238E27FC236}">
+                <a16:creationId xmlns:a16="http://schemas.microsoft.com/office/drawing/2014/main" id="{880B0B2B-72A5-EC94-B34F-BDAD21F5B01F}"/>
+              </a:ext>
+            </a:extLst>
+          </p:cNvPr>
+          <p:cNvSpPr>
+            <a:spLocks noGrp="1"/>
+          </p:cNvSpPr>
+          <p:nvPr>
+            <p:ph type="title"/>
+          </p:nvPr>
+        </p:nvSpPr>
+        <p:spPr/>
+        <p:txBody>
+          <a:bodyPr/>
+          <a:lstStyle/>
+          <a:p>
+            <a:r>
+              <a:rPr lang="en-US" sz="4400" dirty="0"/>
+              <a:t>Int1 water </a:t>
+            </a:r>
+            <a:r>
+              <a:rPr lang="en-US" sz="4400" dirty="0" err="1"/>
+              <a:t>glm</a:t>
+            </a:r>
+            <a:r>
+              <a:rPr lang="en-US" sz="4400" dirty="0"/>
+              <a:t> full model</a:t>
+            </a:r>
+            <a:endParaRPr lang="en-US" dirty="0"/>
+          </a:p>
+        </p:txBody>
+      </p:sp>
+      <p:sp>
+        <p:nvSpPr>
+          <p:cNvPr id="3" name="Content Placeholder 2">
+            <a:extLst>
+              <a:ext uri="{FF2B5EF4-FFF2-40B4-BE49-F238E27FC236}">
+                <a16:creationId xmlns:a16="http://schemas.microsoft.com/office/drawing/2014/main" id="{BF51367C-F9A7-4B70-B70A-69C0301C5A21}"/>
+              </a:ext>
+            </a:extLst>
+          </p:cNvPr>
+          <p:cNvSpPr>
+            <a:spLocks noGrp="1"/>
+          </p:cNvSpPr>
+          <p:nvPr>
+            <p:ph idx="1"/>
+          </p:nvPr>
+        </p:nvSpPr>
+        <p:spPr/>
+        <p:txBody>
+          <a:bodyPr/>
+          <a:lstStyle/>
+          <a:p>
+            <a:endParaRPr lang="en-US"/>
+          </a:p>
+        </p:txBody>
+      </p:sp>
+    </p:spTree>
+    <p:extLst>
+      <p:ext uri="{BB962C8B-B14F-4D97-AF65-F5344CB8AC3E}">
+        <p14:creationId xmlns:p14="http://schemas.microsoft.com/office/powerpoint/2010/main" val="1618539872"/>
+      </p:ext>
+    </p:extLst>
+  </p:cSld>
+  <p:clrMapOvr>
+    <a:masterClrMapping/>
+  </p:clrMapOvr>
+</p:sld>
+</file>
+
+<file path=ppt/slides/slide22.xml><?xml version="1.0" encoding="utf-8"?>
+<p:sld xmlns:a="http://schemas.openxmlformats.org/drawingml/2006/main" xmlns:r="http://schemas.openxmlformats.org/officeDocument/2006/relationships" xmlns:p="http://schemas.openxmlformats.org/presentationml/2006/main">
+  <p:cSld>
+    <p:spTree>
+      <p:nvGrpSpPr>
+        <p:cNvPr id="1" name=""/>
+        <p:cNvGrpSpPr/>
+        <p:nvPr/>
+      </p:nvGrpSpPr>
+      <p:grpSpPr>
+        <a:xfrm>
+          <a:off x="0" y="0"/>
+          <a:ext cx="0" cy="0"/>
+          <a:chOff x="0" y="0"/>
+          <a:chExt cx="0" cy="0"/>
+        </a:xfrm>
+      </p:grpSpPr>
+      <p:sp>
+        <p:nvSpPr>
+          <p:cNvPr id="2" name="Title 1">
+            <a:extLst>
+              <a:ext uri="{FF2B5EF4-FFF2-40B4-BE49-F238E27FC236}">
+                <a16:creationId xmlns:a16="http://schemas.microsoft.com/office/drawing/2014/main" id="{3E4A6795-1948-05E4-E562-AFED99BDA8EB}"/>
+              </a:ext>
+            </a:extLst>
+          </p:cNvPr>
+          <p:cNvSpPr>
+            <a:spLocks noGrp="1"/>
+          </p:cNvSpPr>
+          <p:nvPr>
+            <p:ph type="title"/>
+          </p:nvPr>
+        </p:nvSpPr>
+        <p:spPr>
+          <a:xfrm>
+            <a:off x="165093" y="365124"/>
+            <a:ext cx="2802278" cy="3063875"/>
+          </a:xfrm>
+        </p:spPr>
+        <p:txBody>
+          <a:bodyPr>
+            <a:normAutofit fontScale="90000"/>
+          </a:bodyPr>
+          <a:lstStyle/>
+          <a:p>
+            <a:r>
+              <a:rPr lang="en-US" sz="3200" dirty="0"/>
+              <a:t>Int1 water step</a:t>
+            </a:r>
+            <a:br>
+              <a:rPr lang="en-US" sz="3200" dirty="0"/>
+            </a:br>
+            <a:r>
+              <a:rPr lang="en-US" sz="3200" dirty="0"/>
+              <a:t>--linear time trend and TWW difference remain in step model (as expected here)</a:t>
+            </a:r>
+          </a:p>
+        </p:txBody>
+      </p:sp>
+      <p:pic>
+        <p:nvPicPr>
+          <p:cNvPr id="4" name="Picture 3">
+            <a:extLst>
+              <a:ext uri="{FF2B5EF4-FFF2-40B4-BE49-F238E27FC236}">
+                <a16:creationId xmlns:a16="http://schemas.microsoft.com/office/drawing/2014/main" id="{008CCC78-2D60-36A1-1E80-03F85298B888}"/>
+              </a:ext>
+            </a:extLst>
+          </p:cNvPr>
+          <p:cNvPicPr>
+            <a:picLocks noChangeAspect="1"/>
+          </p:cNvPicPr>
+          <p:nvPr/>
+        </p:nvPicPr>
+        <p:blipFill>
+          <a:blip r:embed="rId2"/>
+          <a:stretch>
+            <a:fillRect/>
+          </a:stretch>
+        </p:blipFill>
+        <p:spPr>
+          <a:xfrm>
+            <a:off x="3387585" y="902683"/>
+            <a:ext cx="7864813" cy="4287384"/>
+          </a:xfrm>
+          <a:prstGeom prst="rect">
+            <a:avLst/>
+          </a:prstGeom>
+        </p:spPr>
+      </p:pic>
+    </p:spTree>
+    <p:extLst>
+      <p:ext uri="{BB962C8B-B14F-4D97-AF65-F5344CB8AC3E}">
+        <p14:creationId xmlns:p14="http://schemas.microsoft.com/office/powerpoint/2010/main" val="58590973"/>
+      </p:ext>
+    </p:extLst>
+  </p:cSld>
+  <p:clrMapOvr>
+    <a:masterClrMapping/>
+  </p:clrMapOvr>
+</p:sld>
+</file>
+
+<file path=ppt/slides/slide23.xml><?xml version="1.0" encoding="utf-8"?>
+<p:sld xmlns:a="http://schemas.openxmlformats.org/drawingml/2006/main" xmlns:r="http://schemas.openxmlformats.org/officeDocument/2006/relationships" xmlns:p="http://schemas.openxmlformats.org/presentationml/2006/main">
+  <p:cSld>
+    <p:spTree>
+      <p:nvGrpSpPr>
+        <p:cNvPr id="1" name=""/>
+        <p:cNvGrpSpPr/>
+        <p:nvPr/>
+      </p:nvGrpSpPr>
+      <p:grpSpPr>
+        <a:xfrm>
+          <a:off x="0" y="0"/>
+          <a:ext cx="0" cy="0"/>
+          <a:chOff x="0" y="0"/>
+          <a:chExt cx="0" cy="0"/>
+        </a:xfrm>
+      </p:grpSpPr>
+      <p:sp>
+        <p:nvSpPr>
+          <p:cNvPr id="2" name="Title 1">
+            <a:extLst>
+              <a:ext uri="{FF2B5EF4-FFF2-40B4-BE49-F238E27FC236}">
+                <a16:creationId xmlns:a16="http://schemas.microsoft.com/office/drawing/2014/main" id="{9C84FB5B-3548-57AF-0BDE-3735ECDD4D50}"/>
+              </a:ext>
+            </a:extLst>
+          </p:cNvPr>
+          <p:cNvSpPr>
+            <a:spLocks noGrp="1"/>
+          </p:cNvSpPr>
+          <p:nvPr>
+            <p:ph type="title"/>
+          </p:nvPr>
+        </p:nvSpPr>
+        <p:spPr>
+          <a:xfrm>
+            <a:off x="0" y="0"/>
+            <a:ext cx="2452255" cy="1603513"/>
+          </a:xfrm>
+        </p:spPr>
+        <p:txBody>
+          <a:bodyPr>
+            <a:normAutofit/>
+          </a:bodyPr>
+          <a:lstStyle/>
+          <a:p>
+            <a:r>
+              <a:rPr lang="en-US" sz="2000" dirty="0"/>
+              <a:t>sul1 data transformation</a:t>
+            </a:r>
+          </a:p>
+        </p:txBody>
+      </p:sp>
+      <p:pic>
+        <p:nvPicPr>
+          <p:cNvPr id="4" name="Picture 3">
+            <a:extLst>
+              <a:ext uri="{FF2B5EF4-FFF2-40B4-BE49-F238E27FC236}">
+                <a16:creationId xmlns:a16="http://schemas.microsoft.com/office/drawing/2014/main" id="{97651B08-6696-7317-5DEE-301ABA5FFE75}"/>
+              </a:ext>
+            </a:extLst>
+          </p:cNvPr>
+          <p:cNvPicPr>
+            <a:picLocks noChangeAspect="1"/>
+          </p:cNvPicPr>
+          <p:nvPr/>
+        </p:nvPicPr>
+        <p:blipFill>
+          <a:blip r:embed="rId2"/>
+          <a:stretch>
+            <a:fillRect/>
+          </a:stretch>
+        </p:blipFill>
+        <p:spPr>
+          <a:xfrm>
+            <a:off x="1961221" y="308759"/>
+            <a:ext cx="9679186" cy="6015727"/>
+          </a:xfrm>
+          <a:prstGeom prst="rect">
+            <a:avLst/>
+          </a:prstGeom>
+        </p:spPr>
+      </p:pic>
+    </p:spTree>
+    <p:extLst>
+      <p:ext uri="{BB962C8B-B14F-4D97-AF65-F5344CB8AC3E}">
+        <p14:creationId xmlns:p14="http://schemas.microsoft.com/office/powerpoint/2010/main" val="1208020300"/>
+      </p:ext>
+    </p:extLst>
+  </p:cSld>
+  <p:clrMapOvr>
+    <a:masterClrMapping/>
+  </p:clrMapOvr>
+</p:sld>
+</file>
+
+<file path=ppt/slides/slide24.xml><?xml version="1.0" encoding="utf-8"?>
+<p:sld xmlns:a="http://schemas.openxmlformats.org/drawingml/2006/main" xmlns:r="http://schemas.openxmlformats.org/officeDocument/2006/relationships" xmlns:p="http://schemas.openxmlformats.org/presentationml/2006/main">
+  <p:cSld>
+    <p:spTree>
+      <p:nvGrpSpPr>
+        <p:cNvPr id="1" name=""/>
+        <p:cNvGrpSpPr/>
+        <p:nvPr/>
+      </p:nvGrpSpPr>
+      <p:grpSpPr>
+        <a:xfrm>
+          <a:off x="0" y="0"/>
+          <a:ext cx="0" cy="0"/>
+          <a:chOff x="0" y="0"/>
+          <a:chExt cx="0" cy="0"/>
+        </a:xfrm>
+      </p:grpSpPr>
+      <p:sp>
+        <p:nvSpPr>
+          <p:cNvPr id="2" name="Title 1">
+            <a:extLst>
+              <a:ext uri="{FF2B5EF4-FFF2-40B4-BE49-F238E27FC236}">
+                <a16:creationId xmlns:a16="http://schemas.microsoft.com/office/drawing/2014/main" id="{025F02F3-BDAC-E626-9ABE-6CA53229CB91}"/>
+              </a:ext>
+            </a:extLst>
+          </p:cNvPr>
+          <p:cNvSpPr>
+            <a:spLocks noGrp="1"/>
+          </p:cNvSpPr>
+          <p:nvPr>
+            <p:ph type="title"/>
+          </p:nvPr>
+        </p:nvSpPr>
+        <p:spPr/>
+        <p:txBody>
+          <a:bodyPr/>
+          <a:lstStyle/>
+          <a:p>
+            <a:r>
+              <a:rPr lang="en-US" sz="4400" dirty="0"/>
+              <a:t>Sul1 water </a:t>
+            </a:r>
+            <a:r>
+              <a:rPr lang="en-US" sz="4400" dirty="0" err="1"/>
+              <a:t>glm</a:t>
+            </a:r>
+            <a:r>
+              <a:rPr lang="en-US" sz="4400" dirty="0"/>
+              <a:t> full model</a:t>
+            </a:r>
+            <a:endParaRPr lang="en-US" dirty="0"/>
+          </a:p>
+        </p:txBody>
+      </p:sp>
+      <p:sp>
+        <p:nvSpPr>
+          <p:cNvPr id="3" name="Content Placeholder 2">
+            <a:extLst>
+              <a:ext uri="{FF2B5EF4-FFF2-40B4-BE49-F238E27FC236}">
+                <a16:creationId xmlns:a16="http://schemas.microsoft.com/office/drawing/2014/main" id="{E39D94CC-20DD-FC10-547D-B114696DED20}"/>
+              </a:ext>
+            </a:extLst>
+          </p:cNvPr>
+          <p:cNvSpPr>
+            <a:spLocks noGrp="1"/>
+          </p:cNvSpPr>
+          <p:nvPr>
+            <p:ph idx="1"/>
+          </p:nvPr>
+        </p:nvSpPr>
+        <p:spPr/>
+        <p:txBody>
+          <a:bodyPr/>
+          <a:lstStyle/>
+          <a:p>
+            <a:endParaRPr lang="en-US"/>
+          </a:p>
+        </p:txBody>
+      </p:sp>
+    </p:spTree>
+    <p:extLst>
+      <p:ext uri="{BB962C8B-B14F-4D97-AF65-F5344CB8AC3E}">
+        <p14:creationId xmlns:p14="http://schemas.microsoft.com/office/powerpoint/2010/main" val="2587548707"/>
+      </p:ext>
+    </p:extLst>
+  </p:cSld>
+  <p:clrMapOvr>
+    <a:masterClrMapping/>
+  </p:clrMapOvr>
+</p:sld>
+</file>
+
+<file path=ppt/slides/slide25.xml><?xml version="1.0" encoding="utf-8"?>
+<p:sld xmlns:a="http://schemas.openxmlformats.org/drawingml/2006/main" xmlns:r="http://schemas.openxmlformats.org/officeDocument/2006/relationships" xmlns:p="http://schemas.openxmlformats.org/presentationml/2006/main">
+  <p:cSld>
+    <p:spTree>
+      <p:nvGrpSpPr>
+        <p:cNvPr id="1" name=""/>
+        <p:cNvGrpSpPr/>
+        <p:nvPr/>
+      </p:nvGrpSpPr>
+      <p:grpSpPr>
+        <a:xfrm>
+          <a:off x="0" y="0"/>
+          <a:ext cx="0" cy="0"/>
+          <a:chOff x="0" y="0"/>
+          <a:chExt cx="0" cy="0"/>
+        </a:xfrm>
+      </p:grpSpPr>
+      <p:sp>
+        <p:nvSpPr>
+          <p:cNvPr id="2" name="Title 1">
+            <a:extLst>
+              <a:ext uri="{FF2B5EF4-FFF2-40B4-BE49-F238E27FC236}">
+                <a16:creationId xmlns:a16="http://schemas.microsoft.com/office/drawing/2014/main" id="{3E4A6795-1948-05E4-E562-AFED99BDA8EB}"/>
+              </a:ext>
+            </a:extLst>
+          </p:cNvPr>
+          <p:cNvSpPr>
+            <a:spLocks noGrp="1"/>
+          </p:cNvSpPr>
+          <p:nvPr>
+            <p:ph type="title"/>
+          </p:nvPr>
+        </p:nvSpPr>
+        <p:spPr>
+          <a:xfrm>
+            <a:off x="165093" y="365124"/>
+            <a:ext cx="2802278" cy="3063875"/>
+          </a:xfrm>
+        </p:spPr>
+        <p:txBody>
+          <a:bodyPr>
+            <a:normAutofit/>
+          </a:bodyPr>
+          <a:lstStyle/>
+          <a:p>
+            <a:r>
+              <a:rPr lang="en-US" sz="3200" dirty="0"/>
+              <a:t>Sul1 water full </a:t>
+            </a:r>
+            <a:r>
+              <a:rPr lang="en-US" sz="3200" dirty="0" err="1"/>
+              <a:t>glm</a:t>
+            </a:r>
+            <a:br>
+              <a:rPr lang="en-US" sz="3200" dirty="0"/>
+            </a:br>
+            <a:r>
+              <a:rPr lang="en-US" sz="3200" dirty="0"/>
+              <a:t>--time trend and TWW difference remain</a:t>
+            </a:r>
+          </a:p>
+        </p:txBody>
+      </p:sp>
+      <p:pic>
+        <p:nvPicPr>
+          <p:cNvPr id="4" name="Picture 3">
+            <a:extLst>
+              <a:ext uri="{FF2B5EF4-FFF2-40B4-BE49-F238E27FC236}">
+                <a16:creationId xmlns:a16="http://schemas.microsoft.com/office/drawing/2014/main" id="{57A0B7CD-0918-0D36-A450-87E07F719F3F}"/>
+              </a:ext>
+            </a:extLst>
+          </p:cNvPr>
+          <p:cNvPicPr>
+            <a:picLocks noChangeAspect="1"/>
+          </p:cNvPicPr>
+          <p:nvPr/>
+        </p:nvPicPr>
+        <p:blipFill>
+          <a:blip r:embed="rId2"/>
+          <a:stretch>
+            <a:fillRect/>
+          </a:stretch>
+        </p:blipFill>
+        <p:spPr>
+          <a:xfrm>
+            <a:off x="3495548" y="365123"/>
+            <a:ext cx="8206595" cy="5747809"/>
+          </a:xfrm>
+          <a:prstGeom prst="rect">
+            <a:avLst/>
+          </a:prstGeom>
+        </p:spPr>
+      </p:pic>
+    </p:spTree>
+    <p:extLst>
+      <p:ext uri="{BB962C8B-B14F-4D97-AF65-F5344CB8AC3E}">
+        <p14:creationId xmlns:p14="http://schemas.microsoft.com/office/powerpoint/2010/main" val="242479201"/>
+      </p:ext>
+    </p:extLst>
+  </p:cSld>
+  <p:clrMapOvr>
+    <a:masterClrMapping/>
+  </p:clrMapOvr>
+</p:sld>
+</file>
+
+<file path=ppt/slides/slide26.xml><?xml version="1.0" encoding="utf-8"?>
+<p:sld xmlns:a="http://schemas.openxmlformats.org/drawingml/2006/main" xmlns:r="http://schemas.openxmlformats.org/officeDocument/2006/relationships" xmlns:p="http://schemas.openxmlformats.org/presentationml/2006/main">
+  <p:cSld>
+    <p:spTree>
+      <p:nvGrpSpPr>
+        <p:cNvPr id="1" name=""/>
+        <p:cNvGrpSpPr/>
+        <p:nvPr/>
+      </p:nvGrpSpPr>
+      <p:grpSpPr>
+        <a:xfrm>
+          <a:off x="0" y="0"/>
+          <a:ext cx="0" cy="0"/>
+          <a:chOff x="0" y="0"/>
+          <a:chExt cx="0" cy="0"/>
+        </a:xfrm>
+      </p:grpSpPr>
+      <p:sp>
+        <p:nvSpPr>
+          <p:cNvPr id="2" name="Title 1">
+            <a:extLst>
+              <a:ext uri="{FF2B5EF4-FFF2-40B4-BE49-F238E27FC236}">
+                <a16:creationId xmlns:a16="http://schemas.microsoft.com/office/drawing/2014/main" id="{9C84FB5B-3548-57AF-0BDE-3735ECDD4D50}"/>
+              </a:ext>
+            </a:extLst>
+          </p:cNvPr>
+          <p:cNvSpPr>
+            <a:spLocks noGrp="1"/>
+          </p:cNvSpPr>
+          <p:nvPr>
+            <p:ph type="title"/>
+          </p:nvPr>
+        </p:nvSpPr>
+        <p:spPr>
+          <a:xfrm>
+            <a:off x="0" y="0"/>
+            <a:ext cx="2084119" cy="1603513"/>
+          </a:xfrm>
+        </p:spPr>
+        <p:txBody>
+          <a:bodyPr>
+            <a:normAutofit/>
+          </a:bodyPr>
+          <a:lstStyle/>
+          <a:p>
+            <a:r>
+              <a:rPr lang="en-US" sz="2000" dirty="0" err="1"/>
+              <a:t>P_aeruginosa</a:t>
+            </a:r>
+            <a:r>
+              <a:rPr lang="en-US" sz="2000" dirty="0"/>
+              <a:t> data transformation</a:t>
+            </a:r>
+          </a:p>
+        </p:txBody>
+      </p:sp>
+      <p:pic>
+        <p:nvPicPr>
+          <p:cNvPr id="4" name="Picture 3">
+            <a:extLst>
+              <a:ext uri="{FF2B5EF4-FFF2-40B4-BE49-F238E27FC236}">
+                <a16:creationId xmlns:a16="http://schemas.microsoft.com/office/drawing/2014/main" id="{6ACAB44D-352E-B3C8-C2C8-6B424B548DDD}"/>
+              </a:ext>
+            </a:extLst>
+          </p:cNvPr>
+          <p:cNvPicPr>
+            <a:picLocks noChangeAspect="1"/>
+          </p:cNvPicPr>
+          <p:nvPr/>
+        </p:nvPicPr>
+        <p:blipFill>
+          <a:blip r:embed="rId2"/>
+          <a:stretch>
+            <a:fillRect/>
+          </a:stretch>
+        </p:blipFill>
+        <p:spPr>
+          <a:xfrm>
+            <a:off x="2220685" y="554052"/>
+            <a:ext cx="9378571" cy="5854799"/>
+          </a:xfrm>
+          <a:prstGeom prst="rect">
+            <a:avLst/>
+          </a:prstGeom>
+        </p:spPr>
+      </p:pic>
+    </p:spTree>
+    <p:extLst>
+      <p:ext uri="{BB962C8B-B14F-4D97-AF65-F5344CB8AC3E}">
+        <p14:creationId xmlns:p14="http://schemas.microsoft.com/office/powerpoint/2010/main" val="593966935"/>
+      </p:ext>
+    </p:extLst>
+  </p:cSld>
+  <p:clrMapOvr>
+    <a:masterClrMapping/>
+  </p:clrMapOvr>
+</p:sld>
+</file>
+
+<file path=ppt/slides/slide27.xml><?xml version="1.0" encoding="utf-8"?>
+<p:sld xmlns:a="http://schemas.openxmlformats.org/drawingml/2006/main" xmlns:r="http://schemas.openxmlformats.org/officeDocument/2006/relationships" xmlns:p="http://schemas.openxmlformats.org/presentationml/2006/main">
+  <p:cSld>
+    <p:spTree>
+      <p:nvGrpSpPr>
+        <p:cNvPr id="1" name=""/>
+        <p:cNvGrpSpPr/>
+        <p:nvPr/>
+      </p:nvGrpSpPr>
+      <p:grpSpPr>
+        <a:xfrm>
+          <a:off x="0" y="0"/>
+          <a:ext cx="0" cy="0"/>
+          <a:chOff x="0" y="0"/>
+          <a:chExt cx="0" cy="0"/>
+        </a:xfrm>
+      </p:grpSpPr>
+      <p:sp>
+        <p:nvSpPr>
+          <p:cNvPr id="2" name="Title 1">
+            <a:extLst>
+              <a:ext uri="{FF2B5EF4-FFF2-40B4-BE49-F238E27FC236}">
+                <a16:creationId xmlns:a16="http://schemas.microsoft.com/office/drawing/2014/main" id="{6B3A9909-8773-5ACC-183C-4F680AC205DF}"/>
+              </a:ext>
+            </a:extLst>
+          </p:cNvPr>
+          <p:cNvSpPr>
+            <a:spLocks noGrp="1"/>
+          </p:cNvSpPr>
+          <p:nvPr>
+            <p:ph type="title"/>
+          </p:nvPr>
+        </p:nvSpPr>
+        <p:spPr/>
+        <p:txBody>
+          <a:bodyPr/>
+          <a:lstStyle/>
+          <a:p>
+            <a:r>
+              <a:rPr lang="en-US" sz="4400"/>
+              <a:t>P aeruginosa water </a:t>
+            </a:r>
+            <a:r>
+              <a:rPr lang="en-US" sz="4400" dirty="0" err="1"/>
+              <a:t>glm</a:t>
+            </a:r>
+            <a:r>
+              <a:rPr lang="en-US" sz="4400" dirty="0"/>
+              <a:t> full model</a:t>
+            </a:r>
+            <a:endParaRPr lang="en-US" dirty="0"/>
+          </a:p>
+        </p:txBody>
+      </p:sp>
+      <p:sp>
+        <p:nvSpPr>
+          <p:cNvPr id="3" name="Content Placeholder 2">
+            <a:extLst>
+              <a:ext uri="{FF2B5EF4-FFF2-40B4-BE49-F238E27FC236}">
+                <a16:creationId xmlns:a16="http://schemas.microsoft.com/office/drawing/2014/main" id="{81D5F5E7-8F83-4BB1-DDF9-05EA4EC102D9}"/>
+              </a:ext>
+            </a:extLst>
+          </p:cNvPr>
+          <p:cNvSpPr>
+            <a:spLocks noGrp="1"/>
+          </p:cNvSpPr>
+          <p:nvPr>
+            <p:ph idx="1"/>
+          </p:nvPr>
+        </p:nvSpPr>
+        <p:spPr/>
+        <p:txBody>
+          <a:bodyPr/>
+          <a:lstStyle/>
+          <a:p>
+            <a:endParaRPr lang="en-US"/>
+          </a:p>
+        </p:txBody>
+      </p:sp>
+    </p:spTree>
+    <p:extLst>
+      <p:ext uri="{BB962C8B-B14F-4D97-AF65-F5344CB8AC3E}">
+        <p14:creationId xmlns:p14="http://schemas.microsoft.com/office/powerpoint/2010/main" val="246760938"/>
+      </p:ext>
+    </p:extLst>
+  </p:cSld>
+  <p:clrMapOvr>
+    <a:masterClrMapping/>
+  </p:clrMapOvr>
+</p:sld>
+</file>
+
+<file path=ppt/slides/slide28.xml><?xml version="1.0" encoding="utf-8"?>
+<p:sld xmlns:a="http://schemas.openxmlformats.org/drawingml/2006/main" xmlns:r="http://schemas.openxmlformats.org/officeDocument/2006/relationships" xmlns:p="http://schemas.openxmlformats.org/presentationml/2006/main">
+  <p:cSld>
+    <p:spTree>
+      <p:nvGrpSpPr>
+        <p:cNvPr id="1" name=""/>
+        <p:cNvGrpSpPr/>
+        <p:nvPr/>
+      </p:nvGrpSpPr>
+      <p:grpSpPr>
+        <a:xfrm>
+          <a:off x="0" y="0"/>
+          <a:ext cx="0" cy="0"/>
+          <a:chOff x="0" y="0"/>
+          <a:chExt cx="0" cy="0"/>
+        </a:xfrm>
+      </p:grpSpPr>
+      <p:sp>
+        <p:nvSpPr>
+          <p:cNvPr id="2" name="Title 1">
+            <a:extLst>
+              <a:ext uri="{FF2B5EF4-FFF2-40B4-BE49-F238E27FC236}">
+                <a16:creationId xmlns:a16="http://schemas.microsoft.com/office/drawing/2014/main" id="{3E4A6795-1948-05E4-E562-AFED99BDA8EB}"/>
+              </a:ext>
+            </a:extLst>
+          </p:cNvPr>
+          <p:cNvSpPr>
+            <a:spLocks noGrp="1"/>
+          </p:cNvSpPr>
+          <p:nvPr>
+            <p:ph type="title"/>
+          </p:nvPr>
+        </p:nvSpPr>
+        <p:spPr>
+          <a:xfrm>
+            <a:off x="165093" y="365124"/>
+            <a:ext cx="2802278" cy="3063875"/>
+          </a:xfrm>
+        </p:spPr>
+        <p:txBody>
+          <a:bodyPr>
+            <a:normAutofit/>
+          </a:bodyPr>
+          <a:lstStyle/>
+          <a:p>
+            <a:r>
+              <a:rPr lang="en-US" sz="3200" dirty="0"/>
+              <a:t>P. aeruginosa water step</a:t>
+            </a:r>
+            <a:br>
+              <a:rPr lang="en-US" sz="3200" dirty="0"/>
+            </a:br>
+            <a:r>
+              <a:rPr lang="en-US" sz="3200" dirty="0"/>
+              <a:t>-still nothing significant</a:t>
+            </a:r>
+          </a:p>
+        </p:txBody>
+      </p:sp>
+      <p:pic>
+        <p:nvPicPr>
+          <p:cNvPr id="4" name="Picture 3">
+            <a:extLst>
+              <a:ext uri="{FF2B5EF4-FFF2-40B4-BE49-F238E27FC236}">
+                <a16:creationId xmlns:a16="http://schemas.microsoft.com/office/drawing/2014/main" id="{EE579431-4984-DD87-CD21-D8A00CC57FFB}"/>
+              </a:ext>
+            </a:extLst>
+          </p:cNvPr>
+          <p:cNvPicPr>
+            <a:picLocks noChangeAspect="1"/>
+          </p:cNvPicPr>
+          <p:nvPr/>
+        </p:nvPicPr>
+        <p:blipFill>
+          <a:blip r:embed="rId2"/>
+          <a:stretch>
+            <a:fillRect/>
+          </a:stretch>
+        </p:blipFill>
+        <p:spPr>
+          <a:xfrm>
+            <a:off x="3711452" y="990474"/>
+            <a:ext cx="8461645" cy="4326593"/>
+          </a:xfrm>
+          <a:prstGeom prst="rect">
+            <a:avLst/>
+          </a:prstGeom>
+        </p:spPr>
+      </p:pic>
+    </p:spTree>
+    <p:extLst>
+      <p:ext uri="{BB962C8B-B14F-4D97-AF65-F5344CB8AC3E}">
+        <p14:creationId xmlns:p14="http://schemas.microsoft.com/office/powerpoint/2010/main" val="866700415"/>
+      </p:ext>
+    </p:extLst>
+  </p:cSld>
+  <p:clrMapOvr>
+    <a:masterClrMapping/>
+  </p:clrMapOvr>
+</p:sld>
+</file>
+
+<file path=ppt/slides/slide29.xml><?xml version="1.0" encoding="utf-8"?>
+<p:sld xmlns:a="http://schemas.openxmlformats.org/drawingml/2006/main" xmlns:r="http://schemas.openxmlformats.org/officeDocument/2006/relationships" xmlns:p="http://schemas.openxmlformats.org/presentationml/2006/main">
+  <p:cSld>
+    <p:spTree>
+      <p:nvGrpSpPr>
+        <p:cNvPr id="1" name=""/>
+        <p:cNvGrpSpPr/>
+        <p:nvPr/>
+      </p:nvGrpSpPr>
+      <p:grpSpPr>
+        <a:xfrm>
+          <a:off x="0" y="0"/>
+          <a:ext cx="0" cy="0"/>
+          <a:chOff x="0" y="0"/>
+          <a:chExt cx="0" cy="0"/>
+        </a:xfrm>
+      </p:grpSpPr>
+      <p:sp>
+        <p:nvSpPr>
+          <p:cNvPr id="2" name="Title 1">
+            <a:extLst>
+              <a:ext uri="{FF2B5EF4-FFF2-40B4-BE49-F238E27FC236}">
+                <a16:creationId xmlns:a16="http://schemas.microsoft.com/office/drawing/2014/main" id="{8AB59B44-7BB9-902F-4C8B-95F41F33EC3F}"/>
+              </a:ext>
+            </a:extLst>
+          </p:cNvPr>
+          <p:cNvSpPr>
+            <a:spLocks noGrp="1"/>
+          </p:cNvSpPr>
+          <p:nvPr>
+            <p:ph type="title"/>
+          </p:nvPr>
+        </p:nvSpPr>
+        <p:spPr/>
+        <p:txBody>
+          <a:bodyPr/>
+          <a:lstStyle/>
+          <a:p>
+            <a:r>
+              <a:rPr lang="en-US" dirty="0"/>
+              <a:t>Overall Results</a:t>
+            </a:r>
+          </a:p>
+        </p:txBody>
+      </p:sp>
+      <p:sp>
+        <p:nvSpPr>
+          <p:cNvPr id="3" name="Content Placeholder 2">
+            <a:extLst>
+              <a:ext uri="{FF2B5EF4-FFF2-40B4-BE49-F238E27FC236}">
+                <a16:creationId xmlns:a16="http://schemas.microsoft.com/office/drawing/2014/main" id="{21BB0896-5C7C-7A5B-F01C-18AE86E60326}"/>
+              </a:ext>
+            </a:extLst>
+          </p:cNvPr>
+          <p:cNvSpPr>
+            <a:spLocks noGrp="1"/>
+          </p:cNvSpPr>
+          <p:nvPr>
+            <p:ph idx="1"/>
+          </p:nvPr>
+        </p:nvSpPr>
+        <p:spPr/>
+        <p:txBody>
+          <a:bodyPr>
+            <a:normAutofit fontScale="92500" lnSpcReduction="20000"/>
+          </a:bodyPr>
+          <a:lstStyle/>
+          <a:p>
+            <a:r>
+              <a:rPr lang="en-US" dirty="0"/>
+              <a:t>Microplastics--Not sure how much detail you need.</a:t>
+            </a:r>
+          </a:p>
+          <a:p>
+            <a:pPr lvl="1"/>
+            <a:r>
+              <a:rPr lang="en-US" dirty="0"/>
+              <a:t>Time is significant for all the responses (p value in full model is significant and/or kept in the stepwise regression).</a:t>
+            </a:r>
+          </a:p>
+          <a:p>
+            <a:pPr lvl="1"/>
+            <a:r>
+              <a:rPr lang="en-US" dirty="0"/>
+              <a:t>LDPE often differentiates itself from other plastics (significant in 3 of the 4, still the lowest p value in the 4</a:t>
+            </a:r>
+            <a:r>
+              <a:rPr lang="en-US" baseline="30000" dirty="0"/>
+              <a:t>th</a:t>
+            </a:r>
+            <a:r>
+              <a:rPr lang="en-US" dirty="0"/>
+              <a:t>), but plastic type gets dropped in the stepwise for all but sul1. (Might be different with less plastic levels in the factor)</a:t>
+            </a:r>
+          </a:p>
+          <a:p>
+            <a:pPr lvl="1"/>
+            <a:r>
+              <a:rPr lang="en-US" dirty="0"/>
+              <a:t>Water type different for sul1 only, but I have not deleted the fb data at this point.</a:t>
+            </a:r>
+          </a:p>
+          <a:p>
+            <a:r>
+              <a:rPr lang="en-US" dirty="0"/>
+              <a:t>Water—</a:t>
+            </a:r>
+          </a:p>
+          <a:p>
+            <a:pPr lvl="1"/>
+            <a:r>
+              <a:rPr lang="en-US" dirty="0"/>
+              <a:t>S. </a:t>
+            </a:r>
+            <a:r>
+              <a:rPr lang="en-US" dirty="0" err="1"/>
+              <a:t>multophilia</a:t>
+            </a:r>
+            <a:r>
+              <a:rPr lang="en-US" dirty="0"/>
+              <a:t> there is a time trend but no difference between the water treatments.</a:t>
+            </a:r>
+          </a:p>
+          <a:p>
+            <a:pPr lvl="1"/>
+            <a:r>
+              <a:rPr lang="en-US" dirty="0"/>
+              <a:t>Int1 and sul1 both show time trends and water differences.</a:t>
+            </a:r>
+          </a:p>
+          <a:p>
+            <a:pPr lvl="1"/>
+            <a:r>
+              <a:rPr lang="en-US" dirty="0"/>
+              <a:t>P. aeruginosa no time trend or difference between the water treatments</a:t>
+            </a:r>
+          </a:p>
+          <a:p>
+            <a:r>
+              <a:rPr lang="en-US" dirty="0"/>
+              <a:t>Presumably time trends in the water may possibly be a bit of a confounding variable for interpreting the accumulation on microplastics over time.</a:t>
+            </a:r>
+          </a:p>
+        </p:txBody>
+      </p:sp>
+    </p:spTree>
+    <p:extLst>
+      <p:ext uri="{BB962C8B-B14F-4D97-AF65-F5344CB8AC3E}">
+        <p14:creationId xmlns:p14="http://schemas.microsoft.com/office/powerpoint/2010/main" val="1199600328"/>
+      </p:ext>
+    </p:extLst>
+  </p:cSld>
+  <p:clrMapOvr>
+    <a:masterClrMapping/>
+  </p:clrMapOvr>
+</p:sld>
+</file>
+
+<file path=ppt/slides/slide3.xml><?xml version="1.0" encoding="utf-8"?>
 <p:sld xmlns:a="http://schemas.openxmlformats.org/drawingml/2006/main" xmlns:r="http://schemas.openxmlformats.org/officeDocument/2006/relationships" xmlns:p="http://schemas.openxmlformats.org/presentationml/2006/main">
   <p:cSld>
     <p:spTree>
@@ -4714,7 +5814,7 @@
 </p:sld>
 </file>
 
-<file path=ppt/slides/slide20.xml><?xml version="1.0" encoding="utf-8"?>
+<file path=ppt/slides/slide4.xml><?xml version="1.0" encoding="utf-8"?>
 <p:sld xmlns:a="http://schemas.openxmlformats.org/drawingml/2006/main" xmlns:r="http://schemas.openxmlformats.org/officeDocument/2006/relationships" xmlns:p="http://schemas.openxmlformats.org/presentationml/2006/main">
   <p:cSld>
     <p:spTree>
@@ -4736,7 +5836,7 @@
           <p:cNvPr id="2" name="Title 1">
             <a:extLst>
               <a:ext uri="{FF2B5EF4-FFF2-40B4-BE49-F238E27FC236}">
-                <a16:creationId xmlns:a16="http://schemas.microsoft.com/office/drawing/2014/main" id="{3E4A6795-1948-05E4-E562-AFED99BDA8EB}"/>
+                <a16:creationId xmlns:a16="http://schemas.microsoft.com/office/drawing/2014/main" id="{9C84FB5B-3548-57AF-0BDE-3735ECDD4D50}"/>
               </a:ext>
             </a:extLst>
           </p:cNvPr>
@@ -4749,433 +5849,8 @@
         </p:nvSpPr>
         <p:spPr>
           <a:xfrm>
-            <a:off x="309026" y="1118658"/>
-            <a:ext cx="2802278" cy="3063875"/>
-          </a:xfrm>
-        </p:spPr>
-        <p:txBody>
-          <a:bodyPr>
-            <a:normAutofit fontScale="90000"/>
-          </a:bodyPr>
-          <a:lstStyle/>
-          <a:p>
-            <a:r>
-              <a:rPr lang="en-US" sz="3200" dirty="0"/>
-              <a:t>Int1 water full </a:t>
-            </a:r>
-            <a:r>
-              <a:rPr lang="en-US" sz="3200" dirty="0" err="1"/>
-              <a:t>glm</a:t>
-            </a:r>
-            <a:br>
-              <a:rPr lang="en-US" sz="3200" dirty="0"/>
-            </a:br>
-            <a:r>
-              <a:rPr lang="en-US" sz="3200" dirty="0"/>
-              <a:t>--TWW significant vs river water</a:t>
-            </a:r>
-            <a:br>
-              <a:rPr lang="en-US" sz="3200" dirty="0"/>
-            </a:br>
-            <a:r>
-              <a:rPr lang="en-US" sz="3200" dirty="0"/>
-              <a:t>--linear time trend also present</a:t>
-            </a:r>
-          </a:p>
-        </p:txBody>
-      </p:sp>
-      <p:pic>
-        <p:nvPicPr>
-          <p:cNvPr id="5" name="Picture 4">
-            <a:extLst>
-              <a:ext uri="{FF2B5EF4-FFF2-40B4-BE49-F238E27FC236}">
-                <a16:creationId xmlns:a16="http://schemas.microsoft.com/office/drawing/2014/main" id="{CAF85615-64CF-0402-2140-27C4142A795D}"/>
-              </a:ext>
-            </a:extLst>
-          </p:cNvPr>
-          <p:cNvPicPr>
-            <a:picLocks noChangeAspect="1"/>
-          </p:cNvPicPr>
-          <p:nvPr/>
-        </p:nvPicPr>
-        <p:blipFill>
-          <a:blip r:embed="rId2"/>
-          <a:stretch>
-            <a:fillRect/>
-          </a:stretch>
-        </p:blipFill>
-        <p:spPr>
-          <a:xfrm>
-            <a:off x="3597146" y="365124"/>
-            <a:ext cx="8594101" cy="5045076"/>
-          </a:xfrm>
-          <a:prstGeom prst="rect">
-            <a:avLst/>
-          </a:prstGeom>
-        </p:spPr>
-      </p:pic>
-    </p:spTree>
-    <p:extLst>
-      <p:ext uri="{BB962C8B-B14F-4D97-AF65-F5344CB8AC3E}">
-        <p14:creationId xmlns:p14="http://schemas.microsoft.com/office/powerpoint/2010/main" val="1042782054"/>
-      </p:ext>
-    </p:extLst>
-  </p:cSld>
-  <p:clrMapOvr>
-    <a:masterClrMapping/>
-  </p:clrMapOvr>
-</p:sld>
-</file>
-
-<file path=ppt/slides/slide21.xml><?xml version="1.0" encoding="utf-8"?>
-<p:sld xmlns:a="http://schemas.openxmlformats.org/drawingml/2006/main" xmlns:r="http://schemas.openxmlformats.org/officeDocument/2006/relationships" xmlns:p="http://schemas.openxmlformats.org/presentationml/2006/main">
-  <p:cSld>
-    <p:spTree>
-      <p:nvGrpSpPr>
-        <p:cNvPr id="1" name=""/>
-        <p:cNvGrpSpPr/>
-        <p:nvPr/>
-      </p:nvGrpSpPr>
-      <p:grpSpPr>
-        <a:xfrm>
-          <a:off x="0" y="0"/>
-          <a:ext cx="0" cy="0"/>
-          <a:chOff x="0" y="0"/>
-          <a:chExt cx="0" cy="0"/>
-        </a:xfrm>
-      </p:grpSpPr>
-      <p:sp>
-        <p:nvSpPr>
-          <p:cNvPr id="2" name="Title 1">
-            <a:extLst>
-              <a:ext uri="{FF2B5EF4-FFF2-40B4-BE49-F238E27FC236}">
-                <a16:creationId xmlns:a16="http://schemas.microsoft.com/office/drawing/2014/main" id="{3E4A6795-1948-05E4-E562-AFED99BDA8EB}"/>
-              </a:ext>
-            </a:extLst>
-          </p:cNvPr>
-          <p:cNvSpPr>
-            <a:spLocks noGrp="1"/>
-          </p:cNvSpPr>
-          <p:nvPr>
-            <p:ph type="title"/>
-          </p:nvPr>
-        </p:nvSpPr>
-        <p:spPr>
-          <a:xfrm>
-            <a:off x="165093" y="365124"/>
-            <a:ext cx="2802278" cy="3063875"/>
-          </a:xfrm>
-        </p:spPr>
-        <p:txBody>
-          <a:bodyPr>
-            <a:normAutofit fontScale="90000"/>
-          </a:bodyPr>
-          <a:lstStyle/>
-          <a:p>
-            <a:r>
-              <a:rPr lang="en-US" sz="3200" dirty="0"/>
-              <a:t>Int1 water step</a:t>
-            </a:r>
-            <a:br>
-              <a:rPr lang="en-US" sz="3200" dirty="0"/>
-            </a:br>
-            <a:r>
-              <a:rPr lang="en-US" sz="3200" dirty="0"/>
-              <a:t>--linear time trend and TWW difference remain in step model (as expected here)</a:t>
-            </a:r>
-          </a:p>
-        </p:txBody>
-      </p:sp>
-      <p:pic>
-        <p:nvPicPr>
-          <p:cNvPr id="4" name="Picture 3">
-            <a:extLst>
-              <a:ext uri="{FF2B5EF4-FFF2-40B4-BE49-F238E27FC236}">
-                <a16:creationId xmlns:a16="http://schemas.microsoft.com/office/drawing/2014/main" id="{008CCC78-2D60-36A1-1E80-03F85298B888}"/>
-              </a:ext>
-            </a:extLst>
-          </p:cNvPr>
-          <p:cNvPicPr>
-            <a:picLocks noChangeAspect="1"/>
-          </p:cNvPicPr>
-          <p:nvPr/>
-        </p:nvPicPr>
-        <p:blipFill>
-          <a:blip r:embed="rId2"/>
-          <a:stretch>
-            <a:fillRect/>
-          </a:stretch>
-        </p:blipFill>
-        <p:spPr>
-          <a:xfrm>
-            <a:off x="3387585" y="902683"/>
-            <a:ext cx="7864813" cy="4287384"/>
-          </a:xfrm>
-          <a:prstGeom prst="rect">
-            <a:avLst/>
-          </a:prstGeom>
-        </p:spPr>
-      </p:pic>
-    </p:spTree>
-    <p:extLst>
-      <p:ext uri="{BB962C8B-B14F-4D97-AF65-F5344CB8AC3E}">
-        <p14:creationId xmlns:p14="http://schemas.microsoft.com/office/powerpoint/2010/main" val="58590973"/>
-      </p:ext>
-    </p:extLst>
-  </p:cSld>
-  <p:clrMapOvr>
-    <a:masterClrMapping/>
-  </p:clrMapOvr>
-</p:sld>
-</file>
-
-<file path=ppt/slides/slide22.xml><?xml version="1.0" encoding="utf-8"?>
-<p:sld xmlns:a="http://schemas.openxmlformats.org/drawingml/2006/main" xmlns:r="http://schemas.openxmlformats.org/officeDocument/2006/relationships" xmlns:p="http://schemas.openxmlformats.org/presentationml/2006/main">
-  <p:cSld>
-    <p:spTree>
-      <p:nvGrpSpPr>
-        <p:cNvPr id="1" name=""/>
-        <p:cNvGrpSpPr/>
-        <p:nvPr/>
-      </p:nvGrpSpPr>
-      <p:grpSpPr>
-        <a:xfrm>
-          <a:off x="0" y="0"/>
-          <a:ext cx="0" cy="0"/>
-          <a:chOff x="0" y="0"/>
-          <a:chExt cx="0" cy="0"/>
-        </a:xfrm>
-      </p:grpSpPr>
-      <p:pic>
-        <p:nvPicPr>
-          <p:cNvPr id="5" name="Picture 4">
-            <a:extLst>
-              <a:ext uri="{FF2B5EF4-FFF2-40B4-BE49-F238E27FC236}">
-                <a16:creationId xmlns:a16="http://schemas.microsoft.com/office/drawing/2014/main" id="{C89A8D0F-4785-793E-5F59-940560DDD98D}"/>
-              </a:ext>
-            </a:extLst>
-          </p:cNvPr>
-          <p:cNvPicPr>
-            <a:picLocks noChangeAspect="1"/>
-          </p:cNvPicPr>
-          <p:nvPr/>
-        </p:nvPicPr>
-        <p:blipFill>
-          <a:blip r:embed="rId2"/>
-          <a:stretch>
-            <a:fillRect/>
-          </a:stretch>
-        </p:blipFill>
-        <p:spPr>
-          <a:xfrm>
-            <a:off x="3249768" y="1086678"/>
-            <a:ext cx="8472672" cy="5571747"/>
-          </a:xfrm>
-          <a:prstGeom prst="rect">
-            <a:avLst/>
-          </a:prstGeom>
-        </p:spPr>
-      </p:pic>
-      <p:sp>
-        <p:nvSpPr>
-          <p:cNvPr id="2" name="Title 1">
-            <a:extLst>
-              <a:ext uri="{FF2B5EF4-FFF2-40B4-BE49-F238E27FC236}">
-                <a16:creationId xmlns:a16="http://schemas.microsoft.com/office/drawing/2014/main" id="{9C84FB5B-3548-57AF-0BDE-3735ECDD4D50}"/>
-              </a:ext>
-            </a:extLst>
-          </p:cNvPr>
-          <p:cNvSpPr>
-            <a:spLocks noGrp="1"/>
-          </p:cNvSpPr>
-          <p:nvPr>
-            <p:ph type="title"/>
-          </p:nvPr>
-        </p:nvSpPr>
-        <p:spPr>
-          <a:xfrm>
-            <a:off x="0" y="0"/>
-            <a:ext cx="4664765" cy="1603513"/>
-          </a:xfrm>
-        </p:spPr>
-        <p:txBody>
-          <a:bodyPr/>
-          <a:lstStyle/>
-          <a:p>
-            <a:r>
-              <a:rPr lang="en-US" dirty="0" err="1"/>
-              <a:t>S_maltophilia</a:t>
-            </a:r>
-            <a:r>
-              <a:rPr lang="en-US" dirty="0"/>
-              <a:t> data transformation</a:t>
-            </a:r>
-          </a:p>
-        </p:txBody>
-      </p:sp>
-    </p:spTree>
-    <p:extLst>
-      <p:ext uri="{BB962C8B-B14F-4D97-AF65-F5344CB8AC3E}">
-        <p14:creationId xmlns:p14="http://schemas.microsoft.com/office/powerpoint/2010/main" val="1208020300"/>
-      </p:ext>
-    </p:extLst>
-  </p:cSld>
-  <p:clrMapOvr>
-    <a:masterClrMapping/>
-  </p:clrMapOvr>
-</p:sld>
-</file>
-
-<file path=ppt/slides/slide23.xml><?xml version="1.0" encoding="utf-8"?>
-<p:sld xmlns:a="http://schemas.openxmlformats.org/drawingml/2006/main" xmlns:r="http://schemas.openxmlformats.org/officeDocument/2006/relationships" xmlns:p="http://schemas.openxmlformats.org/presentationml/2006/main">
-  <p:cSld>
-    <p:spTree>
-      <p:nvGrpSpPr>
-        <p:cNvPr id="1" name=""/>
-        <p:cNvGrpSpPr/>
-        <p:nvPr/>
-      </p:nvGrpSpPr>
-      <p:grpSpPr>
-        <a:xfrm>
-          <a:off x="0" y="0"/>
-          <a:ext cx="0" cy="0"/>
-          <a:chOff x="0" y="0"/>
-          <a:chExt cx="0" cy="0"/>
-        </a:xfrm>
-      </p:grpSpPr>
-      <p:sp>
-        <p:nvSpPr>
-          <p:cNvPr id="2" name="Title 1">
-            <a:extLst>
-              <a:ext uri="{FF2B5EF4-FFF2-40B4-BE49-F238E27FC236}">
-                <a16:creationId xmlns:a16="http://schemas.microsoft.com/office/drawing/2014/main" id="{3E4A6795-1948-05E4-E562-AFED99BDA8EB}"/>
-              </a:ext>
-            </a:extLst>
-          </p:cNvPr>
-          <p:cNvSpPr>
-            <a:spLocks noGrp="1"/>
-          </p:cNvSpPr>
-          <p:nvPr>
-            <p:ph type="title"/>
-          </p:nvPr>
-        </p:nvSpPr>
-        <p:spPr>
-          <a:xfrm>
-            <a:off x="165093" y="365124"/>
-            <a:ext cx="2802278" cy="3063875"/>
-          </a:xfrm>
-        </p:spPr>
-        <p:txBody>
-          <a:bodyPr>
-            <a:normAutofit fontScale="90000"/>
-          </a:bodyPr>
-          <a:lstStyle/>
-          <a:p>
-            <a:r>
-              <a:rPr lang="en-US" sz="3200" dirty="0"/>
-              <a:t>Sul1 water full </a:t>
-            </a:r>
-            <a:r>
-              <a:rPr lang="en-US" sz="3200" dirty="0" err="1"/>
-              <a:t>glm</a:t>
-            </a:r>
-            <a:br>
-              <a:rPr lang="en-US" sz="3200" dirty="0"/>
-            </a:br>
-            <a:r>
-              <a:rPr lang="en-US" sz="3200" dirty="0"/>
-              <a:t>--time trend present</a:t>
-            </a:r>
-            <a:br>
-              <a:rPr lang="en-US" sz="3200" dirty="0"/>
-            </a:br>
-            <a:r>
-              <a:rPr lang="en-US" sz="3200" dirty="0"/>
-              <a:t>TWW difference versus RW(Con)</a:t>
-            </a:r>
-          </a:p>
-        </p:txBody>
-      </p:sp>
-      <p:pic>
-        <p:nvPicPr>
-          <p:cNvPr id="5" name="Picture 4">
-            <a:extLst>
-              <a:ext uri="{FF2B5EF4-FFF2-40B4-BE49-F238E27FC236}">
-                <a16:creationId xmlns:a16="http://schemas.microsoft.com/office/drawing/2014/main" id="{55B5E247-739C-AD37-643E-41F0053C9FB8}"/>
-              </a:ext>
-            </a:extLst>
-          </p:cNvPr>
-          <p:cNvPicPr>
-            <a:picLocks noChangeAspect="1"/>
-          </p:cNvPicPr>
-          <p:nvPr/>
-        </p:nvPicPr>
-        <p:blipFill>
-          <a:blip r:embed="rId2"/>
-          <a:stretch>
-            <a:fillRect/>
-          </a:stretch>
-        </p:blipFill>
-        <p:spPr>
-          <a:xfrm>
-            <a:off x="3306105" y="455537"/>
-            <a:ext cx="8803342" cy="5123996"/>
-          </a:xfrm>
-          <a:prstGeom prst="rect">
-            <a:avLst/>
-          </a:prstGeom>
-        </p:spPr>
-      </p:pic>
-    </p:spTree>
-    <p:extLst>
-      <p:ext uri="{BB962C8B-B14F-4D97-AF65-F5344CB8AC3E}">
-        <p14:creationId xmlns:p14="http://schemas.microsoft.com/office/powerpoint/2010/main" val="3345586831"/>
-      </p:ext>
-    </p:extLst>
-  </p:cSld>
-  <p:clrMapOvr>
-    <a:masterClrMapping/>
-  </p:clrMapOvr>
-</p:sld>
-</file>
-
-<file path=ppt/slides/slide24.xml><?xml version="1.0" encoding="utf-8"?>
-<p:sld xmlns:a="http://schemas.openxmlformats.org/drawingml/2006/main" xmlns:r="http://schemas.openxmlformats.org/officeDocument/2006/relationships" xmlns:p="http://schemas.openxmlformats.org/presentationml/2006/main">
-  <p:cSld>
-    <p:spTree>
-      <p:nvGrpSpPr>
-        <p:cNvPr id="1" name=""/>
-        <p:cNvGrpSpPr/>
-        <p:nvPr/>
-      </p:nvGrpSpPr>
-      <p:grpSpPr>
-        <a:xfrm>
-          <a:off x="0" y="0"/>
-          <a:ext cx="0" cy="0"/>
-          <a:chOff x="0" y="0"/>
-          <a:chExt cx="0" cy="0"/>
-        </a:xfrm>
-      </p:grpSpPr>
-      <p:sp>
-        <p:nvSpPr>
-          <p:cNvPr id="2" name="Title 1">
-            <a:extLst>
-              <a:ext uri="{FF2B5EF4-FFF2-40B4-BE49-F238E27FC236}">
-                <a16:creationId xmlns:a16="http://schemas.microsoft.com/office/drawing/2014/main" id="{3E4A6795-1948-05E4-E562-AFED99BDA8EB}"/>
-              </a:ext>
-            </a:extLst>
-          </p:cNvPr>
-          <p:cNvSpPr>
-            <a:spLocks noGrp="1"/>
-          </p:cNvSpPr>
-          <p:nvPr>
-            <p:ph type="title"/>
-          </p:nvPr>
-        </p:nvSpPr>
-        <p:spPr>
-          <a:xfrm>
-            <a:off x="165093" y="365124"/>
-            <a:ext cx="2802278" cy="3063875"/>
+            <a:off x="106878" y="296883"/>
+            <a:ext cx="2731325" cy="938151"/>
           </a:xfrm>
         </p:spPr>
         <p:txBody>
@@ -5185,606 +5860,37 @@
           <a:lstStyle/>
           <a:p>
             <a:r>
-              <a:rPr lang="en-US" sz="3200" dirty="0"/>
-              <a:t>Sul1 water full </a:t>
-            </a:r>
-            <a:r>
-              <a:rPr lang="en-US" sz="3200" dirty="0" err="1"/>
-              <a:t>glm</a:t>
-            </a:r>
-            <a:br>
-              <a:rPr lang="en-US" sz="3200" dirty="0"/>
-            </a:br>
-            <a:r>
-              <a:rPr lang="en-US" sz="3200" dirty="0"/>
-              <a:t>--time trend and TWW difference remain</a:t>
-            </a:r>
-          </a:p>
-        </p:txBody>
-      </p:sp>
-      <p:pic>
-        <p:nvPicPr>
-          <p:cNvPr id="4" name="Picture 3">
-            <a:extLst>
-              <a:ext uri="{FF2B5EF4-FFF2-40B4-BE49-F238E27FC236}">
-                <a16:creationId xmlns:a16="http://schemas.microsoft.com/office/drawing/2014/main" id="{57A0B7CD-0918-0D36-A450-87E07F719F3F}"/>
-              </a:ext>
-            </a:extLst>
-          </p:cNvPr>
-          <p:cNvPicPr>
-            <a:picLocks noChangeAspect="1"/>
-          </p:cNvPicPr>
+              <a:rPr lang="en-US" sz="2000" dirty="0"/>
+              <a:t>Microplastics: </a:t>
+            </a:r>
+            <a:r>
+              <a:rPr lang="en-US" sz="2000" dirty="0" err="1"/>
+              <a:t>S_maltophilia</a:t>
+            </a:r>
+            <a:r>
+              <a:rPr lang="en-US" sz="2000" dirty="0"/>
+              <a:t> data transformation</a:t>
+            </a:r>
+          </a:p>
+        </p:txBody>
+      </p:sp>
+      <p:sp>
+        <p:nvSpPr>
+          <p:cNvPr id="3" name="Title 1">
+            <a:extLst>
+              <a:ext uri="{FF2B5EF4-FFF2-40B4-BE49-F238E27FC236}">
+                <a16:creationId xmlns:a16="http://schemas.microsoft.com/office/drawing/2014/main" id="{246097DE-5335-6BB6-24A4-609029F00200}"/>
+              </a:ext>
+            </a:extLst>
+          </p:cNvPr>
+          <p:cNvSpPr txBox="1">
+            <a:spLocks/>
+          </p:cNvSpPr>
           <p:nvPr/>
-        </p:nvPicPr>
-        <p:blipFill>
-          <a:blip r:embed="rId2"/>
-          <a:stretch>
-            <a:fillRect/>
-          </a:stretch>
-        </p:blipFill>
+        </p:nvSpPr>
         <p:spPr>
           <a:xfrm>
-            <a:off x="3495548" y="365123"/>
-            <a:ext cx="8206595" cy="5747809"/>
-          </a:xfrm>
-          <a:prstGeom prst="rect">
-            <a:avLst/>
-          </a:prstGeom>
-        </p:spPr>
-      </p:pic>
-    </p:spTree>
-    <p:extLst>
-      <p:ext uri="{BB962C8B-B14F-4D97-AF65-F5344CB8AC3E}">
-        <p14:creationId xmlns:p14="http://schemas.microsoft.com/office/powerpoint/2010/main" val="242479201"/>
-      </p:ext>
-    </p:extLst>
-  </p:cSld>
-  <p:clrMapOvr>
-    <a:masterClrMapping/>
-  </p:clrMapOvr>
-</p:sld>
-</file>
-
-<file path=ppt/slides/slide25.xml><?xml version="1.0" encoding="utf-8"?>
-<p:sld xmlns:a="http://schemas.openxmlformats.org/drawingml/2006/main" xmlns:r="http://schemas.openxmlformats.org/officeDocument/2006/relationships" xmlns:p="http://schemas.openxmlformats.org/presentationml/2006/main">
-  <p:cSld>
-    <p:spTree>
-      <p:nvGrpSpPr>
-        <p:cNvPr id="1" name=""/>
-        <p:cNvGrpSpPr/>
-        <p:nvPr/>
-      </p:nvGrpSpPr>
-      <p:grpSpPr>
-        <a:xfrm>
-          <a:off x="0" y="0"/>
-          <a:ext cx="0" cy="0"/>
-          <a:chOff x="0" y="0"/>
-          <a:chExt cx="0" cy="0"/>
-        </a:xfrm>
-      </p:grpSpPr>
-      <p:pic>
-        <p:nvPicPr>
-          <p:cNvPr id="5" name="Picture 4">
-            <a:extLst>
-              <a:ext uri="{FF2B5EF4-FFF2-40B4-BE49-F238E27FC236}">
-                <a16:creationId xmlns:a16="http://schemas.microsoft.com/office/drawing/2014/main" id="{C89A8D0F-4785-793E-5F59-940560DDD98D}"/>
-              </a:ext>
-            </a:extLst>
-          </p:cNvPr>
-          <p:cNvPicPr>
-            <a:picLocks noChangeAspect="1"/>
-          </p:cNvPicPr>
-          <p:nvPr/>
-        </p:nvPicPr>
-        <p:blipFill>
-          <a:blip r:embed="rId2"/>
-          <a:stretch>
-            <a:fillRect/>
-          </a:stretch>
-        </p:blipFill>
-        <p:spPr>
-          <a:xfrm>
-            <a:off x="3249768" y="1086678"/>
-            <a:ext cx="8472672" cy="5571747"/>
-          </a:xfrm>
-          <a:prstGeom prst="rect">
-            <a:avLst/>
-          </a:prstGeom>
-        </p:spPr>
-      </p:pic>
-      <p:sp>
-        <p:nvSpPr>
-          <p:cNvPr id="2" name="Title 1">
-            <a:extLst>
-              <a:ext uri="{FF2B5EF4-FFF2-40B4-BE49-F238E27FC236}">
-                <a16:creationId xmlns:a16="http://schemas.microsoft.com/office/drawing/2014/main" id="{9C84FB5B-3548-57AF-0BDE-3735ECDD4D50}"/>
-              </a:ext>
-            </a:extLst>
-          </p:cNvPr>
-          <p:cNvSpPr>
-            <a:spLocks noGrp="1"/>
-          </p:cNvSpPr>
-          <p:nvPr>
-            <p:ph type="title"/>
-          </p:nvPr>
-        </p:nvSpPr>
-        <p:spPr>
-          <a:xfrm>
-            <a:off x="0" y="0"/>
-            <a:ext cx="4664765" cy="1603513"/>
-          </a:xfrm>
-        </p:spPr>
-        <p:txBody>
-          <a:bodyPr/>
-          <a:lstStyle/>
-          <a:p>
-            <a:r>
-              <a:rPr lang="en-US" dirty="0" err="1"/>
-              <a:t>S_maltophilia</a:t>
-            </a:r>
-            <a:r>
-              <a:rPr lang="en-US" dirty="0"/>
-              <a:t> data transformation</a:t>
-            </a:r>
-          </a:p>
-        </p:txBody>
-      </p:sp>
-    </p:spTree>
-    <p:extLst>
-      <p:ext uri="{BB962C8B-B14F-4D97-AF65-F5344CB8AC3E}">
-        <p14:creationId xmlns:p14="http://schemas.microsoft.com/office/powerpoint/2010/main" val="593966935"/>
-      </p:ext>
-    </p:extLst>
-  </p:cSld>
-  <p:clrMapOvr>
-    <a:masterClrMapping/>
-  </p:clrMapOvr>
-</p:sld>
-</file>
-
-<file path=ppt/slides/slide26.xml><?xml version="1.0" encoding="utf-8"?>
-<p:sld xmlns:a="http://schemas.openxmlformats.org/drawingml/2006/main" xmlns:r="http://schemas.openxmlformats.org/officeDocument/2006/relationships" xmlns:p="http://schemas.openxmlformats.org/presentationml/2006/main">
-  <p:cSld>
-    <p:spTree>
-      <p:nvGrpSpPr>
-        <p:cNvPr id="1" name=""/>
-        <p:cNvGrpSpPr/>
-        <p:nvPr/>
-      </p:nvGrpSpPr>
-      <p:grpSpPr>
-        <a:xfrm>
-          <a:off x="0" y="0"/>
-          <a:ext cx="0" cy="0"/>
-          <a:chOff x="0" y="0"/>
-          <a:chExt cx="0" cy="0"/>
-        </a:xfrm>
-      </p:grpSpPr>
-      <p:sp>
-        <p:nvSpPr>
-          <p:cNvPr id="2" name="Title 1">
-            <a:extLst>
-              <a:ext uri="{FF2B5EF4-FFF2-40B4-BE49-F238E27FC236}">
-                <a16:creationId xmlns:a16="http://schemas.microsoft.com/office/drawing/2014/main" id="{3E4A6795-1948-05E4-E562-AFED99BDA8EB}"/>
-              </a:ext>
-            </a:extLst>
-          </p:cNvPr>
-          <p:cNvSpPr>
-            <a:spLocks noGrp="1"/>
-          </p:cNvSpPr>
-          <p:nvPr>
-            <p:ph type="title"/>
-          </p:nvPr>
-        </p:nvSpPr>
-        <p:spPr>
-          <a:xfrm>
-            <a:off x="165093" y="365124"/>
-            <a:ext cx="2802278" cy="3063875"/>
-          </a:xfrm>
-        </p:spPr>
-        <p:txBody>
-          <a:bodyPr>
-            <a:normAutofit/>
-          </a:bodyPr>
-          <a:lstStyle/>
-          <a:p>
-            <a:r>
-              <a:rPr lang="en-US" sz="3200" dirty="0"/>
-              <a:t>P. aeruginosa water full </a:t>
-            </a:r>
-            <a:r>
-              <a:rPr lang="en-US" sz="3200" dirty="0" err="1"/>
-              <a:t>glm</a:t>
-            </a:r>
-            <a:br>
-              <a:rPr lang="en-US" sz="3200" dirty="0"/>
-            </a:br>
-            <a:r>
-              <a:rPr lang="en-US" sz="3200" dirty="0"/>
-              <a:t>-nothing significant</a:t>
-            </a:r>
-          </a:p>
-        </p:txBody>
-      </p:sp>
-      <p:pic>
-        <p:nvPicPr>
-          <p:cNvPr id="5" name="Picture 4">
-            <a:extLst>
-              <a:ext uri="{FF2B5EF4-FFF2-40B4-BE49-F238E27FC236}">
-                <a16:creationId xmlns:a16="http://schemas.microsoft.com/office/drawing/2014/main" id="{196C53B4-D1B6-15E1-D3AF-41F9C3B583E9}"/>
-              </a:ext>
-            </a:extLst>
-          </p:cNvPr>
-          <p:cNvPicPr>
-            <a:picLocks noChangeAspect="1"/>
-          </p:cNvPicPr>
-          <p:nvPr/>
-        </p:nvPicPr>
-        <p:blipFill>
-          <a:blip r:embed="rId2"/>
-          <a:stretch>
-            <a:fillRect/>
-          </a:stretch>
-        </p:blipFill>
-        <p:spPr>
-          <a:xfrm>
-            <a:off x="3271171" y="605291"/>
-            <a:ext cx="8535504" cy="4635575"/>
-          </a:xfrm>
-          <a:prstGeom prst="rect">
-            <a:avLst/>
-          </a:prstGeom>
-        </p:spPr>
-      </p:pic>
-    </p:spTree>
-    <p:extLst>
-      <p:ext uri="{BB962C8B-B14F-4D97-AF65-F5344CB8AC3E}">
-        <p14:creationId xmlns:p14="http://schemas.microsoft.com/office/powerpoint/2010/main" val="1203665239"/>
-      </p:ext>
-    </p:extLst>
-  </p:cSld>
-  <p:clrMapOvr>
-    <a:masterClrMapping/>
-  </p:clrMapOvr>
-</p:sld>
-</file>
-
-<file path=ppt/slides/slide27.xml><?xml version="1.0" encoding="utf-8"?>
-<p:sld xmlns:a="http://schemas.openxmlformats.org/drawingml/2006/main" xmlns:r="http://schemas.openxmlformats.org/officeDocument/2006/relationships" xmlns:p="http://schemas.openxmlformats.org/presentationml/2006/main">
-  <p:cSld>
-    <p:spTree>
-      <p:nvGrpSpPr>
-        <p:cNvPr id="1" name=""/>
-        <p:cNvGrpSpPr/>
-        <p:nvPr/>
-      </p:nvGrpSpPr>
-      <p:grpSpPr>
-        <a:xfrm>
-          <a:off x="0" y="0"/>
-          <a:ext cx="0" cy="0"/>
-          <a:chOff x="0" y="0"/>
-          <a:chExt cx="0" cy="0"/>
-        </a:xfrm>
-      </p:grpSpPr>
-      <p:sp>
-        <p:nvSpPr>
-          <p:cNvPr id="2" name="Title 1">
-            <a:extLst>
-              <a:ext uri="{FF2B5EF4-FFF2-40B4-BE49-F238E27FC236}">
-                <a16:creationId xmlns:a16="http://schemas.microsoft.com/office/drawing/2014/main" id="{3E4A6795-1948-05E4-E562-AFED99BDA8EB}"/>
-              </a:ext>
-            </a:extLst>
-          </p:cNvPr>
-          <p:cNvSpPr>
-            <a:spLocks noGrp="1"/>
-          </p:cNvSpPr>
-          <p:nvPr>
-            <p:ph type="title"/>
-          </p:nvPr>
-        </p:nvSpPr>
-        <p:spPr>
-          <a:xfrm>
-            <a:off x="165093" y="365124"/>
-            <a:ext cx="2802278" cy="3063875"/>
-          </a:xfrm>
-        </p:spPr>
-        <p:txBody>
-          <a:bodyPr>
-            <a:normAutofit/>
-          </a:bodyPr>
-          <a:lstStyle/>
-          <a:p>
-            <a:r>
-              <a:rPr lang="en-US" sz="3200" dirty="0"/>
-              <a:t>P. aeruginosa water step</a:t>
-            </a:r>
-            <a:br>
-              <a:rPr lang="en-US" sz="3200" dirty="0"/>
-            </a:br>
-            <a:r>
-              <a:rPr lang="en-US" sz="3200" dirty="0"/>
-              <a:t>-still nothing significant</a:t>
-            </a:r>
-          </a:p>
-        </p:txBody>
-      </p:sp>
-      <p:pic>
-        <p:nvPicPr>
-          <p:cNvPr id="4" name="Picture 3">
-            <a:extLst>
-              <a:ext uri="{FF2B5EF4-FFF2-40B4-BE49-F238E27FC236}">
-                <a16:creationId xmlns:a16="http://schemas.microsoft.com/office/drawing/2014/main" id="{EE579431-4984-DD87-CD21-D8A00CC57FFB}"/>
-              </a:ext>
-            </a:extLst>
-          </p:cNvPr>
-          <p:cNvPicPr>
-            <a:picLocks noChangeAspect="1"/>
-          </p:cNvPicPr>
-          <p:nvPr/>
-        </p:nvPicPr>
-        <p:blipFill>
-          <a:blip r:embed="rId2"/>
-          <a:stretch>
-            <a:fillRect/>
-          </a:stretch>
-        </p:blipFill>
-        <p:spPr>
-          <a:xfrm>
-            <a:off x="3711452" y="990474"/>
-            <a:ext cx="8461645" cy="4326593"/>
-          </a:xfrm>
-          <a:prstGeom prst="rect">
-            <a:avLst/>
-          </a:prstGeom>
-        </p:spPr>
-      </p:pic>
-    </p:spTree>
-    <p:extLst>
-      <p:ext uri="{BB962C8B-B14F-4D97-AF65-F5344CB8AC3E}">
-        <p14:creationId xmlns:p14="http://schemas.microsoft.com/office/powerpoint/2010/main" val="866700415"/>
-      </p:ext>
-    </p:extLst>
-  </p:cSld>
-  <p:clrMapOvr>
-    <a:masterClrMapping/>
-  </p:clrMapOvr>
-</p:sld>
-</file>
-
-<file path=ppt/slides/slide28.xml><?xml version="1.0" encoding="utf-8"?>
-<p:sld xmlns:a="http://schemas.openxmlformats.org/drawingml/2006/main" xmlns:r="http://schemas.openxmlformats.org/officeDocument/2006/relationships" xmlns:p="http://schemas.openxmlformats.org/presentationml/2006/main">
-  <p:cSld>
-    <p:spTree>
-      <p:nvGrpSpPr>
-        <p:cNvPr id="1" name=""/>
-        <p:cNvGrpSpPr/>
-        <p:nvPr/>
-      </p:nvGrpSpPr>
-      <p:grpSpPr>
-        <a:xfrm>
-          <a:off x="0" y="0"/>
-          <a:ext cx="0" cy="0"/>
-          <a:chOff x="0" y="0"/>
-          <a:chExt cx="0" cy="0"/>
-        </a:xfrm>
-      </p:grpSpPr>
-      <p:sp>
-        <p:nvSpPr>
-          <p:cNvPr id="2" name="Title 1">
-            <a:extLst>
-              <a:ext uri="{FF2B5EF4-FFF2-40B4-BE49-F238E27FC236}">
-                <a16:creationId xmlns:a16="http://schemas.microsoft.com/office/drawing/2014/main" id="{8AB59B44-7BB9-902F-4C8B-95F41F33EC3F}"/>
-              </a:ext>
-            </a:extLst>
-          </p:cNvPr>
-          <p:cNvSpPr>
-            <a:spLocks noGrp="1"/>
-          </p:cNvSpPr>
-          <p:nvPr>
-            <p:ph type="title"/>
-          </p:nvPr>
-        </p:nvSpPr>
-        <p:spPr/>
-        <p:txBody>
-          <a:bodyPr/>
-          <a:lstStyle/>
-          <a:p>
-            <a:r>
-              <a:rPr lang="en-US" dirty="0"/>
-              <a:t>Overall Results</a:t>
-            </a:r>
-          </a:p>
-        </p:txBody>
-      </p:sp>
-      <p:sp>
-        <p:nvSpPr>
-          <p:cNvPr id="3" name="Content Placeholder 2">
-            <a:extLst>
-              <a:ext uri="{FF2B5EF4-FFF2-40B4-BE49-F238E27FC236}">
-                <a16:creationId xmlns:a16="http://schemas.microsoft.com/office/drawing/2014/main" id="{21BB0896-5C7C-7A5B-F01C-18AE86E60326}"/>
-              </a:ext>
-            </a:extLst>
-          </p:cNvPr>
-          <p:cNvSpPr>
-            <a:spLocks noGrp="1"/>
-          </p:cNvSpPr>
-          <p:nvPr>
-            <p:ph idx="1"/>
-          </p:nvPr>
-        </p:nvSpPr>
-        <p:spPr/>
-        <p:txBody>
-          <a:bodyPr>
-            <a:normAutofit fontScale="92500" lnSpcReduction="20000"/>
-          </a:bodyPr>
-          <a:lstStyle/>
-          <a:p>
-            <a:r>
-              <a:rPr lang="en-US" dirty="0"/>
-              <a:t>Microplastics--Not sure how much detail you need.</a:t>
-            </a:r>
-          </a:p>
-          <a:p>
-            <a:pPr lvl="1"/>
-            <a:r>
-              <a:rPr lang="en-US" dirty="0"/>
-              <a:t>Time is significant for all the responses (p value in full model is significant and/or kept in the stepwise regression).</a:t>
-            </a:r>
-          </a:p>
-          <a:p>
-            <a:pPr lvl="1"/>
-            <a:r>
-              <a:rPr lang="en-US" dirty="0"/>
-              <a:t>LDPE often differentiates itself from other plastics (significant in 3 of the 4, still the lowest p value in the 4</a:t>
-            </a:r>
-            <a:r>
-              <a:rPr lang="en-US" baseline="30000" dirty="0"/>
-              <a:t>th</a:t>
-            </a:r>
-            <a:r>
-              <a:rPr lang="en-US" dirty="0"/>
-              <a:t>), but plastic type gets dropped in the stepwise for all but sul1. (Might be different with less plastic levels in the factor)</a:t>
-            </a:r>
-          </a:p>
-          <a:p>
-            <a:pPr lvl="1"/>
-            <a:r>
-              <a:rPr lang="en-US" dirty="0"/>
-              <a:t>Water type different for sul1 only, but I have not deleted the fb data at this point.</a:t>
-            </a:r>
-          </a:p>
-          <a:p>
-            <a:r>
-              <a:rPr lang="en-US" dirty="0"/>
-              <a:t>Water—</a:t>
-            </a:r>
-          </a:p>
-          <a:p>
-            <a:pPr lvl="1"/>
-            <a:r>
-              <a:rPr lang="en-US" dirty="0"/>
-              <a:t>S. </a:t>
-            </a:r>
-            <a:r>
-              <a:rPr lang="en-US" dirty="0" err="1"/>
-              <a:t>multophilia</a:t>
-            </a:r>
-            <a:r>
-              <a:rPr lang="en-US" dirty="0"/>
-              <a:t> there is a time trend but no difference between the water treatments.</a:t>
-            </a:r>
-          </a:p>
-          <a:p>
-            <a:pPr lvl="1"/>
-            <a:r>
-              <a:rPr lang="en-US" dirty="0"/>
-              <a:t>Int1 and sul1 both show time trends and water differences.</a:t>
-            </a:r>
-          </a:p>
-          <a:p>
-            <a:pPr lvl="1"/>
-            <a:r>
-              <a:rPr lang="en-US" dirty="0"/>
-              <a:t>P. aeruginosa no time trend or difference between the water treatments</a:t>
-            </a:r>
-          </a:p>
-          <a:p>
-            <a:r>
-              <a:rPr lang="en-US" dirty="0"/>
-              <a:t>Presumably time trends in the water may possibly be a bit of a confounding variable for interpreting the accumulation on microplastics over time.</a:t>
-            </a:r>
-          </a:p>
-        </p:txBody>
-      </p:sp>
-    </p:spTree>
-    <p:extLst>
-      <p:ext uri="{BB962C8B-B14F-4D97-AF65-F5344CB8AC3E}">
-        <p14:creationId xmlns:p14="http://schemas.microsoft.com/office/powerpoint/2010/main" val="1199600328"/>
-      </p:ext>
-    </p:extLst>
-  </p:cSld>
-  <p:clrMapOvr>
-    <a:masterClrMapping/>
-  </p:clrMapOvr>
-</p:sld>
-</file>
-
-<file path=ppt/slides/slide3.xml><?xml version="1.0" encoding="utf-8"?>
-<p:sld xmlns:a="http://schemas.openxmlformats.org/drawingml/2006/main" xmlns:r="http://schemas.openxmlformats.org/officeDocument/2006/relationships" xmlns:p="http://schemas.openxmlformats.org/presentationml/2006/main">
-  <p:cSld>
-    <p:spTree>
-      <p:nvGrpSpPr>
-        <p:cNvPr id="1" name=""/>
-        <p:cNvGrpSpPr/>
-        <p:nvPr/>
-      </p:nvGrpSpPr>
-      <p:grpSpPr>
-        <a:xfrm>
-          <a:off x="0" y="0"/>
-          <a:ext cx="0" cy="0"/>
-          <a:chOff x="0" y="0"/>
-          <a:chExt cx="0" cy="0"/>
-        </a:xfrm>
-      </p:grpSpPr>
-      <p:sp>
-        <p:nvSpPr>
-          <p:cNvPr id="2" name="Title 1">
-            <a:extLst>
-              <a:ext uri="{FF2B5EF4-FFF2-40B4-BE49-F238E27FC236}">
-                <a16:creationId xmlns:a16="http://schemas.microsoft.com/office/drawing/2014/main" id="{9C84FB5B-3548-57AF-0BDE-3735ECDD4D50}"/>
-              </a:ext>
-            </a:extLst>
-          </p:cNvPr>
-          <p:cNvSpPr>
-            <a:spLocks noGrp="1"/>
-          </p:cNvSpPr>
-          <p:nvPr>
-            <p:ph type="title"/>
-          </p:nvPr>
-        </p:nvSpPr>
-        <p:spPr>
-          <a:xfrm>
-            <a:off x="106878" y="296883"/>
-            <a:ext cx="6038602" cy="938151"/>
-          </a:xfrm>
-        </p:spPr>
-        <p:txBody>
-          <a:bodyPr>
-            <a:normAutofit fontScale="90000"/>
-          </a:bodyPr>
-          <a:lstStyle/>
-          <a:p>
-            <a:r>
-              <a:rPr lang="en-US" dirty="0"/>
-              <a:t>Microplastics: </a:t>
-            </a:r>
-            <a:r>
-              <a:rPr lang="en-US" dirty="0" err="1"/>
-              <a:t>S_maltophilia</a:t>
-            </a:r>
-            <a:r>
-              <a:rPr lang="en-US" dirty="0"/>
-              <a:t> data transformation</a:t>
-            </a:r>
-          </a:p>
-        </p:txBody>
-      </p:sp>
-      <p:sp>
-        <p:nvSpPr>
-          <p:cNvPr id="3" name="Title 1">
-            <a:extLst>
-              <a:ext uri="{FF2B5EF4-FFF2-40B4-BE49-F238E27FC236}">
-                <a16:creationId xmlns:a16="http://schemas.microsoft.com/office/drawing/2014/main" id="{246097DE-5335-6BB6-24A4-609029F00200}"/>
-              </a:ext>
-            </a:extLst>
-          </p:cNvPr>
-          <p:cNvSpPr txBox="1">
-            <a:spLocks/>
-          </p:cNvSpPr>
-          <p:nvPr/>
-        </p:nvSpPr>
-        <p:spPr>
-          <a:xfrm>
-            <a:off x="1440241" y="1838870"/>
+            <a:off x="106878" y="1524174"/>
             <a:ext cx="3143634" cy="3362521"/>
           </a:xfrm>
           <a:prstGeom prst="rect">
@@ -5793,7 +5899,7 @@
         </p:spPr>
         <p:txBody>
           <a:bodyPr vert="horz" lIns="91440" tIns="45720" rIns="91440" bIns="45720" rtlCol="0" anchor="ctr">
-            <a:normAutofit fontScale="77500" lnSpcReduction="20000"/>
+            <a:noAutofit/>
           </a:bodyPr>
           <a:lstStyle>
             <a:lvl1pPr algn="l" defTabSz="914400" rtl="0" eaLnBrk="1" latinLnBrk="0" hangingPunct="1">
@@ -5816,25 +5922,25 @@
           </a:lstStyle>
           <a:p>
             <a:r>
-              <a:rPr lang="en-US" sz="2800" dirty="0"/>
+              <a:rPr lang="en-US" sz="2000" dirty="0"/>
               <a:t>-Shapiro-Wilks normality statistic (W), range from 0 to 1, with 1 being perfectly normal</a:t>
             </a:r>
           </a:p>
           <a:p>
             <a:r>
-              <a:rPr lang="en-US" sz="2800" dirty="0"/>
+              <a:rPr lang="en-US" sz="2000" dirty="0"/>
               <a:t>-All transformations fail normality at p&lt;0.05</a:t>
             </a:r>
           </a:p>
           <a:p>
             <a:r>
-              <a:rPr lang="en-US" sz="2800" dirty="0"/>
+              <a:rPr lang="en-US" sz="2000" dirty="0"/>
               <a:t>-The box-cox transformation does a bit better inducing normality</a:t>
             </a:r>
           </a:p>
           <a:p>
             <a:r>
-              <a:rPr lang="en-US" sz="2800" dirty="0"/>
+              <a:rPr lang="en-US" sz="2000" dirty="0"/>
               <a:t>-ln and log10 essentially equivalent, not too far behind</a:t>
             </a:r>
           </a:p>
@@ -5842,10 +5948,10 @@
       </p:sp>
       <p:pic>
         <p:nvPicPr>
-          <p:cNvPr id="6" name="Picture 5">
-            <a:extLst>
-              <a:ext uri="{FF2B5EF4-FFF2-40B4-BE49-F238E27FC236}">
-                <a16:creationId xmlns:a16="http://schemas.microsoft.com/office/drawing/2014/main" id="{EF0D6DFE-E91D-4908-30F7-7426BD28C645}"/>
+          <p:cNvPr id="5" name="Picture 4">
+            <a:extLst>
+              <a:ext uri="{FF2B5EF4-FFF2-40B4-BE49-F238E27FC236}">
+                <a16:creationId xmlns:a16="http://schemas.microsoft.com/office/drawing/2014/main" id="{7A020331-2431-8D00-9559-B3835322D9C4}"/>
               </a:ext>
             </a:extLst>
           </p:cNvPr>
@@ -5862,8 +5968,8 @@
         </p:blipFill>
         <p:spPr>
           <a:xfrm>
-            <a:off x="6038965" y="-47501"/>
-            <a:ext cx="5870638" cy="6858000"/>
+            <a:off x="3319152" y="389154"/>
+            <a:ext cx="8499701" cy="5708825"/>
           </a:xfrm>
           <a:prstGeom prst="rect">
             <a:avLst/>
@@ -5874,139 +5980,6 @@
     <p:extLst>
       <p:ext uri="{BB962C8B-B14F-4D97-AF65-F5344CB8AC3E}">
         <p14:creationId xmlns:p14="http://schemas.microsoft.com/office/powerpoint/2010/main" val="4013227324"/>
-      </p:ext>
-    </p:extLst>
-  </p:cSld>
-  <p:clrMapOvr>
-    <a:masterClrMapping/>
-  </p:clrMapOvr>
-</p:sld>
-</file>
-
-<file path=ppt/slides/slide4.xml><?xml version="1.0" encoding="utf-8"?>
-<p:sld xmlns:a="http://schemas.openxmlformats.org/drawingml/2006/main" xmlns:r="http://schemas.openxmlformats.org/officeDocument/2006/relationships" xmlns:p="http://schemas.openxmlformats.org/presentationml/2006/main">
-  <p:cSld>
-    <p:spTree>
-      <p:nvGrpSpPr>
-        <p:cNvPr id="1" name=""/>
-        <p:cNvGrpSpPr/>
-        <p:nvPr/>
-      </p:nvGrpSpPr>
-      <p:grpSpPr>
-        <a:xfrm>
-          <a:off x="0" y="0"/>
-          <a:ext cx="0" cy="0"/>
-          <a:chOff x="0" y="0"/>
-          <a:chExt cx="0" cy="0"/>
-        </a:xfrm>
-      </p:grpSpPr>
-      <p:sp>
-        <p:nvSpPr>
-          <p:cNvPr id="2" name="Title 1">
-            <a:extLst>
-              <a:ext uri="{FF2B5EF4-FFF2-40B4-BE49-F238E27FC236}">
-                <a16:creationId xmlns:a16="http://schemas.microsoft.com/office/drawing/2014/main" id="{3E4A6795-1948-05E4-E562-AFED99BDA8EB}"/>
-              </a:ext>
-            </a:extLst>
-          </p:cNvPr>
-          <p:cNvSpPr>
-            <a:spLocks noGrp="1"/>
-          </p:cNvSpPr>
-          <p:nvPr>
-            <p:ph type="title"/>
-          </p:nvPr>
-        </p:nvSpPr>
-        <p:spPr>
-          <a:xfrm>
-            <a:off x="0" y="248742"/>
-            <a:ext cx="2967371" cy="3180258"/>
-          </a:xfrm>
-        </p:spPr>
-        <p:txBody>
-          <a:bodyPr>
-            <a:normAutofit/>
-          </a:bodyPr>
-          <a:lstStyle/>
-          <a:p>
-            <a:r>
-              <a:rPr lang="en-US" sz="2800" dirty="0"/>
-              <a:t>S </a:t>
-            </a:r>
-            <a:r>
-              <a:rPr lang="en-US" sz="2800" dirty="0" err="1"/>
-              <a:t>maltophilia</a:t>
-            </a:r>
-            <a:r>
-              <a:rPr lang="en-US" sz="2800" dirty="0"/>
-              <a:t> </a:t>
-            </a:r>
-            <a:r>
-              <a:rPr lang="en-US" sz="2800" dirty="0" err="1"/>
-              <a:t>mp</a:t>
-            </a:r>
-            <a:r>
-              <a:rPr lang="en-US" sz="2800" dirty="0"/>
-              <a:t> full </a:t>
-            </a:r>
-            <a:r>
-              <a:rPr lang="en-US" sz="2800" dirty="0" err="1"/>
-              <a:t>glm</a:t>
-            </a:r>
-            <a:r>
-              <a:rPr lang="en-US" sz="2800" dirty="0"/>
-              <a:t> (Box Cox)</a:t>
-            </a:r>
-            <a:br>
-              <a:rPr lang="en-US" sz="2800" dirty="0"/>
-            </a:br>
-            <a:r>
-              <a:rPr lang="en-US" sz="2800" dirty="0"/>
-              <a:t>-time linear</a:t>
-            </a:r>
-            <a:br>
-              <a:rPr lang="en-US" sz="2800" dirty="0"/>
-            </a:br>
-            <a:r>
-              <a:rPr lang="en-US" sz="2800" dirty="0"/>
-              <a:t>-water treatment effect</a:t>
-            </a:r>
-          </a:p>
-        </p:txBody>
-      </p:sp>
-      <p:pic>
-        <p:nvPicPr>
-          <p:cNvPr id="4" name="Picture 3">
-            <a:extLst>
-              <a:ext uri="{FF2B5EF4-FFF2-40B4-BE49-F238E27FC236}">
-                <a16:creationId xmlns:a16="http://schemas.microsoft.com/office/drawing/2014/main" id="{C418A6DF-3876-3AC5-D105-8D78D20CCF2E}"/>
-              </a:ext>
-            </a:extLst>
-          </p:cNvPr>
-          <p:cNvPicPr>
-            <a:picLocks noChangeAspect="1"/>
-          </p:cNvPicPr>
-          <p:nvPr/>
-        </p:nvPicPr>
-        <p:blipFill>
-          <a:blip r:embed="rId2"/>
-          <a:stretch>
-            <a:fillRect/>
-          </a:stretch>
-        </p:blipFill>
-        <p:spPr>
-          <a:xfrm>
-            <a:off x="3071044" y="248741"/>
-            <a:ext cx="9120956" cy="6360515"/>
-          </a:xfrm>
-          <a:prstGeom prst="rect">
-            <a:avLst/>
-          </a:prstGeom>
-        </p:spPr>
-      </p:pic>
-    </p:spTree>
-    <p:extLst>
-      <p:ext uri="{BB962C8B-B14F-4D97-AF65-F5344CB8AC3E}">
-        <p14:creationId xmlns:p14="http://schemas.microsoft.com/office/powerpoint/2010/main" val="2366229804"/>
       </p:ext>
     </p:extLst>
   </p:cSld>
@@ -6038,7 +6011,7 @@
           <p:cNvPr id="2" name="Title 1">
             <a:extLst>
               <a:ext uri="{FF2B5EF4-FFF2-40B4-BE49-F238E27FC236}">
-                <a16:creationId xmlns:a16="http://schemas.microsoft.com/office/drawing/2014/main" id="{3E4A6795-1948-05E4-E562-AFED99BDA8EB}"/>
+                <a16:creationId xmlns:a16="http://schemas.microsoft.com/office/drawing/2014/main" id="{6033E2CD-3B38-B2CD-FA4F-FFF1AE6768E6}"/>
               </a:ext>
             </a:extLst>
           </p:cNvPr>
@@ -6049,62 +6022,74 @@
             <p:ph type="title"/>
           </p:nvPr>
         </p:nvSpPr>
-        <p:spPr>
-          <a:xfrm>
-            <a:off x="165093" y="365124"/>
-            <a:ext cx="2802278" cy="3063875"/>
-          </a:xfrm>
-        </p:spPr>
-        <p:txBody>
-          <a:bodyPr>
-            <a:normAutofit/>
-          </a:bodyPr>
-          <a:lstStyle/>
-          <a:p>
-            <a:r>
-              <a:rPr lang="en-US" sz="3200" dirty="0"/>
+        <p:spPr/>
+        <p:txBody>
+          <a:bodyPr/>
+          <a:lstStyle/>
+          <a:p>
+            <a:r>
+              <a:rPr lang="en-US" sz="4400" dirty="0"/>
               <a:t>S </a:t>
             </a:r>
             <a:r>
-              <a:rPr lang="en-US" sz="3200" dirty="0" err="1"/>
+              <a:rPr lang="en-US" sz="4400" dirty="0" err="1"/>
               <a:t>maltophilia</a:t>
             </a:r>
             <a:r>
-              <a:rPr lang="en-US" sz="3200" dirty="0"/>
+              <a:rPr lang="en-US" sz="4400" dirty="0"/>
               <a:t> </a:t>
             </a:r>
             <a:r>
-              <a:rPr lang="en-US" sz="3200" dirty="0" err="1"/>
+              <a:rPr lang="en-US" sz="4400" dirty="0" err="1"/>
               <a:t>mp</a:t>
             </a:r>
             <a:r>
-              <a:rPr lang="en-US" sz="3200" dirty="0"/>
+              <a:rPr lang="en-US" sz="4400" dirty="0"/>
               <a:t> </a:t>
             </a:r>
             <a:r>
-              <a:rPr lang="en-US" sz="3200" dirty="0" err="1"/>
+              <a:rPr lang="en-US" sz="4400" dirty="0" err="1"/>
               <a:t>glm</a:t>
             </a:r>
             <a:r>
-              <a:rPr lang="en-US" sz="3200" dirty="0"/>
-              <a:t> step</a:t>
-            </a:r>
-            <a:br>
-              <a:rPr lang="en-US" sz="3200" dirty="0"/>
-            </a:br>
-            <a:r>
-              <a:rPr lang="en-US" sz="3200" dirty="0"/>
-              <a:t>-time and water treatment variable kept</a:t>
-            </a:r>
+              <a:rPr lang="en-US" sz="4400" dirty="0"/>
+              <a:t> full model</a:t>
+            </a:r>
+            <a:endParaRPr lang="en-US" dirty="0"/>
+          </a:p>
+        </p:txBody>
+      </p:sp>
+      <p:sp>
+        <p:nvSpPr>
+          <p:cNvPr id="3" name="Content Placeholder 2">
+            <a:extLst>
+              <a:ext uri="{FF2B5EF4-FFF2-40B4-BE49-F238E27FC236}">
+                <a16:creationId xmlns:a16="http://schemas.microsoft.com/office/drawing/2014/main" id="{E5E1B320-668C-B33E-59D6-A8DB161D2280}"/>
+              </a:ext>
+            </a:extLst>
+          </p:cNvPr>
+          <p:cNvSpPr>
+            <a:spLocks noGrp="1"/>
+          </p:cNvSpPr>
+          <p:nvPr>
+            <p:ph idx="1"/>
+          </p:nvPr>
+        </p:nvSpPr>
+        <p:spPr/>
+        <p:txBody>
+          <a:bodyPr/>
+          <a:lstStyle/>
+          <a:p>
+            <a:endParaRPr lang="en-US"/>
           </a:p>
         </p:txBody>
       </p:sp>
       <p:pic>
         <p:nvPicPr>
-          <p:cNvPr id="4" name="Picture 3">
-            <a:extLst>
-              <a:ext uri="{FF2B5EF4-FFF2-40B4-BE49-F238E27FC236}">
-                <a16:creationId xmlns:a16="http://schemas.microsoft.com/office/drawing/2014/main" id="{A77D2CE5-7B61-9ECD-EFB3-10B87507648B}"/>
+          <p:cNvPr id="5" name="Picture 4">
+            <a:extLst>
+              <a:ext uri="{FF2B5EF4-FFF2-40B4-BE49-F238E27FC236}">
+                <a16:creationId xmlns:a16="http://schemas.microsoft.com/office/drawing/2014/main" id="{29CA2DB1-E707-C177-FEAF-6E1607A8D9E5}"/>
               </a:ext>
             </a:extLst>
           </p:cNvPr>
@@ -6121,8 +6106,8 @@
         </p:blipFill>
         <p:spPr>
           <a:xfrm>
-            <a:off x="2967371" y="365123"/>
-            <a:ext cx="9035352" cy="4869485"/>
+            <a:off x="3511416" y="1635033"/>
+            <a:ext cx="6998733" cy="4857842"/>
           </a:xfrm>
           <a:prstGeom prst="rect">
             <a:avLst/>
@@ -6132,7 +6117,7 @@
     </p:spTree>
     <p:extLst>
       <p:ext uri="{BB962C8B-B14F-4D97-AF65-F5344CB8AC3E}">
-        <p14:creationId xmlns:p14="http://schemas.microsoft.com/office/powerpoint/2010/main" val="3891756154"/>
+        <p14:creationId xmlns:p14="http://schemas.microsoft.com/office/powerpoint/2010/main" val="4044919194"/>
       </p:ext>
     </p:extLst>
   </p:cSld>
@@ -6164,7 +6149,7 @@
           <p:cNvPr id="2" name="Title 1">
             <a:extLst>
               <a:ext uri="{FF2B5EF4-FFF2-40B4-BE49-F238E27FC236}">
-                <a16:creationId xmlns:a16="http://schemas.microsoft.com/office/drawing/2014/main" id="{9C84FB5B-3548-57AF-0BDE-3735ECDD4D50}"/>
+                <a16:creationId xmlns:a16="http://schemas.microsoft.com/office/drawing/2014/main" id="{3E4A6795-1948-05E4-E562-AFED99BDA8EB}"/>
               </a:ext>
             </a:extLst>
           </p:cNvPr>
@@ -6177,25 +6162,118 @@
         </p:nvSpPr>
         <p:spPr>
           <a:xfrm>
-            <a:off x="0" y="0"/>
-            <a:ext cx="4664765" cy="1603513"/>
+            <a:off x="165093" y="365124"/>
+            <a:ext cx="2802278" cy="3063875"/>
           </a:xfrm>
         </p:spPr>
         <p:txBody>
-          <a:bodyPr/>
-          <a:lstStyle/>
-          <a:p>
-            <a:r>
-              <a:rPr lang="en-US" dirty="0"/>
-              <a:t>intI1 data transformation</a:t>
-            </a:r>
-          </a:p>
-        </p:txBody>
-      </p:sp>
+          <a:bodyPr>
+            <a:normAutofit/>
+          </a:bodyPr>
+          <a:lstStyle/>
+          <a:p>
+            <a:r>
+              <a:rPr lang="en-US" sz="3200" dirty="0"/>
+              <a:t>S </a:t>
+            </a:r>
+            <a:r>
+              <a:rPr lang="en-US" sz="3200" dirty="0" err="1"/>
+              <a:t>maltophilia</a:t>
+            </a:r>
+            <a:r>
+              <a:rPr lang="en-US" sz="3200" dirty="0"/>
+              <a:t> </a:t>
+            </a:r>
+            <a:r>
+              <a:rPr lang="en-US" sz="3200" dirty="0" err="1"/>
+              <a:t>mp</a:t>
+            </a:r>
+            <a:r>
+              <a:rPr lang="en-US" sz="3200" dirty="0"/>
+              <a:t> </a:t>
+            </a:r>
+            <a:r>
+              <a:rPr lang="en-US" sz="3200" dirty="0" err="1"/>
+              <a:t>glm</a:t>
+            </a:r>
+            <a:r>
+              <a:rPr lang="en-US" sz="3200" dirty="0"/>
+              <a:t> step</a:t>
+            </a:r>
+            <a:br>
+              <a:rPr lang="en-US" sz="3200" dirty="0"/>
+            </a:br>
+            <a:r>
+              <a:rPr lang="en-US" sz="3200" dirty="0"/>
+              <a:t>-time and water treatment variable kept</a:t>
+            </a:r>
+          </a:p>
+        </p:txBody>
+      </p:sp>
+      <p:pic>
+        <p:nvPicPr>
+          <p:cNvPr id="5" name="Picture 4">
+            <a:extLst>
+              <a:ext uri="{FF2B5EF4-FFF2-40B4-BE49-F238E27FC236}">
+                <a16:creationId xmlns:a16="http://schemas.microsoft.com/office/drawing/2014/main" id="{E4347DE8-05D8-6632-E600-2A7659D602AC}"/>
+              </a:ext>
+            </a:extLst>
+          </p:cNvPr>
+          <p:cNvPicPr>
+            <a:picLocks noChangeAspect="1"/>
+          </p:cNvPicPr>
+          <p:nvPr/>
+        </p:nvPicPr>
+        <p:blipFill>
+          <a:blip r:embed="rId2"/>
+          <a:stretch>
+            <a:fillRect/>
+          </a:stretch>
+        </p:blipFill>
+        <p:spPr>
+          <a:xfrm>
+            <a:off x="165093" y="3428999"/>
+            <a:ext cx="5829600" cy="2463927"/>
+          </a:xfrm>
+          <a:prstGeom prst="rect">
+            <a:avLst/>
+          </a:prstGeom>
+        </p:spPr>
+      </p:pic>
+      <p:pic>
+        <p:nvPicPr>
+          <p:cNvPr id="7" name="Picture 6">
+            <a:extLst>
+              <a:ext uri="{FF2B5EF4-FFF2-40B4-BE49-F238E27FC236}">
+                <a16:creationId xmlns:a16="http://schemas.microsoft.com/office/drawing/2014/main" id="{D7AACE48-0E56-7181-9817-0B91E7D4AE90}"/>
+              </a:ext>
+            </a:extLst>
+          </p:cNvPr>
+          <p:cNvPicPr>
+            <a:picLocks noChangeAspect="1"/>
+          </p:cNvPicPr>
+          <p:nvPr/>
+        </p:nvPicPr>
+        <p:blipFill>
+          <a:blip r:embed="rId3"/>
+          <a:stretch>
+            <a:fillRect/>
+          </a:stretch>
+        </p:blipFill>
+        <p:spPr>
+          <a:xfrm>
+            <a:off x="6043140" y="524713"/>
+            <a:ext cx="5620347" cy="2972570"/>
+          </a:xfrm>
+          <a:prstGeom prst="rect">
+            <a:avLst/>
+          </a:prstGeom>
+        </p:spPr>
+      </p:pic>
     </p:spTree>
     <p:extLst>
       <p:ext uri="{BB962C8B-B14F-4D97-AF65-F5344CB8AC3E}">
-        <p14:creationId xmlns:p14="http://schemas.microsoft.com/office/powerpoint/2010/main" val="450193634"/>
+        <p14:creationId xmlns:p14="http://schemas.microsoft.com/office/powerpoint/2010/main" val="3891756154"/>
       </p:ext>
     </p:extLst>
   </p:cSld>
@@ -6227,7 +6305,7 @@
           <p:cNvPr id="2" name="Title 1">
             <a:extLst>
               <a:ext uri="{FF2B5EF4-FFF2-40B4-BE49-F238E27FC236}">
-                <a16:creationId xmlns:a16="http://schemas.microsoft.com/office/drawing/2014/main" id="{3E4A6795-1948-05E4-E562-AFED99BDA8EB}"/>
+                <a16:creationId xmlns:a16="http://schemas.microsoft.com/office/drawing/2014/main" id="{9C84FB5B-3548-57AF-0BDE-3735ECDD4D50}"/>
               </a:ext>
             </a:extLst>
           </p:cNvPr>
@@ -6240,59 +6318,29 @@
         </p:nvSpPr>
         <p:spPr>
           <a:xfrm>
-            <a:off x="165093" y="365124"/>
-            <a:ext cx="1790707" cy="3063875"/>
+            <a:off x="1" y="0"/>
+            <a:ext cx="2535382" cy="1603513"/>
           </a:xfrm>
         </p:spPr>
         <p:txBody>
           <a:bodyPr>
-            <a:normAutofit fontScale="90000"/>
+            <a:normAutofit/>
           </a:bodyPr>
           <a:lstStyle/>
           <a:p>
             <a:r>
-              <a:rPr lang="en-US" sz="3200" dirty="0"/>
-              <a:t>Int1 </a:t>
-            </a:r>
-            <a:r>
-              <a:rPr lang="en-US" sz="3200" dirty="0" err="1"/>
-              <a:t>mp</a:t>
-            </a:r>
-            <a:r>
-              <a:rPr lang="en-US" sz="3200" dirty="0"/>
-              <a:t> full </a:t>
-            </a:r>
-            <a:r>
-              <a:rPr lang="en-US" sz="3200" dirty="0" err="1"/>
-              <a:t>glm</a:t>
-            </a:r>
-            <a:br>
-              <a:rPr lang="en-US" sz="3200" dirty="0"/>
-            </a:br>
-            <a:r>
-              <a:rPr lang="en-US" sz="3200" dirty="0"/>
-              <a:t>-</a:t>
-            </a:r>
-            <a:r>
-              <a:rPr lang="en-US" sz="3200" dirty="0" err="1"/>
-              <a:t>ldpe</a:t>
-            </a:r>
-            <a:br>
-              <a:rPr lang="en-US" sz="3200" dirty="0"/>
-            </a:br>
-            <a:r>
-              <a:rPr lang="en-US" sz="3200" dirty="0"/>
-              <a:t>-evidence for time quadratic (p=0.1)</a:t>
+              <a:rPr lang="en-US" sz="2000" dirty="0"/>
+              <a:t>intI1 data transformation</a:t>
             </a:r>
           </a:p>
         </p:txBody>
       </p:sp>
       <p:pic>
         <p:nvPicPr>
-          <p:cNvPr id="6" name="Picture 5">
-            <a:extLst>
-              <a:ext uri="{FF2B5EF4-FFF2-40B4-BE49-F238E27FC236}">
-                <a16:creationId xmlns:a16="http://schemas.microsoft.com/office/drawing/2014/main" id="{CD297939-C625-6466-D30F-B51A5D100749}"/>
+          <p:cNvPr id="4" name="Picture 3">
+            <a:extLst>
+              <a:ext uri="{FF2B5EF4-FFF2-40B4-BE49-F238E27FC236}">
+                <a16:creationId xmlns:a16="http://schemas.microsoft.com/office/drawing/2014/main" id="{9A16E570-3B19-BB27-044F-B6DDF2B8187A}"/>
               </a:ext>
             </a:extLst>
           </p:cNvPr>
@@ -6309,8 +6357,8 @@
         </p:blipFill>
         <p:spPr>
           <a:xfrm>
-            <a:off x="2127579" y="230418"/>
-            <a:ext cx="9789262" cy="6262458"/>
+            <a:off x="2179122" y="356345"/>
+            <a:ext cx="9649296" cy="6280361"/>
           </a:xfrm>
           <a:prstGeom prst="rect">
             <a:avLst/>
@@ -6320,7 +6368,7 @@
     </p:spTree>
     <p:extLst>
       <p:ext uri="{BB962C8B-B14F-4D97-AF65-F5344CB8AC3E}">
-        <p14:creationId xmlns:p14="http://schemas.microsoft.com/office/powerpoint/2010/main" val="2898537562"/>
+        <p14:creationId xmlns:p14="http://schemas.microsoft.com/office/powerpoint/2010/main" val="450193634"/>
       </p:ext>
     </p:extLst>
   </p:cSld>
@@ -6352,7 +6400,7 @@
           <p:cNvPr id="2" name="Title 1">
             <a:extLst>
               <a:ext uri="{FF2B5EF4-FFF2-40B4-BE49-F238E27FC236}">
-                <a16:creationId xmlns:a16="http://schemas.microsoft.com/office/drawing/2014/main" id="{3E4A6795-1948-05E4-E562-AFED99BDA8EB}"/>
+                <a16:creationId xmlns:a16="http://schemas.microsoft.com/office/drawing/2014/main" id="{21F618E0-6833-2382-088A-8454E0D4DCAD}"/>
               </a:ext>
             </a:extLst>
           </p:cNvPr>
@@ -6363,74 +6411,64 @@
             <p:ph type="title"/>
           </p:nvPr>
         </p:nvSpPr>
-        <p:spPr>
-          <a:xfrm>
-            <a:off x="165093" y="365124"/>
-            <a:ext cx="2802278" cy="3063875"/>
-          </a:xfrm>
-        </p:spPr>
-        <p:txBody>
-          <a:bodyPr>
-            <a:normAutofit/>
-          </a:bodyPr>
-          <a:lstStyle/>
-          <a:p>
-            <a:r>
-              <a:rPr lang="en-US" sz="3200" dirty="0"/>
+        <p:spPr/>
+        <p:txBody>
+          <a:bodyPr/>
+          <a:lstStyle/>
+          <a:p>
+            <a:r>
+              <a:rPr lang="en-US" sz="4400" dirty="0"/>
               <a:t>Int1 </a:t>
             </a:r>
             <a:r>
-              <a:rPr lang="en-US" sz="3200" dirty="0" err="1"/>
+              <a:rPr lang="en-US" sz="4400" dirty="0" err="1"/>
               <a:t>mp</a:t>
             </a:r>
             <a:r>
-              <a:rPr lang="en-US" sz="3200" dirty="0"/>
-              <a:t> step</a:t>
-            </a:r>
-            <a:br>
-              <a:rPr lang="en-US" sz="3200" dirty="0"/>
-            </a:br>
-            <a:r>
-              <a:rPr lang="en-US" sz="3200" dirty="0"/>
-              <a:t>- only time kept, linear or quadratic</a:t>
-            </a:r>
-          </a:p>
-        </p:txBody>
-      </p:sp>
-      <p:pic>
-        <p:nvPicPr>
-          <p:cNvPr id="4" name="Picture 3">
-            <a:extLst>
-              <a:ext uri="{FF2B5EF4-FFF2-40B4-BE49-F238E27FC236}">
-                <a16:creationId xmlns:a16="http://schemas.microsoft.com/office/drawing/2014/main" id="{50525DB7-EF23-5B9F-21B1-0D11D081758C}"/>
-              </a:ext>
-            </a:extLst>
-          </p:cNvPr>
-          <p:cNvPicPr>
-            <a:picLocks noChangeAspect="1"/>
-          </p:cNvPicPr>
-          <p:nvPr/>
-        </p:nvPicPr>
-        <p:blipFill>
-          <a:blip r:embed="rId2"/>
-          <a:stretch>
-            <a:fillRect/>
-          </a:stretch>
-        </p:blipFill>
-        <p:spPr>
-          <a:xfrm>
-            <a:off x="2628094" y="930416"/>
-            <a:ext cx="9563906" cy="4708384"/>
-          </a:xfrm>
-          <a:prstGeom prst="rect">
-            <a:avLst/>
-          </a:prstGeom>
-        </p:spPr>
-      </p:pic>
+              <a:rPr lang="en-US" sz="4400" dirty="0"/>
+              <a:t> </a:t>
+            </a:r>
+            <a:r>
+              <a:rPr lang="en-US" sz="4400" dirty="0" err="1"/>
+              <a:t>glm</a:t>
+            </a:r>
+            <a:r>
+              <a:rPr lang="en-US" sz="4400" dirty="0"/>
+              <a:t> full model</a:t>
+            </a:r>
+            <a:endParaRPr lang="en-US" dirty="0"/>
+          </a:p>
+        </p:txBody>
+      </p:sp>
+      <p:sp>
+        <p:nvSpPr>
+          <p:cNvPr id="3" name="Content Placeholder 2">
+            <a:extLst>
+              <a:ext uri="{FF2B5EF4-FFF2-40B4-BE49-F238E27FC236}">
+                <a16:creationId xmlns:a16="http://schemas.microsoft.com/office/drawing/2014/main" id="{86A7E102-9688-5D5C-4B3D-CD56DAAE7A4F}"/>
+              </a:ext>
+            </a:extLst>
+          </p:cNvPr>
+          <p:cNvSpPr>
+            <a:spLocks noGrp="1"/>
+          </p:cNvSpPr>
+          <p:nvPr>
+            <p:ph idx="1"/>
+          </p:nvPr>
+        </p:nvSpPr>
+        <p:spPr/>
+        <p:txBody>
+          <a:bodyPr/>
+          <a:lstStyle/>
+          <a:p>
+            <a:endParaRPr lang="en-US"/>
+          </a:p>
+        </p:txBody>
+      </p:sp>
     </p:spTree>
     <p:extLst>
       <p:ext uri="{BB962C8B-B14F-4D97-AF65-F5344CB8AC3E}">
-        <p14:creationId xmlns:p14="http://schemas.microsoft.com/office/powerpoint/2010/main" val="746536640"/>
+        <p14:creationId xmlns:p14="http://schemas.microsoft.com/office/powerpoint/2010/main" val="110958210"/>
       </p:ext>
     </p:extLst>
   </p:cSld>
@@ -6457,12 +6495,62 @@
           <a:chExt cx="0" cy="0"/>
         </a:xfrm>
       </p:grpSpPr>
+      <p:sp>
+        <p:nvSpPr>
+          <p:cNvPr id="2" name="Title 1">
+            <a:extLst>
+              <a:ext uri="{FF2B5EF4-FFF2-40B4-BE49-F238E27FC236}">
+                <a16:creationId xmlns:a16="http://schemas.microsoft.com/office/drawing/2014/main" id="{3E4A6795-1948-05E4-E562-AFED99BDA8EB}"/>
+              </a:ext>
+            </a:extLst>
+          </p:cNvPr>
+          <p:cNvSpPr>
+            <a:spLocks noGrp="1"/>
+          </p:cNvSpPr>
+          <p:nvPr>
+            <p:ph type="title"/>
+          </p:nvPr>
+        </p:nvSpPr>
+        <p:spPr>
+          <a:xfrm>
+            <a:off x="165093" y="365124"/>
+            <a:ext cx="2802278" cy="3063875"/>
+          </a:xfrm>
+        </p:spPr>
+        <p:txBody>
+          <a:bodyPr>
+            <a:normAutofit/>
+          </a:bodyPr>
+          <a:lstStyle/>
+          <a:p>
+            <a:r>
+              <a:rPr lang="en-US" sz="3200" dirty="0"/>
+              <a:t>Int1 </a:t>
+            </a:r>
+            <a:r>
+              <a:rPr lang="en-US" sz="3200" dirty="0" err="1"/>
+              <a:t>mp</a:t>
+            </a:r>
+            <a:r>
+              <a:rPr lang="en-US" sz="3200" dirty="0"/>
+              <a:t> step</a:t>
+            </a:r>
+            <a:br>
+              <a:rPr lang="en-US" sz="3200" dirty="0"/>
+            </a:br>
+            <a:r>
+              <a:rPr lang="en-US" sz="3200" dirty="0"/>
+              <a:t>- only time kept, linear or quadratic</a:t>
+            </a:r>
+          </a:p>
+        </p:txBody>
+      </p:sp>
       <p:pic>
         <p:nvPicPr>
-          <p:cNvPr id="5" name="Picture 4">
-            <a:extLst>
-              <a:ext uri="{FF2B5EF4-FFF2-40B4-BE49-F238E27FC236}">
-                <a16:creationId xmlns:a16="http://schemas.microsoft.com/office/drawing/2014/main" id="{C89A8D0F-4785-793E-5F59-940560DDD98D}"/>
+          <p:cNvPr id="4" name="Picture 3">
+            <a:extLst>
+              <a:ext uri="{FF2B5EF4-FFF2-40B4-BE49-F238E27FC236}">
+                <a16:creationId xmlns:a16="http://schemas.microsoft.com/office/drawing/2014/main" id="{50525DB7-EF23-5B9F-21B1-0D11D081758C}"/>
               </a:ext>
             </a:extLst>
           </p:cNvPr>
@@ -6479,55 +6567,18 @@
         </p:blipFill>
         <p:spPr>
           <a:xfrm>
-            <a:off x="3249768" y="1086678"/>
-            <a:ext cx="8472672" cy="5571747"/>
+            <a:off x="2628094" y="930416"/>
+            <a:ext cx="9563906" cy="4708384"/>
           </a:xfrm>
           <a:prstGeom prst="rect">
             <a:avLst/>
           </a:prstGeom>
         </p:spPr>
       </p:pic>
-      <p:sp>
-        <p:nvSpPr>
-          <p:cNvPr id="2" name="Title 1">
-            <a:extLst>
-              <a:ext uri="{FF2B5EF4-FFF2-40B4-BE49-F238E27FC236}">
-                <a16:creationId xmlns:a16="http://schemas.microsoft.com/office/drawing/2014/main" id="{9C84FB5B-3548-57AF-0BDE-3735ECDD4D50}"/>
-              </a:ext>
-            </a:extLst>
-          </p:cNvPr>
-          <p:cNvSpPr>
-            <a:spLocks noGrp="1"/>
-          </p:cNvSpPr>
-          <p:nvPr>
-            <p:ph type="title"/>
-          </p:nvPr>
-        </p:nvSpPr>
-        <p:spPr>
-          <a:xfrm>
-            <a:off x="0" y="0"/>
-            <a:ext cx="4664765" cy="1603513"/>
-          </a:xfrm>
-        </p:spPr>
-        <p:txBody>
-          <a:bodyPr/>
-          <a:lstStyle/>
-          <a:p>
-            <a:r>
-              <a:rPr lang="en-US" dirty="0" err="1"/>
-              <a:t>S_maltophilia</a:t>
-            </a:r>
-            <a:r>
-              <a:rPr lang="en-US" dirty="0"/>
-              <a:t> data transformation</a:t>
-            </a:r>
-          </a:p>
-        </p:txBody>
-      </p:sp>
     </p:spTree>
     <p:extLst>
       <p:ext uri="{BB962C8B-B14F-4D97-AF65-F5344CB8AC3E}">
-        <p14:creationId xmlns:p14="http://schemas.microsoft.com/office/powerpoint/2010/main" val="3972327607"/>
+        <p14:creationId xmlns:p14="http://schemas.microsoft.com/office/powerpoint/2010/main" val="746536640"/>
       </p:ext>
     </p:extLst>
   </p:cSld>

</xml_diff>

<commit_message>
glm scripts and pptx of results
</commit_message>
<xml_diff>
--- a/pptx/glm_microplastics_water_v3.pptx
+++ b/pptx/glm_microplastics_water_v3.pptx
@@ -7,33 +7,35 @@
   <p:sldIdLst>
     <p:sldId id="257" r:id="rId2"/>
     <p:sldId id="285" r:id="rId3"/>
-    <p:sldId id="269" r:id="rId4"/>
-    <p:sldId id="277" r:id="rId5"/>
-    <p:sldId id="286" r:id="rId6"/>
-    <p:sldId id="267" r:id="rId7"/>
-    <p:sldId id="278" r:id="rId8"/>
-    <p:sldId id="287" r:id="rId9"/>
-    <p:sldId id="268" r:id="rId10"/>
-    <p:sldId id="279" r:id="rId11"/>
-    <p:sldId id="288" r:id="rId12"/>
-    <p:sldId id="270" r:id="rId13"/>
-    <p:sldId id="280" r:id="rId14"/>
-    <p:sldId id="289" r:id="rId15"/>
-    <p:sldId id="271" r:id="rId16"/>
-    <p:sldId id="272" r:id="rId17"/>
-    <p:sldId id="281" r:id="rId18"/>
-    <p:sldId id="290" r:id="rId19"/>
-    <p:sldId id="273" r:id="rId20"/>
-    <p:sldId id="282" r:id="rId21"/>
-    <p:sldId id="291" r:id="rId22"/>
-    <p:sldId id="274" r:id="rId23"/>
-    <p:sldId id="283" r:id="rId24"/>
-    <p:sldId id="292" r:id="rId25"/>
-    <p:sldId id="275" r:id="rId26"/>
-    <p:sldId id="284" r:id="rId27"/>
-    <p:sldId id="293" r:id="rId28"/>
-    <p:sldId id="276" r:id="rId29"/>
-    <p:sldId id="266" r:id="rId30"/>
+    <p:sldId id="295" r:id="rId4"/>
+    <p:sldId id="269" r:id="rId5"/>
+    <p:sldId id="277" r:id="rId6"/>
+    <p:sldId id="286" r:id="rId7"/>
+    <p:sldId id="267" r:id="rId8"/>
+    <p:sldId id="278" r:id="rId9"/>
+    <p:sldId id="287" r:id="rId10"/>
+    <p:sldId id="268" r:id="rId11"/>
+    <p:sldId id="279" r:id="rId12"/>
+    <p:sldId id="288" r:id="rId13"/>
+    <p:sldId id="270" r:id="rId14"/>
+    <p:sldId id="280" r:id="rId15"/>
+    <p:sldId id="289" r:id="rId16"/>
+    <p:sldId id="271" r:id="rId17"/>
+    <p:sldId id="272" r:id="rId18"/>
+    <p:sldId id="281" r:id="rId19"/>
+    <p:sldId id="290" r:id="rId20"/>
+    <p:sldId id="273" r:id="rId21"/>
+    <p:sldId id="282" r:id="rId22"/>
+    <p:sldId id="291" r:id="rId23"/>
+    <p:sldId id="274" r:id="rId24"/>
+    <p:sldId id="283" r:id="rId25"/>
+    <p:sldId id="292" r:id="rId26"/>
+    <p:sldId id="275" r:id="rId27"/>
+    <p:sldId id="284" r:id="rId28"/>
+    <p:sldId id="293" r:id="rId29"/>
+    <p:sldId id="276" r:id="rId30"/>
+    <p:sldId id="294" r:id="rId31"/>
+    <p:sldId id="266" r:id="rId32"/>
   </p:sldIdLst>
   <p:sldSz cx="12192000" cy="6858000"/>
   <p:notesSz cx="6858000" cy="9144000"/>
@@ -287,7 +289,7 @@
           <a:p>
             <a:fld id="{D8B46044-EB6B-44D7-A92E-D50D0E12EF7C}" type="datetimeFigureOut">
               <a:rPr lang="en-US" smtClean="0"/>
-              <a:t>6/4/2024</a:t>
+              <a:t>6/5/2024</a:t>
             </a:fld>
             <a:endParaRPr lang="en-US"/>
           </a:p>
@@ -485,7 +487,7 @@
           <a:p>
             <a:fld id="{D8B46044-EB6B-44D7-A92E-D50D0E12EF7C}" type="datetimeFigureOut">
               <a:rPr lang="en-US" smtClean="0"/>
-              <a:t>6/4/2024</a:t>
+              <a:t>6/5/2024</a:t>
             </a:fld>
             <a:endParaRPr lang="en-US"/>
           </a:p>
@@ -693,7 +695,7 @@
           <a:p>
             <a:fld id="{D8B46044-EB6B-44D7-A92E-D50D0E12EF7C}" type="datetimeFigureOut">
               <a:rPr lang="en-US" smtClean="0"/>
-              <a:t>6/4/2024</a:t>
+              <a:t>6/5/2024</a:t>
             </a:fld>
             <a:endParaRPr lang="en-US"/>
           </a:p>
@@ -891,7 +893,7 @@
           <a:p>
             <a:fld id="{D8B46044-EB6B-44D7-A92E-D50D0E12EF7C}" type="datetimeFigureOut">
               <a:rPr lang="en-US" smtClean="0"/>
-              <a:t>6/4/2024</a:t>
+              <a:t>6/5/2024</a:t>
             </a:fld>
             <a:endParaRPr lang="en-US"/>
           </a:p>
@@ -1166,7 +1168,7 @@
           <a:p>
             <a:fld id="{D8B46044-EB6B-44D7-A92E-D50D0E12EF7C}" type="datetimeFigureOut">
               <a:rPr lang="en-US" smtClean="0"/>
-              <a:t>6/4/2024</a:t>
+              <a:t>6/5/2024</a:t>
             </a:fld>
             <a:endParaRPr lang="en-US"/>
           </a:p>
@@ -1431,7 +1433,7 @@
           <a:p>
             <a:fld id="{D8B46044-EB6B-44D7-A92E-D50D0E12EF7C}" type="datetimeFigureOut">
               <a:rPr lang="en-US" smtClean="0"/>
-              <a:t>6/4/2024</a:t>
+              <a:t>6/5/2024</a:t>
             </a:fld>
             <a:endParaRPr lang="en-US"/>
           </a:p>
@@ -1843,7 +1845,7 @@
           <a:p>
             <a:fld id="{D8B46044-EB6B-44D7-A92E-D50D0E12EF7C}" type="datetimeFigureOut">
               <a:rPr lang="en-US" smtClean="0"/>
-              <a:t>6/4/2024</a:t>
+              <a:t>6/5/2024</a:t>
             </a:fld>
             <a:endParaRPr lang="en-US"/>
           </a:p>
@@ -1984,7 +1986,7 @@
           <a:p>
             <a:fld id="{D8B46044-EB6B-44D7-A92E-D50D0E12EF7C}" type="datetimeFigureOut">
               <a:rPr lang="en-US" smtClean="0"/>
-              <a:t>6/4/2024</a:t>
+              <a:t>6/5/2024</a:t>
             </a:fld>
             <a:endParaRPr lang="en-US"/>
           </a:p>
@@ -2097,7 +2099,7 @@
           <a:p>
             <a:fld id="{D8B46044-EB6B-44D7-A92E-D50D0E12EF7C}" type="datetimeFigureOut">
               <a:rPr lang="en-US" smtClean="0"/>
-              <a:t>6/4/2024</a:t>
+              <a:t>6/5/2024</a:t>
             </a:fld>
             <a:endParaRPr lang="en-US"/>
           </a:p>
@@ -2408,7 +2410,7 @@
           <a:p>
             <a:fld id="{D8B46044-EB6B-44D7-A92E-D50D0E12EF7C}" type="datetimeFigureOut">
               <a:rPr lang="en-US" smtClean="0"/>
-              <a:t>6/4/2024</a:t>
+              <a:t>6/5/2024</a:t>
             </a:fld>
             <a:endParaRPr lang="en-US"/>
           </a:p>
@@ -2696,7 +2698,7 @@
           <a:p>
             <a:fld id="{D8B46044-EB6B-44D7-A92E-D50D0E12EF7C}" type="datetimeFigureOut">
               <a:rPr lang="en-US" smtClean="0"/>
-              <a:t>6/4/2024</a:t>
+              <a:t>6/5/2024</a:t>
             </a:fld>
             <a:endParaRPr lang="en-US"/>
           </a:p>
@@ -2937,7 +2939,7 @@
           <a:p>
             <a:fld id="{D8B46044-EB6B-44D7-A92E-D50D0E12EF7C}" type="datetimeFigureOut">
               <a:rPr lang="en-US" smtClean="0"/>
-              <a:t>6/4/2024</a:t>
+              <a:t>6/5/2024</a:t>
             </a:fld>
             <a:endParaRPr lang="en-US"/>
           </a:p>
@@ -3494,7 +3496,7 @@
                 <a:ea typeface="Calibri" panose="020F0502020204030204" pitchFamily="34" charset="0"/>
                 <a:cs typeface="Times New Roman" panose="02020603050405020304" pitchFamily="18" charset="0"/>
               </a:rPr>
-              <a:t>. Biomarker responses were normal transformed by finding the optimal lambda for a Box-Cox transformation. The choice of the Gaussian family and identity link assumes that the response variable is normally distributed and linearly related to the additive effects of the categorical predictors. We examined the model summary to assess the significance of each factor's coefficients, which represent the expected change in biomarker expression for each factor level compared to the reference level. We repeated thes</a:t>
+              <a:t>. Biomarker responses were normalized with a log10 transformation. The choice of the Gaussian family and identity link assumes that the response variable is normally distributed and linearly related to the additive effects of the categorical predictors. We examined the model summary to assess the significance of each factor's coefficients, which represent the expected change in biomarker expression for each factor level compared to the reference level. We repeated thes</a:t>
             </a:r>
             <a:r>
               <a:rPr lang="en-US" sz="1800" kern="100" dirty="0">
@@ -3521,7 +3523,7 @@
                 <a:ea typeface="Calibri" panose="020F0502020204030204" pitchFamily="34" charset="0"/>
                 <a:cs typeface="Times New Roman" panose="02020603050405020304" pitchFamily="18" charset="0"/>
               </a:rPr>
-              <a:t>I have removed the fb level and inserted 0 concentrations for week 0 for each of the response variables for microplastics (to have the same dimensions as water data).</a:t>
+              <a:t>As discussed earlier. I have removed the fb level and inserted 0 concentrations for week 0 for each of the response variables for microplastics (to have the same dimensions as water data).</a:t>
             </a:r>
             <a:endParaRPr lang="en-US" sz="1800" kern="100" dirty="0">
               <a:effectLst/>
@@ -3570,7 +3572,7 @@
           <p:cNvPr id="2" name="Title 1">
             <a:extLst>
               <a:ext uri="{FF2B5EF4-FFF2-40B4-BE49-F238E27FC236}">
-                <a16:creationId xmlns:a16="http://schemas.microsoft.com/office/drawing/2014/main" id="{9C84FB5B-3548-57AF-0BDE-3735ECDD4D50}"/>
+                <a16:creationId xmlns:a16="http://schemas.microsoft.com/office/drawing/2014/main" id="{3E4A6795-1948-05E4-E562-AFED99BDA8EB}"/>
               </a:ext>
             </a:extLst>
           </p:cNvPr>
@@ -3583,29 +3585,58 @@
         </p:nvSpPr>
         <p:spPr>
           <a:xfrm>
-            <a:off x="1" y="0"/>
-            <a:ext cx="2000992" cy="1603513"/>
+            <a:off x="165092" y="365124"/>
+            <a:ext cx="4339175" cy="2361143"/>
           </a:xfrm>
         </p:spPr>
         <p:txBody>
           <a:bodyPr>
-            <a:normAutofit/>
+            <a:normAutofit fontScale="90000"/>
           </a:bodyPr>
           <a:lstStyle/>
           <a:p>
             <a:r>
-              <a:rPr lang="en-US" sz="2000" dirty="0"/>
-              <a:t>Sul1 data transformation</a:t>
+              <a:rPr lang="en-US" sz="3200" dirty="0"/>
+              <a:t>Int1 </a:t>
+            </a:r>
+            <a:r>
+              <a:rPr lang="en-US" sz="3200" dirty="0" err="1"/>
+              <a:t>mp</a:t>
+            </a:r>
+            <a:r>
+              <a:rPr lang="en-US" sz="3200" dirty="0"/>
+              <a:t> step</a:t>
+            </a:r>
+            <a:br>
+              <a:rPr lang="en-US" sz="3200" dirty="0"/>
+            </a:br>
+            <a:r>
+              <a:rPr lang="en-US" sz="3200" dirty="0"/>
+              <a:t>- time kept, linear</a:t>
+            </a:r>
+            <a:br>
+              <a:rPr lang="en-US" sz="3200" dirty="0"/>
+            </a:br>
+            <a:r>
+              <a:rPr lang="en-US" sz="3200" dirty="0"/>
+              <a:t>- plastic type is significant</a:t>
+            </a:r>
+            <a:br>
+              <a:rPr lang="en-US" sz="3200" dirty="0"/>
+            </a:br>
+            <a:r>
+              <a:rPr lang="en-US" sz="3200" dirty="0"/>
+              <a:t>- treatment type is dropped</a:t>
             </a:r>
           </a:p>
         </p:txBody>
       </p:sp>
       <p:pic>
         <p:nvPicPr>
-          <p:cNvPr id="4" name="Picture 3">
-            <a:extLst>
-              <a:ext uri="{FF2B5EF4-FFF2-40B4-BE49-F238E27FC236}">
-                <a16:creationId xmlns:a16="http://schemas.microsoft.com/office/drawing/2014/main" id="{1275E309-7EDF-4E59-ABE6-E434D4F52E56}"/>
+          <p:cNvPr id="5" name="Picture 4">
+            <a:extLst>
+              <a:ext uri="{FF2B5EF4-FFF2-40B4-BE49-F238E27FC236}">
+                <a16:creationId xmlns:a16="http://schemas.microsoft.com/office/drawing/2014/main" id="{2882E18F-F980-6341-F4D3-30B218D215C6}"/>
               </a:ext>
             </a:extLst>
           </p:cNvPr>
@@ -3622,8 +3653,38 @@
         </p:blipFill>
         <p:spPr>
           <a:xfrm>
-            <a:off x="2000993" y="356259"/>
-            <a:ext cx="9643214" cy="6270171"/>
+            <a:off x="148007" y="3220842"/>
+            <a:ext cx="5638728" cy="3063875"/>
+          </a:xfrm>
+          <a:prstGeom prst="rect">
+            <a:avLst/>
+          </a:prstGeom>
+        </p:spPr>
+      </p:pic>
+      <p:pic>
+        <p:nvPicPr>
+          <p:cNvPr id="7" name="Picture 6">
+            <a:extLst>
+              <a:ext uri="{FF2B5EF4-FFF2-40B4-BE49-F238E27FC236}">
+                <a16:creationId xmlns:a16="http://schemas.microsoft.com/office/drawing/2014/main" id="{FF1B18A0-C10F-3FFE-B8CF-359CE834A06B}"/>
+              </a:ext>
+            </a:extLst>
+          </p:cNvPr>
+          <p:cNvPicPr>
+            <a:picLocks noChangeAspect="1"/>
+          </p:cNvPicPr>
+          <p:nvPr/>
+        </p:nvPicPr>
+        <p:blipFill>
+          <a:blip r:embed="rId3"/>
+          <a:stretch>
+            <a:fillRect/>
+          </a:stretch>
+        </p:blipFill>
+        <p:spPr>
+          <a:xfrm>
+            <a:off x="6096001" y="636076"/>
+            <a:ext cx="5604264" cy="4403350"/>
           </a:xfrm>
           <a:prstGeom prst="rect">
             <a:avLst/>
@@ -3633,7 +3694,7 @@
     </p:spTree>
     <p:extLst>
       <p:ext uri="{BB962C8B-B14F-4D97-AF65-F5344CB8AC3E}">
-        <p14:creationId xmlns:p14="http://schemas.microsoft.com/office/powerpoint/2010/main" val="3972327607"/>
+        <p14:creationId xmlns:p14="http://schemas.microsoft.com/office/powerpoint/2010/main" val="746536640"/>
       </p:ext>
     </p:extLst>
   </p:cSld>
@@ -3665,7 +3726,7 @@
           <p:cNvPr id="2" name="Title 1">
             <a:extLst>
               <a:ext uri="{FF2B5EF4-FFF2-40B4-BE49-F238E27FC236}">
-                <a16:creationId xmlns:a16="http://schemas.microsoft.com/office/drawing/2014/main" id="{241613D6-757A-FFC0-7AAE-3A0B4FF4F583}"/>
+                <a16:creationId xmlns:a16="http://schemas.microsoft.com/office/drawing/2014/main" id="{9C84FB5B-3548-57AF-0BDE-3735ECDD4D50}"/>
               </a:ext>
             </a:extLst>
           </p:cNvPr>
@@ -3676,64 +3737,128 @@
             <p:ph type="title"/>
           </p:nvPr>
         </p:nvSpPr>
-        <p:spPr/>
-        <p:txBody>
-          <a:bodyPr/>
-          <a:lstStyle/>
-          <a:p>
-            <a:r>
-              <a:rPr lang="en-US" sz="4400" dirty="0"/>
-              <a:t>Sul1 </a:t>
-            </a:r>
-            <a:r>
-              <a:rPr lang="en-US" sz="4400" dirty="0" err="1"/>
-              <a:t>mp</a:t>
-            </a:r>
-            <a:r>
-              <a:rPr lang="en-US" sz="4400" dirty="0"/>
-              <a:t> </a:t>
-            </a:r>
-            <a:r>
-              <a:rPr lang="en-US" sz="4400" dirty="0" err="1"/>
-              <a:t>glm</a:t>
-            </a:r>
-            <a:r>
-              <a:rPr lang="en-US" sz="4400" dirty="0"/>
-              <a:t> full model</a:t>
-            </a:r>
-            <a:endParaRPr lang="en-US" dirty="0"/>
-          </a:p>
-        </p:txBody>
-      </p:sp>
-      <p:sp>
-        <p:nvSpPr>
-          <p:cNvPr id="3" name="Content Placeholder 2">
-            <a:extLst>
-              <a:ext uri="{FF2B5EF4-FFF2-40B4-BE49-F238E27FC236}">
-                <a16:creationId xmlns:a16="http://schemas.microsoft.com/office/drawing/2014/main" id="{B01146E6-0E81-928A-C44D-735B9D70879C}"/>
-              </a:ext>
-            </a:extLst>
-          </p:cNvPr>
-          <p:cNvSpPr>
-            <a:spLocks noGrp="1"/>
-          </p:cNvSpPr>
-          <p:nvPr>
-            <p:ph idx="1"/>
-          </p:nvPr>
-        </p:nvSpPr>
-        <p:spPr/>
-        <p:txBody>
-          <a:bodyPr/>
-          <a:lstStyle/>
-          <a:p>
-            <a:endParaRPr lang="en-US"/>
+        <p:spPr>
+          <a:xfrm>
+            <a:off x="1" y="0"/>
+            <a:ext cx="2000992" cy="1603513"/>
+          </a:xfrm>
+        </p:spPr>
+        <p:txBody>
+          <a:bodyPr>
+            <a:normAutofit/>
+          </a:bodyPr>
+          <a:lstStyle/>
+          <a:p>
+            <a:r>
+              <a:rPr lang="en-US" sz="2000" dirty="0"/>
+              <a:t>Sul1 data transformation</a:t>
+            </a:r>
+          </a:p>
+        </p:txBody>
+      </p:sp>
+      <p:pic>
+        <p:nvPicPr>
+          <p:cNvPr id="4" name="Picture 3">
+            <a:extLst>
+              <a:ext uri="{FF2B5EF4-FFF2-40B4-BE49-F238E27FC236}">
+                <a16:creationId xmlns:a16="http://schemas.microsoft.com/office/drawing/2014/main" id="{1275E309-7EDF-4E59-ABE6-E434D4F52E56}"/>
+              </a:ext>
+            </a:extLst>
+          </p:cNvPr>
+          <p:cNvPicPr>
+            <a:picLocks noChangeAspect="1"/>
+          </p:cNvPicPr>
+          <p:nvPr/>
+        </p:nvPicPr>
+        <p:blipFill>
+          <a:blip r:embed="rId2"/>
+          <a:stretch>
+            <a:fillRect/>
+          </a:stretch>
+        </p:blipFill>
+        <p:spPr>
+          <a:xfrm>
+            <a:off x="3567147" y="440267"/>
+            <a:ext cx="8237925" cy="5356430"/>
+          </a:xfrm>
+          <a:prstGeom prst="rect">
+            <a:avLst/>
+          </a:prstGeom>
+        </p:spPr>
+      </p:pic>
+      <p:sp>
+        <p:nvSpPr>
+          <p:cNvPr id="3" name="Title 1">
+            <a:extLst>
+              <a:ext uri="{FF2B5EF4-FFF2-40B4-BE49-F238E27FC236}">
+                <a16:creationId xmlns:a16="http://schemas.microsoft.com/office/drawing/2014/main" id="{5573D7A5-A86D-9D5F-A4E5-432FEA301B43}"/>
+              </a:ext>
+            </a:extLst>
+          </p:cNvPr>
+          <p:cNvSpPr txBox="1">
+            <a:spLocks/>
+          </p:cNvSpPr>
+          <p:nvPr/>
+        </p:nvSpPr>
+        <p:spPr>
+          <a:xfrm>
+            <a:off x="106878" y="1524174"/>
+            <a:ext cx="3143634" cy="3362521"/>
+          </a:xfrm>
+          <a:prstGeom prst="rect">
+            <a:avLst/>
+          </a:prstGeom>
+        </p:spPr>
+        <p:txBody>
+          <a:bodyPr vert="horz" lIns="91440" tIns="45720" rIns="91440" bIns="45720" rtlCol="0" anchor="ctr">
+            <a:noAutofit/>
+          </a:bodyPr>
+          <a:lstStyle>
+            <a:lvl1pPr algn="l" defTabSz="914400" rtl="0" eaLnBrk="1" latinLnBrk="0" hangingPunct="1">
+              <a:lnSpc>
+                <a:spcPct val="90000"/>
+              </a:lnSpc>
+              <a:spcBef>
+                <a:spcPct val="0"/>
+              </a:spcBef>
+              <a:buNone/>
+              <a:defRPr sz="4400" kern="1200">
+                <a:solidFill>
+                  <a:schemeClr val="tx1"/>
+                </a:solidFill>
+                <a:latin typeface="+mj-lt"/>
+                <a:ea typeface="+mj-ea"/>
+                <a:cs typeface="+mj-cs"/>
+              </a:defRPr>
+            </a:lvl1pPr>
+          </a:lstStyle>
+          <a:p>
+            <a:r>
+              <a:rPr lang="en-US" sz="2000" dirty="0"/>
+              <a:t>-Shapiro-Wilks normality statistic (W), range from 0 to 1, with 1 being perfectly normal</a:t>
+            </a:r>
+          </a:p>
+          <a:p>
+            <a:r>
+              <a:rPr lang="en-US" sz="2000" dirty="0"/>
+              <a:t>-All transformations fail normality at p&lt;0.05</a:t>
+            </a:r>
+          </a:p>
+          <a:p>
+            <a:r>
+              <a:rPr lang="en-US" sz="2000" dirty="0"/>
+              <a:t>-The log transformations do a bit better inducing normality, but neither do a great job.</a:t>
+            </a:r>
+          </a:p>
+          <a:p>
+            <a:endParaRPr lang="en-US" sz="2000" dirty="0"/>
           </a:p>
         </p:txBody>
       </p:sp>
     </p:spTree>
     <p:extLst>
       <p:ext uri="{BB962C8B-B14F-4D97-AF65-F5344CB8AC3E}">
-        <p14:creationId xmlns:p14="http://schemas.microsoft.com/office/powerpoint/2010/main" val="392749499"/>
+        <p14:creationId xmlns:p14="http://schemas.microsoft.com/office/powerpoint/2010/main" val="3972327607"/>
       </p:ext>
     </p:extLst>
   </p:cSld>
@@ -3765,7 +3890,7 @@
           <p:cNvPr id="2" name="Title 1">
             <a:extLst>
               <a:ext uri="{FF2B5EF4-FFF2-40B4-BE49-F238E27FC236}">
-                <a16:creationId xmlns:a16="http://schemas.microsoft.com/office/drawing/2014/main" id="{3E4A6795-1948-05E4-E562-AFED99BDA8EB}"/>
+                <a16:creationId xmlns:a16="http://schemas.microsoft.com/office/drawing/2014/main" id="{241613D6-757A-FFC0-7AAE-3A0B4FF4F583}"/>
               </a:ext>
             </a:extLst>
           </p:cNvPr>
@@ -3778,51 +3903,97 @@
         </p:nvSpPr>
         <p:spPr>
           <a:xfrm>
-            <a:off x="165093" y="365124"/>
-            <a:ext cx="2802278" cy="3063875"/>
-          </a:xfrm>
-        </p:spPr>
-        <p:txBody>
-          <a:bodyPr>
-            <a:normAutofit/>
-          </a:bodyPr>
-          <a:lstStyle/>
-          <a:p>
-            <a:r>
-              <a:rPr lang="en-US" sz="3200" dirty="0"/>
+            <a:off x="838200" y="365126"/>
+            <a:ext cx="10515600" cy="862542"/>
+          </a:xfrm>
+        </p:spPr>
+        <p:txBody>
+          <a:bodyPr/>
+          <a:lstStyle/>
+          <a:p>
+            <a:r>
+              <a:rPr lang="en-US" sz="4400" dirty="0"/>
               <a:t>Sul1 </a:t>
             </a:r>
             <a:r>
-              <a:rPr lang="en-US" sz="3200" dirty="0" err="1"/>
+              <a:rPr lang="en-US" sz="4400" dirty="0" err="1"/>
               <a:t>mp</a:t>
             </a:r>
             <a:r>
-              <a:rPr lang="en-US" sz="3200" dirty="0"/>
-              <a:t> step</a:t>
-            </a:r>
-            <a:br>
-              <a:rPr lang="en-US" sz="3200" dirty="0"/>
-            </a:br>
-            <a:r>
-              <a:rPr lang="en-US" sz="3200" dirty="0"/>
-              <a:t>-everything kept</a:t>
-            </a:r>
-            <a:br>
-              <a:rPr lang="en-US" sz="3200" dirty="0"/>
-            </a:br>
-            <a:r>
-              <a:rPr lang="en-US" sz="3200" dirty="0"/>
-              <a:t>-time quadratic</a:t>
+              <a:rPr lang="en-US" sz="4400" dirty="0"/>
+              <a:t> </a:t>
+            </a:r>
+            <a:r>
+              <a:rPr lang="en-US" sz="4400" dirty="0" err="1"/>
+              <a:t>glm</a:t>
+            </a:r>
+            <a:r>
+              <a:rPr lang="en-US" sz="4400" dirty="0"/>
+              <a:t> full model</a:t>
+            </a:r>
+            <a:endParaRPr lang="en-US" dirty="0"/>
+          </a:p>
+        </p:txBody>
+      </p:sp>
+      <p:sp>
+        <p:nvSpPr>
+          <p:cNvPr id="3" name="Content Placeholder 2">
+            <a:extLst>
+              <a:ext uri="{FF2B5EF4-FFF2-40B4-BE49-F238E27FC236}">
+                <a16:creationId xmlns:a16="http://schemas.microsoft.com/office/drawing/2014/main" id="{B01146E6-0E81-928A-C44D-735B9D70879C}"/>
+              </a:ext>
+            </a:extLst>
+          </p:cNvPr>
+          <p:cNvSpPr>
+            <a:spLocks noGrp="1"/>
+          </p:cNvSpPr>
+          <p:nvPr>
+            <p:ph idx="1"/>
+          </p:nvPr>
+        </p:nvSpPr>
+        <p:spPr>
+          <a:xfrm>
+            <a:off x="838200" y="1825625"/>
+            <a:ext cx="4385733" cy="4351338"/>
+          </a:xfrm>
+        </p:spPr>
+        <p:txBody>
+          <a:bodyPr/>
+          <a:lstStyle/>
+          <a:p>
+            <a:r>
+              <a:rPr lang="en-US" dirty="0"/>
+              <a:t>Everything significant here, time (all the methods work but linear most significant again)</a:t>
+            </a:r>
+          </a:p>
+          <a:p>
+            <a:r>
+              <a:rPr lang="en-US" dirty="0"/>
+              <a:t>Positive effect of amended water significant</a:t>
+            </a:r>
+          </a:p>
+          <a:p>
+            <a:r>
+              <a:rPr lang="en-US" dirty="0"/>
+              <a:t>HDPE negative coefficient (</a:t>
+            </a:r>
+            <a:r>
+              <a:rPr lang="en-US" dirty="0" err="1"/>
+              <a:t>n.s</a:t>
+            </a:r>
+            <a:r>
+              <a:rPr lang="en-US" dirty="0"/>
+              <a:t>.), other coefficients positive with LDPE significant</a:t>
             </a:r>
           </a:p>
         </p:txBody>
       </p:sp>
       <p:pic>
         <p:nvPicPr>
-          <p:cNvPr id="4" name="Picture 3">
-            <a:extLst>
-              <a:ext uri="{FF2B5EF4-FFF2-40B4-BE49-F238E27FC236}">
-                <a16:creationId xmlns:a16="http://schemas.microsoft.com/office/drawing/2014/main" id="{C2860583-85BD-F14A-501D-0D27502CA973}"/>
+          <p:cNvPr id="5" name="Picture 4">
+            <a:extLst>
+              <a:ext uri="{FF2B5EF4-FFF2-40B4-BE49-F238E27FC236}">
+                <a16:creationId xmlns:a16="http://schemas.microsoft.com/office/drawing/2014/main" id="{539EA080-07E9-762D-3503-5798180462BE}"/>
               </a:ext>
             </a:extLst>
           </p:cNvPr>
@@ -3839,8 +4010,8 @@
         </p:blipFill>
         <p:spPr>
           <a:xfrm>
-            <a:off x="3036806" y="609599"/>
-            <a:ext cx="9112906" cy="5579533"/>
+            <a:off x="5293675" y="1321251"/>
+            <a:ext cx="6681620" cy="4855712"/>
           </a:xfrm>
           <a:prstGeom prst="rect">
             <a:avLst/>
@@ -3850,7 +4021,7 @@
     </p:spTree>
     <p:extLst>
       <p:ext uri="{BB962C8B-B14F-4D97-AF65-F5344CB8AC3E}">
-        <p14:creationId xmlns:p14="http://schemas.microsoft.com/office/powerpoint/2010/main" val="3020057500"/>
+        <p14:creationId xmlns:p14="http://schemas.microsoft.com/office/powerpoint/2010/main" val="392749499"/>
       </p:ext>
     </p:extLst>
   </p:cSld>
@@ -3882,7 +4053,7 @@
           <p:cNvPr id="2" name="Title 1">
             <a:extLst>
               <a:ext uri="{FF2B5EF4-FFF2-40B4-BE49-F238E27FC236}">
-                <a16:creationId xmlns:a16="http://schemas.microsoft.com/office/drawing/2014/main" id="{9C84FB5B-3548-57AF-0BDE-3735ECDD4D50}"/>
+                <a16:creationId xmlns:a16="http://schemas.microsoft.com/office/drawing/2014/main" id="{3E4A6795-1948-05E4-E562-AFED99BDA8EB}"/>
               </a:ext>
             </a:extLst>
           </p:cNvPr>
@@ -3895,29 +4066,51 @@
         </p:nvSpPr>
         <p:spPr>
           <a:xfrm>
-            <a:off x="1" y="0"/>
-            <a:ext cx="2101932" cy="1603513"/>
+            <a:off x="165093" y="365124"/>
+            <a:ext cx="2802278" cy="2284943"/>
           </a:xfrm>
         </p:spPr>
         <p:txBody>
           <a:bodyPr>
-            <a:normAutofit/>
+            <a:normAutofit fontScale="90000"/>
           </a:bodyPr>
           <a:lstStyle/>
           <a:p>
             <a:r>
-              <a:rPr lang="en-US" sz="2000" dirty="0"/>
-              <a:t>P. a data transformation</a:t>
+              <a:rPr lang="en-US" sz="3200" dirty="0"/>
+              <a:t>Sul1 </a:t>
+            </a:r>
+            <a:r>
+              <a:rPr lang="en-US" sz="3200" dirty="0" err="1"/>
+              <a:t>mp</a:t>
+            </a:r>
+            <a:r>
+              <a:rPr lang="en-US" sz="3200" dirty="0"/>
+              <a:t> step</a:t>
+            </a:r>
+            <a:br>
+              <a:rPr lang="en-US" sz="3200" dirty="0"/>
+            </a:br>
+            <a:r>
+              <a:rPr lang="en-US" sz="3200" dirty="0"/>
+              <a:t>-everything kept</a:t>
+            </a:r>
+            <a:br>
+              <a:rPr lang="en-US" sz="3200" dirty="0"/>
+            </a:br>
+            <a:r>
+              <a:rPr lang="en-US" sz="3200" dirty="0"/>
+              <a:t>-time linear but other choices also work</a:t>
             </a:r>
           </a:p>
         </p:txBody>
       </p:sp>
       <p:pic>
         <p:nvPicPr>
-          <p:cNvPr id="4" name="Picture 3">
-            <a:extLst>
-              <a:ext uri="{FF2B5EF4-FFF2-40B4-BE49-F238E27FC236}">
-                <a16:creationId xmlns:a16="http://schemas.microsoft.com/office/drawing/2014/main" id="{73557CAA-A6DB-B13D-F106-BE59CFA5EE3F}"/>
+          <p:cNvPr id="5" name="Picture 4">
+            <a:extLst>
+              <a:ext uri="{FF2B5EF4-FFF2-40B4-BE49-F238E27FC236}">
+                <a16:creationId xmlns:a16="http://schemas.microsoft.com/office/drawing/2014/main" id="{975C10DC-A522-9905-7C5A-B2C22C43ED4B}"/>
               </a:ext>
             </a:extLst>
           </p:cNvPr>
@@ -3934,8 +4127,38 @@
         </p:blipFill>
         <p:spPr>
           <a:xfrm>
-            <a:off x="2321625" y="339587"/>
-            <a:ext cx="9269531" cy="6399660"/>
+            <a:off x="165093" y="3429000"/>
+            <a:ext cx="5163954" cy="1416075"/>
+          </a:xfrm>
+          <a:prstGeom prst="rect">
+            <a:avLst/>
+          </a:prstGeom>
+        </p:spPr>
+      </p:pic>
+      <p:pic>
+        <p:nvPicPr>
+          <p:cNvPr id="7" name="Picture 6">
+            <a:extLst>
+              <a:ext uri="{FF2B5EF4-FFF2-40B4-BE49-F238E27FC236}">
+                <a16:creationId xmlns:a16="http://schemas.microsoft.com/office/drawing/2014/main" id="{B6A24E83-3C88-55A5-ACAB-CCBC4AD421D8}"/>
+              </a:ext>
+            </a:extLst>
+          </p:cNvPr>
+          <p:cNvPicPr>
+            <a:picLocks noChangeAspect="1"/>
+          </p:cNvPicPr>
+          <p:nvPr/>
+        </p:nvPicPr>
+        <p:blipFill>
+          <a:blip r:embed="rId3"/>
+          <a:stretch>
+            <a:fillRect/>
+          </a:stretch>
+        </p:blipFill>
+        <p:spPr>
+          <a:xfrm>
+            <a:off x="5574134" y="707946"/>
+            <a:ext cx="6391748" cy="4693787"/>
           </a:xfrm>
           <a:prstGeom prst="rect">
             <a:avLst/>
@@ -3945,7 +4168,7 @@
     </p:spTree>
     <p:extLst>
       <p:ext uri="{BB962C8B-B14F-4D97-AF65-F5344CB8AC3E}">
-        <p14:creationId xmlns:p14="http://schemas.microsoft.com/office/powerpoint/2010/main" val="2129978245"/>
+        <p14:creationId xmlns:p14="http://schemas.microsoft.com/office/powerpoint/2010/main" val="3020057500"/>
       </p:ext>
     </p:extLst>
   </p:cSld>
@@ -3977,7 +4200,7 @@
           <p:cNvPr id="2" name="Title 1">
             <a:extLst>
               <a:ext uri="{FF2B5EF4-FFF2-40B4-BE49-F238E27FC236}">
-                <a16:creationId xmlns:a16="http://schemas.microsoft.com/office/drawing/2014/main" id="{D9091B9E-148B-DF17-9E71-14E2B40868AF}"/>
+                <a16:creationId xmlns:a16="http://schemas.microsoft.com/office/drawing/2014/main" id="{9C84FB5B-3548-57AF-0BDE-3735ECDD4D50}"/>
               </a:ext>
             </a:extLst>
           </p:cNvPr>
@@ -3988,64 +4211,128 @@
             <p:ph type="title"/>
           </p:nvPr>
         </p:nvSpPr>
-        <p:spPr/>
-        <p:txBody>
-          <a:bodyPr/>
-          <a:lstStyle/>
-          <a:p>
-            <a:r>
-              <a:rPr lang="en-US" sz="4400" dirty="0"/>
-              <a:t>P aeruginosa </a:t>
-            </a:r>
-            <a:r>
-              <a:rPr lang="en-US" sz="4400" dirty="0" err="1"/>
-              <a:t>mp</a:t>
-            </a:r>
-            <a:r>
-              <a:rPr lang="en-US" sz="4400" dirty="0"/>
-              <a:t> </a:t>
-            </a:r>
-            <a:r>
-              <a:rPr lang="en-US" sz="4400" dirty="0" err="1"/>
-              <a:t>glm</a:t>
-            </a:r>
-            <a:r>
-              <a:rPr lang="en-US" sz="4400" dirty="0"/>
-              <a:t> full model</a:t>
-            </a:r>
-            <a:endParaRPr lang="en-US" dirty="0"/>
-          </a:p>
-        </p:txBody>
-      </p:sp>
-      <p:sp>
-        <p:nvSpPr>
-          <p:cNvPr id="3" name="Content Placeholder 2">
-            <a:extLst>
-              <a:ext uri="{FF2B5EF4-FFF2-40B4-BE49-F238E27FC236}">
-                <a16:creationId xmlns:a16="http://schemas.microsoft.com/office/drawing/2014/main" id="{BF6AA952-A728-111F-1DCD-E3E1DE5DA24C}"/>
-              </a:ext>
-            </a:extLst>
-          </p:cNvPr>
-          <p:cNvSpPr>
-            <a:spLocks noGrp="1"/>
-          </p:cNvSpPr>
-          <p:nvPr>
-            <p:ph idx="1"/>
-          </p:nvPr>
-        </p:nvSpPr>
-        <p:spPr/>
-        <p:txBody>
-          <a:bodyPr/>
-          <a:lstStyle/>
-          <a:p>
-            <a:endParaRPr lang="en-US"/>
+        <p:spPr>
+          <a:xfrm>
+            <a:off x="1" y="0"/>
+            <a:ext cx="2101932" cy="1603513"/>
+          </a:xfrm>
+        </p:spPr>
+        <p:txBody>
+          <a:bodyPr>
+            <a:normAutofit/>
+          </a:bodyPr>
+          <a:lstStyle/>
+          <a:p>
+            <a:r>
+              <a:rPr lang="en-US" sz="2000" dirty="0"/>
+              <a:t>P. a data transformation</a:t>
+            </a:r>
+          </a:p>
+        </p:txBody>
+      </p:sp>
+      <p:pic>
+        <p:nvPicPr>
+          <p:cNvPr id="4" name="Picture 3">
+            <a:extLst>
+              <a:ext uri="{FF2B5EF4-FFF2-40B4-BE49-F238E27FC236}">
+                <a16:creationId xmlns:a16="http://schemas.microsoft.com/office/drawing/2014/main" id="{73557CAA-A6DB-B13D-F106-BE59CFA5EE3F}"/>
+              </a:ext>
+            </a:extLst>
+          </p:cNvPr>
+          <p:cNvPicPr>
+            <a:picLocks noChangeAspect="1"/>
+          </p:cNvPicPr>
+          <p:nvPr/>
+        </p:nvPicPr>
+        <p:blipFill>
+          <a:blip r:embed="rId2"/>
+          <a:stretch>
+            <a:fillRect/>
+          </a:stretch>
+        </p:blipFill>
+        <p:spPr>
+          <a:xfrm>
+            <a:off x="3332313" y="554676"/>
+            <a:ext cx="8326577" cy="5748647"/>
+          </a:xfrm>
+          <a:prstGeom prst="rect">
+            <a:avLst/>
+          </a:prstGeom>
+        </p:spPr>
+      </p:pic>
+      <p:sp>
+        <p:nvSpPr>
+          <p:cNvPr id="3" name="Title 1">
+            <a:extLst>
+              <a:ext uri="{FF2B5EF4-FFF2-40B4-BE49-F238E27FC236}">
+                <a16:creationId xmlns:a16="http://schemas.microsoft.com/office/drawing/2014/main" id="{8DD70B92-A283-2EB3-E099-587243E830D0}"/>
+              </a:ext>
+            </a:extLst>
+          </p:cNvPr>
+          <p:cNvSpPr txBox="1">
+            <a:spLocks/>
+          </p:cNvSpPr>
+          <p:nvPr/>
+        </p:nvSpPr>
+        <p:spPr>
+          <a:xfrm>
+            <a:off x="106878" y="1524174"/>
+            <a:ext cx="3143634" cy="3362521"/>
+          </a:xfrm>
+          <a:prstGeom prst="rect">
+            <a:avLst/>
+          </a:prstGeom>
+        </p:spPr>
+        <p:txBody>
+          <a:bodyPr vert="horz" lIns="91440" tIns="45720" rIns="91440" bIns="45720" rtlCol="0" anchor="ctr">
+            <a:noAutofit/>
+          </a:bodyPr>
+          <a:lstStyle>
+            <a:lvl1pPr algn="l" defTabSz="914400" rtl="0" eaLnBrk="1" latinLnBrk="0" hangingPunct="1">
+              <a:lnSpc>
+                <a:spcPct val="90000"/>
+              </a:lnSpc>
+              <a:spcBef>
+                <a:spcPct val="0"/>
+              </a:spcBef>
+              <a:buNone/>
+              <a:defRPr sz="4400" kern="1200">
+                <a:solidFill>
+                  <a:schemeClr val="tx1"/>
+                </a:solidFill>
+                <a:latin typeface="+mj-lt"/>
+                <a:ea typeface="+mj-ea"/>
+                <a:cs typeface="+mj-cs"/>
+              </a:defRPr>
+            </a:lvl1pPr>
+          </a:lstStyle>
+          <a:p>
+            <a:r>
+              <a:rPr lang="en-US" sz="2000" dirty="0"/>
+              <a:t>-Shapiro-Wilks normality statistic (W), range from 0 to 1, with 1 being perfectly normal</a:t>
+            </a:r>
+          </a:p>
+          <a:p>
+            <a:r>
+              <a:rPr lang="en-US" sz="2000" dirty="0"/>
+              <a:t>-All transformations fail normality at p&lt;0.05</a:t>
+            </a:r>
+          </a:p>
+          <a:p>
+            <a:r>
+              <a:rPr lang="en-US" sz="2000" dirty="0"/>
+              <a:t>-The log transformations do a bit better inducing normality, but neither do a great job.</a:t>
+            </a:r>
+          </a:p>
+          <a:p>
+            <a:endParaRPr lang="en-US" sz="2000" dirty="0"/>
           </a:p>
         </p:txBody>
       </p:sp>
     </p:spTree>
     <p:extLst>
       <p:ext uri="{BB962C8B-B14F-4D97-AF65-F5344CB8AC3E}">
-        <p14:creationId xmlns:p14="http://schemas.microsoft.com/office/powerpoint/2010/main" val="1316122582"/>
+        <p14:creationId xmlns:p14="http://schemas.microsoft.com/office/powerpoint/2010/main" val="2129978245"/>
       </p:ext>
     </p:extLst>
   </p:cSld>
@@ -4077,7 +4364,7 @@
           <p:cNvPr id="2" name="Title 1">
             <a:extLst>
               <a:ext uri="{FF2B5EF4-FFF2-40B4-BE49-F238E27FC236}">
-                <a16:creationId xmlns:a16="http://schemas.microsoft.com/office/drawing/2014/main" id="{3E4A6795-1948-05E4-E562-AFED99BDA8EB}"/>
+                <a16:creationId xmlns:a16="http://schemas.microsoft.com/office/drawing/2014/main" id="{D9091B9E-148B-DF17-9E71-14E2B40868AF}"/>
               </a:ext>
             </a:extLst>
           </p:cNvPr>
@@ -4088,46 +4375,41 @@
             <p:ph type="title"/>
           </p:nvPr>
         </p:nvSpPr>
-        <p:spPr>
-          <a:xfrm>
-            <a:off x="165093" y="365124"/>
-            <a:ext cx="2802278" cy="3063875"/>
-          </a:xfrm>
-        </p:spPr>
-        <p:txBody>
-          <a:bodyPr>
-            <a:normAutofit/>
-          </a:bodyPr>
-          <a:lstStyle/>
-          <a:p>
-            <a:r>
-              <a:rPr lang="en-US" sz="3200" dirty="0"/>
-              <a:t>P. aeruginosa </a:t>
-            </a:r>
-            <a:r>
-              <a:rPr lang="en-US" sz="3200" dirty="0" err="1"/>
+        <p:spPr/>
+        <p:txBody>
+          <a:bodyPr/>
+          <a:lstStyle/>
+          <a:p>
+            <a:r>
+              <a:rPr lang="en-US" sz="4400" dirty="0"/>
+              <a:t>P aeruginosa </a:t>
+            </a:r>
+            <a:r>
+              <a:rPr lang="en-US" sz="4400" dirty="0" err="1"/>
               <a:t>mp</a:t>
             </a:r>
             <a:r>
-              <a:rPr lang="en-US" sz="3200" dirty="0"/>
-              <a:t> step</a:t>
-            </a:r>
-            <a:br>
-              <a:rPr lang="en-US" sz="3200" dirty="0"/>
-            </a:br>
-            <a:r>
-              <a:rPr lang="en-US" sz="3200" dirty="0"/>
-              <a:t>- time kept and now significant for both linear and quadratic</a:t>
-            </a:r>
+              <a:rPr lang="en-US" sz="4400" dirty="0"/>
+              <a:t> </a:t>
+            </a:r>
+            <a:r>
+              <a:rPr lang="en-US" sz="4400" dirty="0" err="1"/>
+              <a:t>glm</a:t>
+            </a:r>
+            <a:r>
+              <a:rPr lang="en-US" sz="4400" dirty="0"/>
+              <a:t> full model</a:t>
+            </a:r>
+            <a:endParaRPr lang="en-US" dirty="0"/>
           </a:p>
         </p:txBody>
       </p:sp>
       <p:pic>
         <p:nvPicPr>
-          <p:cNvPr id="4" name="Picture 3">
-            <a:extLst>
-              <a:ext uri="{FF2B5EF4-FFF2-40B4-BE49-F238E27FC236}">
-                <a16:creationId xmlns:a16="http://schemas.microsoft.com/office/drawing/2014/main" id="{95E50185-04E3-DCC0-1574-73FCAE7516BE}"/>
+          <p:cNvPr id="5" name="Picture 4">
+            <a:extLst>
+              <a:ext uri="{FF2B5EF4-FFF2-40B4-BE49-F238E27FC236}">
+                <a16:creationId xmlns:a16="http://schemas.microsoft.com/office/drawing/2014/main" id="{5A2D83D3-CC95-C0AD-2FE6-33D646DC63F9}"/>
               </a:ext>
             </a:extLst>
           </p:cNvPr>
@@ -4144,18 +4426,73 @@
         </p:blipFill>
         <p:spPr>
           <a:xfrm>
-            <a:off x="2967371" y="784534"/>
-            <a:ext cx="9305069" cy="4837331"/>
+            <a:off x="5423851" y="1573661"/>
+            <a:ext cx="6462453" cy="4750937"/>
           </a:xfrm>
           <a:prstGeom prst="rect">
             <a:avLst/>
           </a:prstGeom>
         </p:spPr>
       </p:pic>
+      <p:sp>
+        <p:nvSpPr>
+          <p:cNvPr id="6" name="Content Placeholder 2">
+            <a:extLst>
+              <a:ext uri="{FF2B5EF4-FFF2-40B4-BE49-F238E27FC236}">
+                <a16:creationId xmlns:a16="http://schemas.microsoft.com/office/drawing/2014/main" id="{4893F9F7-CB72-FA00-7586-C4B2401B090A}"/>
+              </a:ext>
+            </a:extLst>
+          </p:cNvPr>
+          <p:cNvSpPr>
+            <a:spLocks noGrp="1"/>
+          </p:cNvSpPr>
+          <p:nvPr>
+            <p:ph idx="1"/>
+          </p:nvPr>
+        </p:nvSpPr>
+        <p:spPr>
+          <a:xfrm>
+            <a:off x="838200" y="1825625"/>
+            <a:ext cx="4385733" cy="4351338"/>
+          </a:xfrm>
+        </p:spPr>
+        <p:txBody>
+          <a:bodyPr>
+            <a:normAutofit fontScale="92500"/>
+          </a:bodyPr>
+          <a:lstStyle/>
+          <a:p>
+            <a:r>
+              <a:rPr lang="en-US" dirty="0"/>
+              <a:t>Everything significant here again, time (all the methods work but linear once again most significant)</a:t>
+            </a:r>
+          </a:p>
+          <a:p>
+            <a:r>
+              <a:rPr lang="en-US" dirty="0"/>
+              <a:t>Negative (</a:t>
+            </a:r>
+            <a:r>
+              <a:rPr lang="en-US" dirty="0" err="1"/>
+              <a:t>n.s</a:t>
+            </a:r>
+            <a:r>
+              <a:rPr lang="en-US" dirty="0"/>
+              <a:t>.) effect of amended water</a:t>
+            </a:r>
+          </a:p>
+          <a:p>
+            <a:r>
+              <a:rPr lang="en-US" dirty="0"/>
+              <a:t>HDPE negative coefficient again (some support, p=0.06), other coefficients positive but none significant</a:t>
+            </a:r>
+          </a:p>
+        </p:txBody>
+      </p:sp>
     </p:spTree>
     <p:extLst>
       <p:ext uri="{BB962C8B-B14F-4D97-AF65-F5344CB8AC3E}">
-        <p14:creationId xmlns:p14="http://schemas.microsoft.com/office/powerpoint/2010/main" val="2585886771"/>
+        <p14:creationId xmlns:p14="http://schemas.microsoft.com/office/powerpoint/2010/main" val="1316122582"/>
       </p:ext>
     </p:extLst>
   </p:cSld>
@@ -4187,7 +4524,7 @@
           <p:cNvPr id="2" name="Title 1">
             <a:extLst>
               <a:ext uri="{FF2B5EF4-FFF2-40B4-BE49-F238E27FC236}">
-                <a16:creationId xmlns:a16="http://schemas.microsoft.com/office/drawing/2014/main" id="{581E850A-7C7B-42A5-5294-7AA8006F3F71}"/>
+                <a16:creationId xmlns:a16="http://schemas.microsoft.com/office/drawing/2014/main" id="{3E4A6795-1948-05E4-E562-AFED99BDA8EB}"/>
               </a:ext>
             </a:extLst>
           </p:cNvPr>
@@ -4198,14 +4535,43 @@
             <p:ph type="title"/>
           </p:nvPr>
         </p:nvSpPr>
-        <p:spPr/>
-        <p:txBody>
-          <a:bodyPr/>
-          <a:lstStyle/>
-          <a:p>
-            <a:r>
-              <a:rPr lang="en-US" dirty="0"/>
-              <a:t>Water Data</a:t>
+        <p:spPr>
+          <a:xfrm>
+            <a:off x="436027" y="102657"/>
+            <a:ext cx="2802278" cy="3063875"/>
+          </a:xfrm>
+        </p:spPr>
+        <p:txBody>
+          <a:bodyPr>
+            <a:normAutofit/>
+          </a:bodyPr>
+          <a:lstStyle/>
+          <a:p>
+            <a:r>
+              <a:rPr lang="en-US" sz="3200" dirty="0"/>
+              <a:t>P. aeruginosa </a:t>
+            </a:r>
+            <a:r>
+              <a:rPr lang="en-US" sz="3200" dirty="0" err="1"/>
+              <a:t>mp</a:t>
+            </a:r>
+            <a:r>
+              <a:rPr lang="en-US" sz="3200" dirty="0"/>
+              <a:t> step</a:t>
+            </a:r>
+            <a:br>
+              <a:rPr lang="en-US" sz="3200" dirty="0"/>
+            </a:br>
+            <a:r>
+              <a:rPr lang="en-US" sz="3200" dirty="0"/>
+              <a:t>- time kept and significant </a:t>
+            </a:r>
+            <a:br>
+              <a:rPr lang="en-US" sz="3200" dirty="0"/>
+            </a:br>
+            <a:r>
+              <a:rPr lang="en-US" sz="3200" dirty="0"/>
+              <a:t>- water type dropped again</a:t>
             </a:r>
           </a:p>
         </p:txBody>
@@ -4215,7 +4581,7 @@
           <p:cNvPr id="5" name="Picture 4">
             <a:extLst>
               <a:ext uri="{FF2B5EF4-FFF2-40B4-BE49-F238E27FC236}">
-                <a16:creationId xmlns:a16="http://schemas.microsoft.com/office/drawing/2014/main" id="{0F04D610-142D-DA6C-F1BB-33C1CBF02886}"/>
+                <a16:creationId xmlns:a16="http://schemas.microsoft.com/office/drawing/2014/main" id="{A795E7A2-1CDA-12F0-7513-D038976733F8}"/>
               </a:ext>
             </a:extLst>
           </p:cNvPr>
@@ -4232,8 +4598,38 @@
         </p:blipFill>
         <p:spPr>
           <a:xfrm>
-            <a:off x="4595201" y="108079"/>
-            <a:ext cx="4430266" cy="6384796"/>
+            <a:off x="688891" y="3428999"/>
+            <a:ext cx="4246304" cy="2576035"/>
+          </a:xfrm>
+          <a:prstGeom prst="rect">
+            <a:avLst/>
+          </a:prstGeom>
+        </p:spPr>
+      </p:pic>
+      <p:pic>
+        <p:nvPicPr>
+          <p:cNvPr id="7" name="Picture 6">
+            <a:extLst>
+              <a:ext uri="{FF2B5EF4-FFF2-40B4-BE49-F238E27FC236}">
+                <a16:creationId xmlns:a16="http://schemas.microsoft.com/office/drawing/2014/main" id="{1EA9E37D-00B9-948C-22F3-A8F7929610BB}"/>
+              </a:ext>
+            </a:extLst>
+          </p:cNvPr>
+          <p:cNvPicPr>
+            <a:picLocks noChangeAspect="1"/>
+          </p:cNvPicPr>
+          <p:nvPr/>
+        </p:nvPicPr>
+        <p:blipFill>
+          <a:blip r:embed="rId3"/>
+          <a:stretch>
+            <a:fillRect/>
+          </a:stretch>
+        </p:blipFill>
+        <p:spPr>
+          <a:xfrm>
+            <a:off x="5130659" y="923848"/>
+            <a:ext cx="6720690" cy="3648152"/>
           </a:xfrm>
           <a:prstGeom prst="rect">
             <a:avLst/>
@@ -4243,7 +4639,7 @@
     </p:spTree>
     <p:extLst>
       <p:ext uri="{BB962C8B-B14F-4D97-AF65-F5344CB8AC3E}">
-        <p14:creationId xmlns:p14="http://schemas.microsoft.com/office/powerpoint/2010/main" val="1295834067"/>
+        <p14:creationId xmlns:p14="http://schemas.microsoft.com/office/powerpoint/2010/main" val="2585886771"/>
       </p:ext>
     </p:extLst>
   </p:cSld>
@@ -4275,7 +4671,7 @@
           <p:cNvPr id="2" name="Title 1">
             <a:extLst>
               <a:ext uri="{FF2B5EF4-FFF2-40B4-BE49-F238E27FC236}">
-                <a16:creationId xmlns:a16="http://schemas.microsoft.com/office/drawing/2014/main" id="{9C84FB5B-3548-57AF-0BDE-3735ECDD4D50}"/>
+                <a16:creationId xmlns:a16="http://schemas.microsoft.com/office/drawing/2014/main" id="{581E850A-7C7B-42A5-5294-7AA8006F3F71}"/>
               </a:ext>
             </a:extLst>
           </p:cNvPr>
@@ -4286,35 +4682,24 @@
             <p:ph type="title"/>
           </p:nvPr>
         </p:nvSpPr>
-        <p:spPr>
-          <a:xfrm>
-            <a:off x="47502" y="724395"/>
-            <a:ext cx="2286000" cy="1603513"/>
-          </a:xfrm>
-        </p:spPr>
-        <p:txBody>
-          <a:bodyPr>
-            <a:normAutofit/>
-          </a:bodyPr>
-          <a:lstStyle/>
-          <a:p>
-            <a:r>
-              <a:rPr lang="en-US" sz="2000" dirty="0" err="1"/>
-              <a:t>S_maltophilia</a:t>
-            </a:r>
-            <a:r>
-              <a:rPr lang="en-US" sz="2000" dirty="0"/>
-              <a:t> water data transformation</a:t>
+        <p:spPr/>
+        <p:txBody>
+          <a:bodyPr/>
+          <a:lstStyle/>
+          <a:p>
+            <a:r>
+              <a:rPr lang="en-US" dirty="0"/>
+              <a:t>Water Data</a:t>
             </a:r>
           </a:p>
         </p:txBody>
       </p:sp>
       <p:pic>
         <p:nvPicPr>
-          <p:cNvPr id="4" name="Picture 3">
-            <a:extLst>
-              <a:ext uri="{FF2B5EF4-FFF2-40B4-BE49-F238E27FC236}">
-                <a16:creationId xmlns:a16="http://schemas.microsoft.com/office/drawing/2014/main" id="{A2CAC5CB-D55D-E92F-D3B1-C851A05BC35D}"/>
+          <p:cNvPr id="5" name="Picture 4">
+            <a:extLst>
+              <a:ext uri="{FF2B5EF4-FFF2-40B4-BE49-F238E27FC236}">
+                <a16:creationId xmlns:a16="http://schemas.microsoft.com/office/drawing/2014/main" id="{0F04D610-142D-DA6C-F1BB-33C1CBF02886}"/>
               </a:ext>
             </a:extLst>
           </p:cNvPr>
@@ -4331,8 +4716,8 @@
         </p:blipFill>
         <p:spPr>
           <a:xfrm>
-            <a:off x="2523505" y="550221"/>
-            <a:ext cx="9082879" cy="5757558"/>
+            <a:off x="4595201" y="108079"/>
+            <a:ext cx="4430266" cy="6384796"/>
           </a:xfrm>
           <a:prstGeom prst="rect">
             <a:avLst/>
@@ -4342,7 +4727,7 @@
     </p:spTree>
     <p:extLst>
       <p:ext uri="{BB962C8B-B14F-4D97-AF65-F5344CB8AC3E}">
-        <p14:creationId xmlns:p14="http://schemas.microsoft.com/office/powerpoint/2010/main" val="2425370377"/>
+        <p14:creationId xmlns:p14="http://schemas.microsoft.com/office/powerpoint/2010/main" val="1295834067"/>
       </p:ext>
     </p:extLst>
   </p:cSld>
@@ -4374,7 +4759,7 @@
           <p:cNvPr id="2" name="Title 1">
             <a:extLst>
               <a:ext uri="{FF2B5EF4-FFF2-40B4-BE49-F238E27FC236}">
-                <a16:creationId xmlns:a16="http://schemas.microsoft.com/office/drawing/2014/main" id="{F4011B0E-14DD-6CDF-55EC-F2789A1244BA}"/>
+                <a16:creationId xmlns:a16="http://schemas.microsoft.com/office/drawing/2014/main" id="{9C84FB5B-3548-57AF-0BDE-3735ECDD4D50}"/>
               </a:ext>
             </a:extLst>
           </p:cNvPr>
@@ -4385,64 +4770,140 @@
             <p:ph type="title"/>
           </p:nvPr>
         </p:nvSpPr>
-        <p:spPr/>
-        <p:txBody>
-          <a:bodyPr/>
-          <a:lstStyle/>
-          <a:p>
-            <a:r>
-              <a:rPr lang="en-US" sz="4400" dirty="0"/>
-              <a:t>S </a:t>
-            </a:r>
-            <a:r>
-              <a:rPr lang="en-US" sz="4400" dirty="0" err="1"/>
-              <a:t>maltophilia</a:t>
-            </a:r>
-            <a:r>
-              <a:rPr lang="en-US" sz="4400" dirty="0"/>
-              <a:t> water </a:t>
-            </a:r>
-            <a:r>
-              <a:rPr lang="en-US" sz="4400" dirty="0" err="1"/>
-              <a:t>glm</a:t>
-            </a:r>
-            <a:r>
-              <a:rPr lang="en-US" sz="4400" dirty="0"/>
-              <a:t> full model</a:t>
-            </a:r>
-            <a:endParaRPr lang="en-US" dirty="0"/>
-          </a:p>
-        </p:txBody>
-      </p:sp>
-      <p:sp>
-        <p:nvSpPr>
-          <p:cNvPr id="3" name="Content Placeholder 2">
-            <a:extLst>
-              <a:ext uri="{FF2B5EF4-FFF2-40B4-BE49-F238E27FC236}">
-                <a16:creationId xmlns:a16="http://schemas.microsoft.com/office/drawing/2014/main" id="{34567027-72FE-7172-E8D6-D7017A922255}"/>
-              </a:ext>
-            </a:extLst>
-          </p:cNvPr>
-          <p:cNvSpPr>
-            <a:spLocks noGrp="1"/>
-          </p:cNvSpPr>
-          <p:nvPr>
-            <p:ph idx="1"/>
-          </p:nvPr>
-        </p:nvSpPr>
-        <p:spPr/>
-        <p:txBody>
-          <a:bodyPr/>
-          <a:lstStyle/>
-          <a:p>
-            <a:endParaRPr lang="en-US"/>
+        <p:spPr>
+          <a:xfrm>
+            <a:off x="47502" y="724395"/>
+            <a:ext cx="2286000" cy="1603513"/>
+          </a:xfrm>
+        </p:spPr>
+        <p:txBody>
+          <a:bodyPr>
+            <a:normAutofit/>
+          </a:bodyPr>
+          <a:lstStyle/>
+          <a:p>
+            <a:r>
+              <a:rPr lang="en-US" sz="2000" dirty="0" err="1"/>
+              <a:t>S_maltophilia</a:t>
+            </a:r>
+            <a:r>
+              <a:rPr lang="en-US" sz="2000" dirty="0"/>
+              <a:t> water data transformation</a:t>
+            </a:r>
+          </a:p>
+        </p:txBody>
+      </p:sp>
+      <p:pic>
+        <p:nvPicPr>
+          <p:cNvPr id="4" name="Picture 3">
+            <a:extLst>
+              <a:ext uri="{FF2B5EF4-FFF2-40B4-BE49-F238E27FC236}">
+                <a16:creationId xmlns:a16="http://schemas.microsoft.com/office/drawing/2014/main" id="{A2CAC5CB-D55D-E92F-D3B1-C851A05BC35D}"/>
+              </a:ext>
+            </a:extLst>
+          </p:cNvPr>
+          <p:cNvPicPr>
+            <a:picLocks noChangeAspect="1"/>
+          </p:cNvPicPr>
+          <p:nvPr/>
+        </p:nvPicPr>
+        <p:blipFill>
+          <a:blip r:embed="rId2"/>
+          <a:stretch>
+            <a:fillRect/>
+          </a:stretch>
+        </p:blipFill>
+        <p:spPr>
+          <a:xfrm>
+            <a:off x="3660171" y="558799"/>
+            <a:ext cx="8267946" cy="5240979"/>
+          </a:xfrm>
+          <a:prstGeom prst="rect">
+            <a:avLst/>
+          </a:prstGeom>
+        </p:spPr>
+      </p:pic>
+      <p:sp>
+        <p:nvSpPr>
+          <p:cNvPr id="3" name="Title 1">
+            <a:extLst>
+              <a:ext uri="{FF2B5EF4-FFF2-40B4-BE49-F238E27FC236}">
+                <a16:creationId xmlns:a16="http://schemas.microsoft.com/office/drawing/2014/main" id="{41313C71-5C75-2E64-E31D-28E6AF455B58}"/>
+              </a:ext>
+            </a:extLst>
+          </p:cNvPr>
+          <p:cNvSpPr txBox="1">
+            <a:spLocks/>
+          </p:cNvSpPr>
+          <p:nvPr/>
+        </p:nvSpPr>
+        <p:spPr>
+          <a:xfrm>
+            <a:off x="78071" y="2032174"/>
+            <a:ext cx="3143634" cy="3362521"/>
+          </a:xfrm>
+          <a:prstGeom prst="rect">
+            <a:avLst/>
+          </a:prstGeom>
+        </p:spPr>
+        <p:txBody>
+          <a:bodyPr vert="horz" lIns="91440" tIns="45720" rIns="91440" bIns="45720" rtlCol="0" anchor="ctr">
+            <a:noAutofit/>
+          </a:bodyPr>
+          <a:lstStyle>
+            <a:lvl1pPr algn="l" defTabSz="914400" rtl="0" eaLnBrk="1" latinLnBrk="0" hangingPunct="1">
+              <a:lnSpc>
+                <a:spcPct val="90000"/>
+              </a:lnSpc>
+              <a:spcBef>
+                <a:spcPct val="0"/>
+              </a:spcBef>
+              <a:buNone/>
+              <a:defRPr sz="4400" kern="1200">
+                <a:solidFill>
+                  <a:schemeClr val="tx1"/>
+                </a:solidFill>
+                <a:latin typeface="+mj-lt"/>
+                <a:ea typeface="+mj-ea"/>
+                <a:cs typeface="+mj-cs"/>
+              </a:defRPr>
+            </a:lvl1pPr>
+          </a:lstStyle>
+          <a:p>
+            <a:r>
+              <a:rPr lang="en-US" sz="2000" dirty="0"/>
+              <a:t>-Shapiro-Wilks normality statistic (W), range from 0 to 1, with 1 being perfectly normal</a:t>
+            </a:r>
+          </a:p>
+          <a:p>
+            <a:r>
+              <a:rPr lang="en-US" sz="2000" dirty="0"/>
+              <a:t>-These transformations pass normality.</a:t>
+            </a:r>
+          </a:p>
+          <a:p>
+            <a:r>
+              <a:rPr lang="en-US" sz="2000" dirty="0"/>
+              <a:t>-The </a:t>
+            </a:r>
+            <a:r>
+              <a:rPr lang="en-US" sz="2000" dirty="0" err="1"/>
+              <a:t>Box_Cox</a:t>
+            </a:r>
+            <a:r>
+              <a:rPr lang="en-US" sz="2000" dirty="0"/>
+              <a:t> does a good job of inducing normality here, the log transformations not far behind.</a:t>
+            </a:r>
+          </a:p>
+          <a:p>
+            <a:endParaRPr lang="en-US" sz="2000" dirty="0"/>
           </a:p>
         </p:txBody>
       </p:sp>
     </p:spTree>
     <p:extLst>
       <p:ext uri="{BB962C8B-B14F-4D97-AF65-F5344CB8AC3E}">
-        <p14:creationId xmlns:p14="http://schemas.microsoft.com/office/powerpoint/2010/main" val="268798333"/>
+        <p14:creationId xmlns:p14="http://schemas.microsoft.com/office/powerpoint/2010/main" val="2425370377"/>
       </p:ext>
     </p:extLst>
   </p:cSld>
@@ -4474,7 +4935,7 @@
           <p:cNvPr id="2" name="Title 1">
             <a:extLst>
               <a:ext uri="{FF2B5EF4-FFF2-40B4-BE49-F238E27FC236}">
-                <a16:creationId xmlns:a16="http://schemas.microsoft.com/office/drawing/2014/main" id="{3E4A6795-1948-05E4-E562-AFED99BDA8EB}"/>
+                <a16:creationId xmlns:a16="http://schemas.microsoft.com/office/drawing/2014/main" id="{F4011B0E-14DD-6CDF-55EC-F2789A1244BA}"/>
               </a:ext>
             </a:extLst>
           </p:cNvPr>
@@ -4485,50 +4946,41 @@
             <p:ph type="title"/>
           </p:nvPr>
         </p:nvSpPr>
-        <p:spPr>
-          <a:xfrm>
-            <a:off x="165093" y="365124"/>
-            <a:ext cx="2802278" cy="3063875"/>
-          </a:xfrm>
-        </p:spPr>
-        <p:txBody>
-          <a:bodyPr>
-            <a:normAutofit fontScale="90000"/>
-          </a:bodyPr>
-          <a:lstStyle/>
-          <a:p>
-            <a:r>
-              <a:rPr lang="en-US" sz="3200" dirty="0"/>
+        <p:spPr/>
+        <p:txBody>
+          <a:bodyPr/>
+          <a:lstStyle/>
+          <a:p>
+            <a:r>
+              <a:rPr lang="en-US" sz="4400" dirty="0"/>
               <a:t>S </a:t>
             </a:r>
             <a:r>
-              <a:rPr lang="en-US" sz="3200" dirty="0" err="1"/>
+              <a:rPr lang="en-US" sz="4400" dirty="0" err="1"/>
               <a:t>maltophilia</a:t>
             </a:r>
             <a:r>
-              <a:rPr lang="en-US" sz="3200" dirty="0"/>
-              <a:t> water step</a:t>
-            </a:r>
-            <a:br>
-              <a:rPr lang="en-US" sz="3200" dirty="0"/>
-            </a:br>
-            <a:r>
-              <a:rPr lang="en-US" sz="3200" dirty="0"/>
-              <a:t>--time trend remains for step() implementation</a:t>
-            </a:r>
-            <a:br>
-              <a:rPr lang="en-US" sz="3200" dirty="0"/>
-            </a:br>
-            <a:endParaRPr lang="en-US" sz="3200" dirty="0"/>
+              <a:rPr lang="en-US" sz="4400" dirty="0"/>
+              <a:t> water </a:t>
+            </a:r>
+            <a:r>
+              <a:rPr lang="en-US" sz="4400" dirty="0" err="1"/>
+              <a:t>glm</a:t>
+            </a:r>
+            <a:r>
+              <a:rPr lang="en-US" sz="4400" dirty="0"/>
+              <a:t> full model</a:t>
+            </a:r>
+            <a:endParaRPr lang="en-US" dirty="0"/>
           </a:p>
         </p:txBody>
       </p:sp>
       <p:pic>
         <p:nvPicPr>
-          <p:cNvPr id="6" name="Picture 5">
-            <a:extLst>
-              <a:ext uri="{FF2B5EF4-FFF2-40B4-BE49-F238E27FC236}">
-                <a16:creationId xmlns:a16="http://schemas.microsoft.com/office/drawing/2014/main" id="{F0D4CAA0-037E-E805-B857-22DCB63BAFF1}"/>
+          <p:cNvPr id="5" name="Picture 4">
+            <a:extLst>
+              <a:ext uri="{FF2B5EF4-FFF2-40B4-BE49-F238E27FC236}">
+                <a16:creationId xmlns:a16="http://schemas.microsoft.com/office/drawing/2014/main" id="{4B0A4E0B-9D62-2DEC-6000-5A5FCEF9B592}"/>
               </a:ext>
             </a:extLst>
           </p:cNvPr>
@@ -4545,18 +4997,59 @@
         </p:blipFill>
         <p:spPr>
           <a:xfrm>
-            <a:off x="3245779" y="411084"/>
-            <a:ext cx="8845529" cy="5286983"/>
+            <a:off x="5469845" y="1690688"/>
+            <a:ext cx="6637109" cy="3947665"/>
           </a:xfrm>
           <a:prstGeom prst="rect">
             <a:avLst/>
           </a:prstGeom>
         </p:spPr>
       </p:pic>
+      <p:sp>
+        <p:nvSpPr>
+          <p:cNvPr id="6" name="Content Placeholder 2">
+            <a:extLst>
+              <a:ext uri="{FF2B5EF4-FFF2-40B4-BE49-F238E27FC236}">
+                <a16:creationId xmlns:a16="http://schemas.microsoft.com/office/drawing/2014/main" id="{519B8ABB-9D48-DB56-2B79-222534226CEC}"/>
+              </a:ext>
+            </a:extLst>
+          </p:cNvPr>
+          <p:cNvSpPr>
+            <a:spLocks noGrp="1"/>
+          </p:cNvSpPr>
+          <p:nvPr>
+            <p:ph idx="1"/>
+          </p:nvPr>
+        </p:nvSpPr>
+        <p:spPr>
+          <a:xfrm>
+            <a:off x="838200" y="1825625"/>
+            <a:ext cx="4385733" cy="4351338"/>
+          </a:xfrm>
+        </p:spPr>
+        <p:txBody>
+          <a:bodyPr>
+            <a:normAutofit/>
+          </a:bodyPr>
+          <a:lstStyle/>
+          <a:p>
+            <a:r>
+              <a:rPr lang="en-US" dirty="0"/>
+              <a:t>Treatment type insignificant in the full model</a:t>
+            </a:r>
+          </a:p>
+          <a:p>
+            <a:r>
+              <a:rPr lang="en-US" dirty="0"/>
+              <a:t>Time, linear or quadratic</a:t>
+            </a:r>
+          </a:p>
+        </p:txBody>
+      </p:sp>
     </p:spTree>
     <p:extLst>
       <p:ext uri="{BB962C8B-B14F-4D97-AF65-F5344CB8AC3E}">
-        <p14:creationId xmlns:p14="http://schemas.microsoft.com/office/powerpoint/2010/main" val="1805507326"/>
+        <p14:creationId xmlns:p14="http://schemas.microsoft.com/office/powerpoint/2010/main" val="268798333"/>
       </p:ext>
     </p:extLst>
   </p:cSld>
@@ -4648,13 +5141,7 @@
           <a:p>
             <a:r>
               <a:rPr lang="en-US" dirty="0"/>
-              <a:t>MM said that log10 was most typically used so I stuck with that, the other transformations did not help much.</a:t>
-            </a:r>
-          </a:p>
-          <a:p>
-            <a:r>
-              <a:rPr lang="en-US" dirty="0"/>
-              <a:t>To make the </a:t>
+              <a:t>MM said that log10 was most typically used so I stuck with that for the </a:t>
             </a:r>
             <a:r>
               <a:rPr lang="en-US" dirty="0" err="1"/>
@@ -4662,7 +5149,29 @@
             </a:r>
             <a:r>
               <a:rPr lang="en-US" dirty="0"/>
-              <a:t> output easier to process, I present only the log10 results, full results in 1 slide and then the stepwise </a:t>
+              <a:t>, the normality differences between log10, natural log, and optimal Box-Cox are minor for this data.</a:t>
+            </a:r>
+          </a:p>
+          <a:p>
+            <a:r>
+              <a:rPr lang="en-US" dirty="0"/>
+              <a:t>Therefore, to make the </a:t>
+            </a:r>
+            <a:r>
+              <a:rPr lang="en-US" dirty="0" err="1"/>
+              <a:t>glm</a:t>
+            </a:r>
+            <a:r>
+              <a:rPr lang="en-US" dirty="0"/>
+              <a:t> output easier to process, I present only the </a:t>
+            </a:r>
+            <a:r>
+              <a:rPr lang="en-US" dirty="0" err="1"/>
+              <a:t>glm</a:t>
+            </a:r>
+            <a:r>
+              <a:rPr lang="en-US" dirty="0"/>
+              <a:t> of the log10 transformed data, full results in 1 slide and then the stepwise </a:t>
             </a:r>
             <a:r>
               <a:rPr lang="en-US" dirty="0" err="1"/>
@@ -4710,7 +5219,7 @@
           <p:cNvPr id="2" name="Title 1">
             <a:extLst>
               <a:ext uri="{FF2B5EF4-FFF2-40B4-BE49-F238E27FC236}">
-                <a16:creationId xmlns:a16="http://schemas.microsoft.com/office/drawing/2014/main" id="{9C84FB5B-3548-57AF-0BDE-3735ECDD4D50}"/>
+                <a16:creationId xmlns:a16="http://schemas.microsoft.com/office/drawing/2014/main" id="{3E4A6795-1948-05E4-E562-AFED99BDA8EB}"/>
               </a:ext>
             </a:extLst>
           </p:cNvPr>
@@ -4723,20 +5232,46 @@
         </p:nvSpPr>
         <p:spPr>
           <a:xfrm>
-            <a:off x="0" y="397824"/>
-            <a:ext cx="2565070" cy="1603513"/>
+            <a:off x="165093" y="365124"/>
+            <a:ext cx="3627974" cy="3063875"/>
           </a:xfrm>
         </p:spPr>
         <p:txBody>
           <a:bodyPr>
-            <a:normAutofit/>
+            <a:normAutofit fontScale="90000"/>
           </a:bodyPr>
           <a:lstStyle/>
           <a:p>
             <a:r>
-              <a:rPr lang="en-US" sz="2000" dirty="0"/>
-              <a:t>intI1 water data transformation</a:t>
-            </a:r>
+              <a:rPr lang="en-US" sz="3200" dirty="0"/>
+              <a:t>S </a:t>
+            </a:r>
+            <a:r>
+              <a:rPr lang="en-US" sz="3200" dirty="0" err="1"/>
+              <a:t>maltophilia</a:t>
+            </a:r>
+            <a:r>
+              <a:rPr lang="en-US" sz="3200" dirty="0"/>
+              <a:t> water stepwise</a:t>
+            </a:r>
+            <a:br>
+              <a:rPr lang="en-US" sz="3200" dirty="0"/>
+            </a:br>
+            <a:r>
+              <a:rPr lang="en-US" sz="3200" dirty="0"/>
+              <a:t>--time trend kept, little more support for quadratic versus linear</a:t>
+            </a:r>
+            <a:br>
+              <a:rPr lang="en-US" sz="3200" dirty="0"/>
+            </a:br>
+            <a:r>
+              <a:rPr lang="en-US" sz="3200" dirty="0"/>
+              <a:t>- water type not significant in full model but kept in stepwise</a:t>
+            </a:r>
+            <a:br>
+              <a:rPr lang="en-US" sz="3200" dirty="0"/>
+            </a:br>
+            <a:endParaRPr lang="en-US" sz="3200" dirty="0"/>
           </a:p>
         </p:txBody>
       </p:sp>
@@ -4745,7 +5280,7 @@
           <p:cNvPr id="4" name="Picture 3">
             <a:extLst>
               <a:ext uri="{FF2B5EF4-FFF2-40B4-BE49-F238E27FC236}">
-                <a16:creationId xmlns:a16="http://schemas.microsoft.com/office/drawing/2014/main" id="{BD1B074E-537B-9AE6-459C-9696D5C8829C}"/>
+                <a16:creationId xmlns:a16="http://schemas.microsoft.com/office/drawing/2014/main" id="{7329FCEA-C33B-293D-58ED-17E9FF927DB4}"/>
               </a:ext>
             </a:extLst>
           </p:cNvPr>
@@ -4762,8 +5297,38 @@
         </p:blipFill>
         <p:spPr>
           <a:xfrm>
-            <a:off x="2042556" y="198207"/>
-            <a:ext cx="9636216" cy="6461586"/>
+            <a:off x="232826" y="4382535"/>
+            <a:ext cx="4658010" cy="1772733"/>
+          </a:xfrm>
+          <a:prstGeom prst="rect">
+            <a:avLst/>
+          </a:prstGeom>
+        </p:spPr>
+      </p:pic>
+      <p:pic>
+        <p:nvPicPr>
+          <p:cNvPr id="7" name="Picture 6">
+            <a:extLst>
+              <a:ext uri="{FF2B5EF4-FFF2-40B4-BE49-F238E27FC236}">
+                <a16:creationId xmlns:a16="http://schemas.microsoft.com/office/drawing/2014/main" id="{D78BB80E-EFDD-2B5D-BE50-6EC3F79EF45B}"/>
+              </a:ext>
+            </a:extLst>
+          </p:cNvPr>
+          <p:cNvPicPr>
+            <a:picLocks noChangeAspect="1"/>
+          </p:cNvPicPr>
+          <p:nvPr/>
+        </p:nvPicPr>
+        <p:blipFill>
+          <a:blip r:embed="rId3"/>
+          <a:stretch>
+            <a:fillRect/>
+          </a:stretch>
+        </p:blipFill>
+        <p:spPr>
+          <a:xfrm>
+            <a:off x="4407881" y="383296"/>
+            <a:ext cx="7619026" cy="3929135"/>
           </a:xfrm>
           <a:prstGeom prst="rect">
             <a:avLst/>
@@ -4773,7 +5338,7 @@
     </p:spTree>
     <p:extLst>
       <p:ext uri="{BB962C8B-B14F-4D97-AF65-F5344CB8AC3E}">
-        <p14:creationId xmlns:p14="http://schemas.microsoft.com/office/powerpoint/2010/main" val="398696649"/>
+        <p14:creationId xmlns:p14="http://schemas.microsoft.com/office/powerpoint/2010/main" val="1805507326"/>
       </p:ext>
     </p:extLst>
   </p:cSld>
@@ -4805,7 +5370,7 @@
           <p:cNvPr id="2" name="Title 1">
             <a:extLst>
               <a:ext uri="{FF2B5EF4-FFF2-40B4-BE49-F238E27FC236}">
-                <a16:creationId xmlns:a16="http://schemas.microsoft.com/office/drawing/2014/main" id="{880B0B2B-72A5-EC94-B34F-BDAD21F5B01F}"/>
+                <a16:creationId xmlns:a16="http://schemas.microsoft.com/office/drawing/2014/main" id="{9C84FB5B-3548-57AF-0BDE-3735ECDD4D50}"/>
               </a:ext>
             </a:extLst>
           </p:cNvPr>
@@ -4816,56 +5381,128 @@
             <p:ph type="title"/>
           </p:nvPr>
         </p:nvSpPr>
-        <p:spPr/>
-        <p:txBody>
-          <a:bodyPr/>
-          <a:lstStyle/>
-          <a:p>
-            <a:r>
-              <a:rPr lang="en-US" sz="4400" dirty="0"/>
-              <a:t>Int1 water </a:t>
-            </a:r>
-            <a:r>
-              <a:rPr lang="en-US" sz="4400" dirty="0" err="1"/>
-              <a:t>glm</a:t>
-            </a:r>
-            <a:r>
-              <a:rPr lang="en-US" sz="4400" dirty="0"/>
-              <a:t> full model</a:t>
-            </a:r>
-            <a:endParaRPr lang="en-US" dirty="0"/>
-          </a:p>
-        </p:txBody>
-      </p:sp>
-      <p:sp>
-        <p:nvSpPr>
-          <p:cNvPr id="3" name="Content Placeholder 2">
-            <a:extLst>
-              <a:ext uri="{FF2B5EF4-FFF2-40B4-BE49-F238E27FC236}">
-                <a16:creationId xmlns:a16="http://schemas.microsoft.com/office/drawing/2014/main" id="{BF51367C-F9A7-4B70-B70A-69C0301C5A21}"/>
-              </a:ext>
-            </a:extLst>
-          </p:cNvPr>
-          <p:cNvSpPr>
-            <a:spLocks noGrp="1"/>
-          </p:cNvSpPr>
-          <p:nvPr>
-            <p:ph idx="1"/>
-          </p:nvPr>
-        </p:nvSpPr>
-        <p:spPr/>
-        <p:txBody>
-          <a:bodyPr/>
-          <a:lstStyle/>
-          <a:p>
-            <a:endParaRPr lang="en-US"/>
+        <p:spPr>
+          <a:xfrm>
+            <a:off x="0" y="397824"/>
+            <a:ext cx="2565070" cy="1603513"/>
+          </a:xfrm>
+        </p:spPr>
+        <p:txBody>
+          <a:bodyPr>
+            <a:normAutofit/>
+          </a:bodyPr>
+          <a:lstStyle/>
+          <a:p>
+            <a:r>
+              <a:rPr lang="en-US" sz="2000" dirty="0"/>
+              <a:t>intI1 water data transformation</a:t>
+            </a:r>
+          </a:p>
+        </p:txBody>
+      </p:sp>
+      <p:pic>
+        <p:nvPicPr>
+          <p:cNvPr id="4" name="Picture 3">
+            <a:extLst>
+              <a:ext uri="{FF2B5EF4-FFF2-40B4-BE49-F238E27FC236}">
+                <a16:creationId xmlns:a16="http://schemas.microsoft.com/office/drawing/2014/main" id="{BD1B074E-537B-9AE6-459C-9696D5C8829C}"/>
+              </a:ext>
+            </a:extLst>
+          </p:cNvPr>
+          <p:cNvPicPr>
+            <a:picLocks noChangeAspect="1"/>
+          </p:cNvPicPr>
+          <p:nvPr/>
+        </p:nvPicPr>
+        <p:blipFill>
+          <a:blip r:embed="rId2"/>
+          <a:stretch>
+            <a:fillRect/>
+          </a:stretch>
+        </p:blipFill>
+        <p:spPr>
+          <a:xfrm>
+            <a:off x="3553280" y="662137"/>
+            <a:ext cx="8252491" cy="5533726"/>
+          </a:xfrm>
+          <a:prstGeom prst="rect">
+            <a:avLst/>
+          </a:prstGeom>
+        </p:spPr>
+      </p:pic>
+      <p:sp>
+        <p:nvSpPr>
+          <p:cNvPr id="3" name="Title 1">
+            <a:extLst>
+              <a:ext uri="{FF2B5EF4-FFF2-40B4-BE49-F238E27FC236}">
+                <a16:creationId xmlns:a16="http://schemas.microsoft.com/office/drawing/2014/main" id="{FF2D4D10-6BA6-31B3-BBFB-E35724ECEBBE}"/>
+              </a:ext>
+            </a:extLst>
+          </p:cNvPr>
+          <p:cNvSpPr txBox="1">
+            <a:spLocks/>
+          </p:cNvSpPr>
+          <p:nvPr/>
+        </p:nvSpPr>
+        <p:spPr>
+          <a:xfrm>
+            <a:off x="106878" y="1524174"/>
+            <a:ext cx="3143634" cy="3362521"/>
+          </a:xfrm>
+          <a:prstGeom prst="rect">
+            <a:avLst/>
+          </a:prstGeom>
+        </p:spPr>
+        <p:txBody>
+          <a:bodyPr vert="horz" lIns="91440" tIns="45720" rIns="91440" bIns="45720" rtlCol="0" anchor="ctr">
+            <a:noAutofit/>
+          </a:bodyPr>
+          <a:lstStyle>
+            <a:lvl1pPr algn="l" defTabSz="914400" rtl="0" eaLnBrk="1" latinLnBrk="0" hangingPunct="1">
+              <a:lnSpc>
+                <a:spcPct val="90000"/>
+              </a:lnSpc>
+              <a:spcBef>
+                <a:spcPct val="0"/>
+              </a:spcBef>
+              <a:buNone/>
+              <a:defRPr sz="4400" kern="1200">
+                <a:solidFill>
+                  <a:schemeClr val="tx1"/>
+                </a:solidFill>
+                <a:latin typeface="+mj-lt"/>
+                <a:ea typeface="+mj-ea"/>
+                <a:cs typeface="+mj-cs"/>
+              </a:defRPr>
+            </a:lvl1pPr>
+          </a:lstStyle>
+          <a:p>
+            <a:r>
+              <a:rPr lang="en-US" sz="2000" dirty="0"/>
+              <a:t>-Shapiro-Wilks normality statistic (W), range from 0 to 1, with 1 being perfectly normal</a:t>
+            </a:r>
+          </a:p>
+          <a:p>
+            <a:r>
+              <a:rPr lang="en-US" sz="2000" dirty="0"/>
+              <a:t>-These transformations are good and induce normality.</a:t>
+            </a:r>
+          </a:p>
+          <a:p>
+            <a:r>
+              <a:rPr lang="en-US" sz="2000" dirty="0"/>
+              <a:t>-They all do a good job.</a:t>
+            </a:r>
+          </a:p>
+          <a:p>
+            <a:endParaRPr lang="en-US" sz="2000" dirty="0"/>
           </a:p>
         </p:txBody>
       </p:sp>
     </p:spTree>
     <p:extLst>
       <p:ext uri="{BB962C8B-B14F-4D97-AF65-F5344CB8AC3E}">
-        <p14:creationId xmlns:p14="http://schemas.microsoft.com/office/powerpoint/2010/main" val="1618539872"/>
+        <p14:creationId xmlns:p14="http://schemas.microsoft.com/office/powerpoint/2010/main" val="398696649"/>
       </p:ext>
     </p:extLst>
   </p:cSld>
@@ -4897,7 +5534,7 @@
           <p:cNvPr id="2" name="Title 1">
             <a:extLst>
               <a:ext uri="{FF2B5EF4-FFF2-40B4-BE49-F238E27FC236}">
-                <a16:creationId xmlns:a16="http://schemas.microsoft.com/office/drawing/2014/main" id="{3E4A6795-1948-05E4-E562-AFED99BDA8EB}"/>
+                <a16:creationId xmlns:a16="http://schemas.microsoft.com/office/drawing/2014/main" id="{880B0B2B-72A5-EC94-B34F-BDAD21F5B01F}"/>
               </a:ext>
             </a:extLst>
           </p:cNvPr>
@@ -4908,38 +5545,33 @@
             <p:ph type="title"/>
           </p:nvPr>
         </p:nvSpPr>
-        <p:spPr>
-          <a:xfrm>
-            <a:off x="165093" y="365124"/>
-            <a:ext cx="2802278" cy="3063875"/>
-          </a:xfrm>
-        </p:spPr>
-        <p:txBody>
-          <a:bodyPr>
-            <a:normAutofit fontScale="90000"/>
-          </a:bodyPr>
-          <a:lstStyle/>
-          <a:p>
-            <a:r>
-              <a:rPr lang="en-US" sz="3200" dirty="0"/>
-              <a:t>Int1 water step</a:t>
-            </a:r>
-            <a:br>
-              <a:rPr lang="en-US" sz="3200" dirty="0"/>
-            </a:br>
-            <a:r>
-              <a:rPr lang="en-US" sz="3200" dirty="0"/>
-              <a:t>--linear time trend and TWW difference remain in step model (as expected here)</a:t>
-            </a:r>
+        <p:spPr/>
+        <p:txBody>
+          <a:bodyPr/>
+          <a:lstStyle/>
+          <a:p>
+            <a:r>
+              <a:rPr lang="en-US" sz="4400" dirty="0"/>
+              <a:t>Int1 water </a:t>
+            </a:r>
+            <a:r>
+              <a:rPr lang="en-US" sz="4400" dirty="0" err="1"/>
+              <a:t>glm</a:t>
+            </a:r>
+            <a:r>
+              <a:rPr lang="en-US" sz="4400" dirty="0"/>
+              <a:t> full model</a:t>
+            </a:r>
+            <a:endParaRPr lang="en-US" dirty="0"/>
           </a:p>
         </p:txBody>
       </p:sp>
       <p:pic>
         <p:nvPicPr>
-          <p:cNvPr id="4" name="Picture 3">
-            <a:extLst>
-              <a:ext uri="{FF2B5EF4-FFF2-40B4-BE49-F238E27FC236}">
-                <a16:creationId xmlns:a16="http://schemas.microsoft.com/office/drawing/2014/main" id="{008CCC78-2D60-36A1-1E80-03F85298B888}"/>
+          <p:cNvPr id="5" name="Picture 4">
+            <a:extLst>
+              <a:ext uri="{FF2B5EF4-FFF2-40B4-BE49-F238E27FC236}">
+                <a16:creationId xmlns:a16="http://schemas.microsoft.com/office/drawing/2014/main" id="{E7C818A7-3DF2-C1DC-6438-95E9FB534E02}"/>
               </a:ext>
             </a:extLst>
           </p:cNvPr>
@@ -4956,18 +5588,59 @@
         </p:blipFill>
         <p:spPr>
           <a:xfrm>
-            <a:off x="3387585" y="902683"/>
-            <a:ext cx="7864813" cy="4287384"/>
+            <a:off x="5098107" y="1690688"/>
+            <a:ext cx="7337449" cy="3514792"/>
           </a:xfrm>
           <a:prstGeom prst="rect">
             <a:avLst/>
           </a:prstGeom>
         </p:spPr>
       </p:pic>
+      <p:sp>
+        <p:nvSpPr>
+          <p:cNvPr id="6" name="Content Placeholder 2">
+            <a:extLst>
+              <a:ext uri="{FF2B5EF4-FFF2-40B4-BE49-F238E27FC236}">
+                <a16:creationId xmlns:a16="http://schemas.microsoft.com/office/drawing/2014/main" id="{93ED4387-DD53-A918-6452-A669273CD6C8}"/>
+              </a:ext>
+            </a:extLst>
+          </p:cNvPr>
+          <p:cNvSpPr>
+            <a:spLocks noGrp="1"/>
+          </p:cNvSpPr>
+          <p:nvPr>
+            <p:ph idx="1"/>
+          </p:nvPr>
+        </p:nvSpPr>
+        <p:spPr>
+          <a:xfrm>
+            <a:off x="423334" y="1597025"/>
+            <a:ext cx="4385733" cy="4351338"/>
+          </a:xfrm>
+        </p:spPr>
+        <p:txBody>
+          <a:bodyPr>
+            <a:normAutofit/>
+          </a:bodyPr>
+          <a:lstStyle/>
+          <a:p>
+            <a:r>
+              <a:rPr lang="en-US" dirty="0"/>
+              <a:t>Treatment type significant in the full model, positive bump for amended water</a:t>
+            </a:r>
+          </a:p>
+          <a:p>
+            <a:r>
+              <a:rPr lang="en-US" dirty="0"/>
+              <a:t>Time, linear or cubic</a:t>
+            </a:r>
+          </a:p>
+        </p:txBody>
+      </p:sp>
     </p:spTree>
     <p:extLst>
       <p:ext uri="{BB962C8B-B14F-4D97-AF65-F5344CB8AC3E}">
-        <p14:creationId xmlns:p14="http://schemas.microsoft.com/office/powerpoint/2010/main" val="58590973"/>
+        <p14:creationId xmlns:p14="http://schemas.microsoft.com/office/powerpoint/2010/main" val="1618539872"/>
       </p:ext>
     </p:extLst>
   </p:cSld>
@@ -4999,7 +5672,7 @@
           <p:cNvPr id="2" name="Title 1">
             <a:extLst>
               <a:ext uri="{FF2B5EF4-FFF2-40B4-BE49-F238E27FC236}">
-                <a16:creationId xmlns:a16="http://schemas.microsoft.com/office/drawing/2014/main" id="{9C84FB5B-3548-57AF-0BDE-3735ECDD4D50}"/>
+                <a16:creationId xmlns:a16="http://schemas.microsoft.com/office/drawing/2014/main" id="{3E4A6795-1948-05E4-E562-AFED99BDA8EB}"/>
               </a:ext>
             </a:extLst>
           </p:cNvPr>
@@ -5012,29 +5685,36 @@
         </p:nvSpPr>
         <p:spPr>
           <a:xfrm>
-            <a:off x="0" y="0"/>
-            <a:ext cx="2452255" cy="1603513"/>
+            <a:off x="165093" y="365124"/>
+            <a:ext cx="2802278" cy="3063875"/>
           </a:xfrm>
         </p:spPr>
         <p:txBody>
           <a:bodyPr>
-            <a:normAutofit/>
+            <a:normAutofit fontScale="90000"/>
           </a:bodyPr>
           <a:lstStyle/>
           <a:p>
             <a:r>
-              <a:rPr lang="en-US" sz="2000" dirty="0"/>
-              <a:t>sul1 data transformation</a:t>
+              <a:rPr lang="en-US" sz="3200" dirty="0"/>
+              <a:t>Int1 water step</a:t>
+            </a:r>
+            <a:br>
+              <a:rPr lang="en-US" sz="3200" dirty="0"/>
+            </a:br>
+            <a:r>
+              <a:rPr lang="en-US" sz="3200" dirty="0"/>
+              <a:t>--linear time trend (and cubic) and positive TWW difference remain in step model</a:t>
             </a:r>
           </a:p>
         </p:txBody>
       </p:sp>
       <p:pic>
         <p:nvPicPr>
-          <p:cNvPr id="4" name="Picture 3">
-            <a:extLst>
-              <a:ext uri="{FF2B5EF4-FFF2-40B4-BE49-F238E27FC236}">
-                <a16:creationId xmlns:a16="http://schemas.microsoft.com/office/drawing/2014/main" id="{97651B08-6696-7317-5DEE-301ABA5FFE75}"/>
+          <p:cNvPr id="5" name="Picture 4">
+            <a:extLst>
+              <a:ext uri="{FF2B5EF4-FFF2-40B4-BE49-F238E27FC236}">
+                <a16:creationId xmlns:a16="http://schemas.microsoft.com/office/drawing/2014/main" id="{FF1806D1-247F-CD37-5ACC-5BEADFF92ADA}"/>
               </a:ext>
             </a:extLst>
           </p:cNvPr>
@@ -5051,8 +5731,38 @@
         </p:blipFill>
         <p:spPr>
           <a:xfrm>
-            <a:off x="1961221" y="308759"/>
-            <a:ext cx="9679186" cy="6015727"/>
+            <a:off x="289003" y="4538110"/>
+            <a:ext cx="5356735" cy="1659489"/>
+          </a:xfrm>
+          <a:prstGeom prst="rect">
+            <a:avLst/>
+          </a:prstGeom>
+        </p:spPr>
+      </p:pic>
+      <p:pic>
+        <p:nvPicPr>
+          <p:cNvPr id="7" name="Picture 6">
+            <a:extLst>
+              <a:ext uri="{FF2B5EF4-FFF2-40B4-BE49-F238E27FC236}">
+                <a16:creationId xmlns:a16="http://schemas.microsoft.com/office/drawing/2014/main" id="{2FC323EE-AC68-9DA9-3625-5C7FEDA2F720}"/>
+              </a:ext>
+            </a:extLst>
+          </p:cNvPr>
+          <p:cNvPicPr>
+            <a:picLocks noChangeAspect="1"/>
+          </p:cNvPicPr>
+          <p:nvPr/>
+        </p:nvPicPr>
+        <p:blipFill>
+          <a:blip r:embed="rId3"/>
+          <a:stretch>
+            <a:fillRect/>
+          </a:stretch>
+        </p:blipFill>
+        <p:spPr>
+          <a:xfrm>
+            <a:off x="3871588" y="365124"/>
+            <a:ext cx="8012824" cy="3800476"/>
           </a:xfrm>
           <a:prstGeom prst="rect">
             <a:avLst/>
@@ -5062,7 +5772,7 @@
     </p:spTree>
     <p:extLst>
       <p:ext uri="{BB962C8B-B14F-4D97-AF65-F5344CB8AC3E}">
-        <p14:creationId xmlns:p14="http://schemas.microsoft.com/office/powerpoint/2010/main" val="1208020300"/>
+        <p14:creationId xmlns:p14="http://schemas.microsoft.com/office/powerpoint/2010/main" val="58590973"/>
       </p:ext>
     </p:extLst>
   </p:cSld>
@@ -5094,7 +5804,7 @@
           <p:cNvPr id="2" name="Title 1">
             <a:extLst>
               <a:ext uri="{FF2B5EF4-FFF2-40B4-BE49-F238E27FC236}">
-                <a16:creationId xmlns:a16="http://schemas.microsoft.com/office/drawing/2014/main" id="{025F02F3-BDAC-E626-9ABE-6CA53229CB91}"/>
+                <a16:creationId xmlns:a16="http://schemas.microsoft.com/office/drawing/2014/main" id="{9C84FB5B-3548-57AF-0BDE-3735ECDD4D50}"/>
               </a:ext>
             </a:extLst>
           </p:cNvPr>
@@ -5105,56 +5815,136 @@
             <p:ph type="title"/>
           </p:nvPr>
         </p:nvSpPr>
-        <p:spPr/>
-        <p:txBody>
-          <a:bodyPr/>
-          <a:lstStyle/>
-          <a:p>
-            <a:r>
-              <a:rPr lang="en-US" sz="4400" dirty="0"/>
-              <a:t>Sul1 water </a:t>
-            </a:r>
-            <a:r>
-              <a:rPr lang="en-US" sz="4400" dirty="0" err="1"/>
-              <a:t>glm</a:t>
-            </a:r>
-            <a:r>
-              <a:rPr lang="en-US" sz="4400" dirty="0"/>
-              <a:t> full model</a:t>
-            </a:r>
-            <a:endParaRPr lang="en-US" dirty="0"/>
-          </a:p>
-        </p:txBody>
-      </p:sp>
-      <p:sp>
-        <p:nvSpPr>
-          <p:cNvPr id="3" name="Content Placeholder 2">
-            <a:extLst>
-              <a:ext uri="{FF2B5EF4-FFF2-40B4-BE49-F238E27FC236}">
-                <a16:creationId xmlns:a16="http://schemas.microsoft.com/office/drawing/2014/main" id="{E39D94CC-20DD-FC10-547D-B114696DED20}"/>
-              </a:ext>
-            </a:extLst>
-          </p:cNvPr>
-          <p:cNvSpPr>
-            <a:spLocks noGrp="1"/>
-          </p:cNvSpPr>
-          <p:nvPr>
-            <p:ph idx="1"/>
-          </p:nvPr>
-        </p:nvSpPr>
-        <p:spPr/>
-        <p:txBody>
-          <a:bodyPr/>
-          <a:lstStyle/>
-          <a:p>
-            <a:endParaRPr lang="en-US"/>
+        <p:spPr>
+          <a:xfrm>
+            <a:off x="0" y="0"/>
+            <a:ext cx="2452255" cy="1603513"/>
+          </a:xfrm>
+        </p:spPr>
+        <p:txBody>
+          <a:bodyPr>
+            <a:normAutofit/>
+          </a:bodyPr>
+          <a:lstStyle/>
+          <a:p>
+            <a:r>
+              <a:rPr lang="en-US" sz="2000" dirty="0"/>
+              <a:t>sul1 data transformation</a:t>
+            </a:r>
+          </a:p>
+        </p:txBody>
+      </p:sp>
+      <p:pic>
+        <p:nvPicPr>
+          <p:cNvPr id="4" name="Picture 3">
+            <a:extLst>
+              <a:ext uri="{FF2B5EF4-FFF2-40B4-BE49-F238E27FC236}">
+                <a16:creationId xmlns:a16="http://schemas.microsoft.com/office/drawing/2014/main" id="{97651B08-6696-7317-5DEE-301ABA5FFE75}"/>
+              </a:ext>
+            </a:extLst>
+          </p:cNvPr>
+          <p:cNvPicPr>
+            <a:picLocks noChangeAspect="1"/>
+          </p:cNvPicPr>
+          <p:nvPr/>
+        </p:nvPicPr>
+        <p:blipFill>
+          <a:blip r:embed="rId2"/>
+          <a:stretch>
+            <a:fillRect/>
+          </a:stretch>
+        </p:blipFill>
+        <p:spPr>
+          <a:xfrm>
+            <a:off x="3200399" y="1078923"/>
+            <a:ext cx="8440007" cy="5245563"/>
+          </a:xfrm>
+          <a:prstGeom prst="rect">
+            <a:avLst/>
+          </a:prstGeom>
+        </p:spPr>
+      </p:pic>
+      <p:sp>
+        <p:nvSpPr>
+          <p:cNvPr id="3" name="Title 1">
+            <a:extLst>
+              <a:ext uri="{FF2B5EF4-FFF2-40B4-BE49-F238E27FC236}">
+                <a16:creationId xmlns:a16="http://schemas.microsoft.com/office/drawing/2014/main" id="{330D583D-B132-00CF-75BB-CBED96D89248}"/>
+              </a:ext>
+            </a:extLst>
+          </p:cNvPr>
+          <p:cNvSpPr txBox="1">
+            <a:spLocks/>
+          </p:cNvSpPr>
+          <p:nvPr/>
+        </p:nvSpPr>
+        <p:spPr>
+          <a:xfrm>
+            <a:off x="106878" y="1524174"/>
+            <a:ext cx="3143634" cy="3362521"/>
+          </a:xfrm>
+          <a:prstGeom prst="rect">
+            <a:avLst/>
+          </a:prstGeom>
+        </p:spPr>
+        <p:txBody>
+          <a:bodyPr vert="horz" lIns="91440" tIns="45720" rIns="91440" bIns="45720" rtlCol="0" anchor="ctr">
+            <a:noAutofit/>
+          </a:bodyPr>
+          <a:lstStyle>
+            <a:lvl1pPr algn="l" defTabSz="914400" rtl="0" eaLnBrk="1" latinLnBrk="0" hangingPunct="1">
+              <a:lnSpc>
+                <a:spcPct val="90000"/>
+              </a:lnSpc>
+              <a:spcBef>
+                <a:spcPct val="0"/>
+              </a:spcBef>
+              <a:buNone/>
+              <a:defRPr sz="4400" kern="1200">
+                <a:solidFill>
+                  <a:schemeClr val="tx1"/>
+                </a:solidFill>
+                <a:latin typeface="+mj-lt"/>
+                <a:ea typeface="+mj-ea"/>
+                <a:cs typeface="+mj-cs"/>
+              </a:defRPr>
+            </a:lvl1pPr>
+          </a:lstStyle>
+          <a:p>
+            <a:r>
+              <a:rPr lang="en-US" sz="2000" dirty="0"/>
+              <a:t>-Shapiro-Wilks normality statistic (W), range from 0 to 1, with 1 being perfectly normal</a:t>
+            </a:r>
+          </a:p>
+          <a:p>
+            <a:r>
+              <a:rPr lang="en-US" sz="2000" dirty="0"/>
+              <a:t>-These transformations are good and induce normality.</a:t>
+            </a:r>
+          </a:p>
+          <a:p>
+            <a:r>
+              <a:rPr lang="en-US" sz="2000" dirty="0"/>
+              <a:t>-They </a:t>
+            </a:r>
+            <a:r>
+              <a:rPr lang="en-US" sz="2000" dirty="0" err="1"/>
+              <a:t>transfomrations</a:t>
+            </a:r>
+            <a:r>
+              <a:rPr lang="en-US" sz="2000" dirty="0"/>
+              <a:t> are essentially tied to 3 significant digits</a:t>
+            </a:r>
+          </a:p>
+          <a:p>
+            <a:endParaRPr lang="en-US" sz="2000" dirty="0"/>
           </a:p>
         </p:txBody>
       </p:sp>
     </p:spTree>
     <p:extLst>
       <p:ext uri="{BB962C8B-B14F-4D97-AF65-F5344CB8AC3E}">
-        <p14:creationId xmlns:p14="http://schemas.microsoft.com/office/powerpoint/2010/main" val="2587548707"/>
+        <p14:creationId xmlns:p14="http://schemas.microsoft.com/office/powerpoint/2010/main" val="1208020300"/>
       </p:ext>
     </p:extLst>
   </p:cSld>
@@ -5186,7 +5976,7 @@
           <p:cNvPr id="2" name="Title 1">
             <a:extLst>
               <a:ext uri="{FF2B5EF4-FFF2-40B4-BE49-F238E27FC236}">
-                <a16:creationId xmlns:a16="http://schemas.microsoft.com/office/drawing/2014/main" id="{3E4A6795-1948-05E4-E562-AFED99BDA8EB}"/>
+                <a16:creationId xmlns:a16="http://schemas.microsoft.com/office/drawing/2014/main" id="{025F02F3-BDAC-E626-9ABE-6CA53229CB91}"/>
               </a:ext>
             </a:extLst>
           </p:cNvPr>
@@ -5199,40 +5989,36 @@
         </p:nvSpPr>
         <p:spPr>
           <a:xfrm>
-            <a:off x="165093" y="365124"/>
-            <a:ext cx="2802278" cy="3063875"/>
-          </a:xfrm>
-        </p:spPr>
-        <p:txBody>
-          <a:bodyPr>
-            <a:normAutofit/>
-          </a:bodyPr>
-          <a:lstStyle/>
-          <a:p>
-            <a:r>
-              <a:rPr lang="en-US" sz="3200" dirty="0"/>
-              <a:t>Sul1 water full </a:t>
-            </a:r>
-            <a:r>
-              <a:rPr lang="en-US" sz="3200" dirty="0" err="1"/>
+            <a:off x="651934" y="0"/>
+            <a:ext cx="10515600" cy="1325563"/>
+          </a:xfrm>
+        </p:spPr>
+        <p:txBody>
+          <a:bodyPr/>
+          <a:lstStyle/>
+          <a:p>
+            <a:r>
+              <a:rPr lang="en-US" sz="4400" dirty="0"/>
+              <a:t>Sul1 water </a:t>
+            </a:r>
+            <a:r>
+              <a:rPr lang="en-US" sz="4400" dirty="0" err="1"/>
               <a:t>glm</a:t>
             </a:r>
-            <a:br>
-              <a:rPr lang="en-US" sz="3200" dirty="0"/>
-            </a:br>
-            <a:r>
-              <a:rPr lang="en-US" sz="3200" dirty="0"/>
-              <a:t>--time trend and TWW difference remain</a:t>
-            </a:r>
+            <a:r>
+              <a:rPr lang="en-US" sz="4400" dirty="0"/>
+              <a:t> full model</a:t>
+            </a:r>
+            <a:endParaRPr lang="en-US" dirty="0"/>
           </a:p>
         </p:txBody>
       </p:sp>
       <p:pic>
         <p:nvPicPr>
-          <p:cNvPr id="4" name="Picture 3">
-            <a:extLst>
-              <a:ext uri="{FF2B5EF4-FFF2-40B4-BE49-F238E27FC236}">
-                <a16:creationId xmlns:a16="http://schemas.microsoft.com/office/drawing/2014/main" id="{57A0B7CD-0918-0D36-A450-87E07F719F3F}"/>
+          <p:cNvPr id="5" name="Picture 4">
+            <a:extLst>
+              <a:ext uri="{FF2B5EF4-FFF2-40B4-BE49-F238E27FC236}">
+                <a16:creationId xmlns:a16="http://schemas.microsoft.com/office/drawing/2014/main" id="{D3D245D1-F2BF-05B7-95F7-8DC0B59C0DEC}"/>
               </a:ext>
             </a:extLst>
           </p:cNvPr>
@@ -5249,18 +6035,59 @@
         </p:blipFill>
         <p:spPr>
           <a:xfrm>
-            <a:off x="3495548" y="365123"/>
-            <a:ext cx="8206595" cy="5747809"/>
+            <a:off x="4664075" y="1548273"/>
+            <a:ext cx="7672917" cy="3712702"/>
           </a:xfrm>
           <a:prstGeom prst="rect">
             <a:avLst/>
           </a:prstGeom>
         </p:spPr>
       </p:pic>
+      <p:sp>
+        <p:nvSpPr>
+          <p:cNvPr id="6" name="Content Placeholder 2">
+            <a:extLst>
+              <a:ext uri="{FF2B5EF4-FFF2-40B4-BE49-F238E27FC236}">
+                <a16:creationId xmlns:a16="http://schemas.microsoft.com/office/drawing/2014/main" id="{83E7A17F-5CF9-C210-6936-EBF481812FD2}"/>
+              </a:ext>
+            </a:extLst>
+          </p:cNvPr>
+          <p:cNvSpPr>
+            <a:spLocks noGrp="1"/>
+          </p:cNvSpPr>
+          <p:nvPr>
+            <p:ph idx="1"/>
+          </p:nvPr>
+        </p:nvSpPr>
+        <p:spPr>
+          <a:xfrm>
+            <a:off x="152401" y="1402291"/>
+            <a:ext cx="4385733" cy="4351338"/>
+          </a:xfrm>
+        </p:spPr>
+        <p:txBody>
+          <a:bodyPr>
+            <a:normAutofit/>
+          </a:bodyPr>
+          <a:lstStyle/>
+          <a:p>
+            <a:r>
+              <a:rPr lang="en-US" dirty="0"/>
+              <a:t>Treatment type significant in the full model, positive bump for amended water</a:t>
+            </a:r>
+          </a:p>
+          <a:p>
+            <a:r>
+              <a:rPr lang="en-US" dirty="0"/>
+              <a:t>Time, linear or cubic again</a:t>
+            </a:r>
+          </a:p>
+        </p:txBody>
+      </p:sp>
     </p:spTree>
     <p:extLst>
       <p:ext uri="{BB962C8B-B14F-4D97-AF65-F5344CB8AC3E}">
-        <p14:creationId xmlns:p14="http://schemas.microsoft.com/office/powerpoint/2010/main" val="242479201"/>
+        <p14:creationId xmlns:p14="http://schemas.microsoft.com/office/powerpoint/2010/main" val="2587548707"/>
       </p:ext>
     </p:extLst>
   </p:cSld>
@@ -5292,7 +6119,7 @@
           <p:cNvPr id="2" name="Title 1">
             <a:extLst>
               <a:ext uri="{FF2B5EF4-FFF2-40B4-BE49-F238E27FC236}">
-                <a16:creationId xmlns:a16="http://schemas.microsoft.com/office/drawing/2014/main" id="{9C84FB5B-3548-57AF-0BDE-3735ECDD4D50}"/>
+                <a16:creationId xmlns:a16="http://schemas.microsoft.com/office/drawing/2014/main" id="{3E4A6795-1948-05E4-E562-AFED99BDA8EB}"/>
               </a:ext>
             </a:extLst>
           </p:cNvPr>
@@ -5305,33 +6132,40 @@
         </p:nvSpPr>
         <p:spPr>
           <a:xfrm>
-            <a:off x="0" y="0"/>
-            <a:ext cx="2084119" cy="1603513"/>
+            <a:off x="165093" y="365124"/>
+            <a:ext cx="2802278" cy="3063875"/>
           </a:xfrm>
         </p:spPr>
         <p:txBody>
           <a:bodyPr>
-            <a:normAutofit/>
+            <a:normAutofit fontScale="90000"/>
           </a:bodyPr>
           <a:lstStyle/>
           <a:p>
             <a:r>
-              <a:rPr lang="en-US" sz="2000" dirty="0" err="1"/>
-              <a:t>P_aeruginosa</a:t>
-            </a:r>
-            <a:r>
-              <a:rPr lang="en-US" sz="2000" dirty="0"/>
-              <a:t> data transformation</a:t>
+              <a:rPr lang="en-US" sz="3200" dirty="0"/>
+              <a:t>Sul1 water step </a:t>
+            </a:r>
+            <a:r>
+              <a:rPr lang="en-US" sz="3200" dirty="0" err="1"/>
+              <a:t>glm</a:t>
+            </a:r>
+            <a:br>
+              <a:rPr lang="en-US" sz="3200" dirty="0"/>
+            </a:br>
+            <a:r>
+              <a:rPr lang="en-US" sz="3200" dirty="0"/>
+              <a:t>--time trend and TWW difference remain, step wise does not drop anything</a:t>
             </a:r>
           </a:p>
         </p:txBody>
       </p:sp>
       <p:pic>
         <p:nvPicPr>
-          <p:cNvPr id="4" name="Picture 3">
-            <a:extLst>
-              <a:ext uri="{FF2B5EF4-FFF2-40B4-BE49-F238E27FC236}">
-                <a16:creationId xmlns:a16="http://schemas.microsoft.com/office/drawing/2014/main" id="{6ACAB44D-352E-B3C8-C2C8-6B424B548DDD}"/>
+          <p:cNvPr id="5" name="Picture 4">
+            <a:extLst>
+              <a:ext uri="{FF2B5EF4-FFF2-40B4-BE49-F238E27FC236}">
+                <a16:creationId xmlns:a16="http://schemas.microsoft.com/office/drawing/2014/main" id="{DC33E7FE-C537-016B-1F07-3D09DEF26E92}"/>
               </a:ext>
             </a:extLst>
           </p:cNvPr>
@@ -5348,8 +6182,38 @@
         </p:blipFill>
         <p:spPr>
           <a:xfrm>
-            <a:off x="2220685" y="554052"/>
-            <a:ext cx="9378571" cy="5854799"/>
+            <a:off x="449726" y="4527526"/>
+            <a:ext cx="4692819" cy="1678539"/>
+          </a:xfrm>
+          <a:prstGeom prst="rect">
+            <a:avLst/>
+          </a:prstGeom>
+        </p:spPr>
+      </p:pic>
+      <p:pic>
+        <p:nvPicPr>
+          <p:cNvPr id="7" name="Picture 6">
+            <a:extLst>
+              <a:ext uri="{FF2B5EF4-FFF2-40B4-BE49-F238E27FC236}">
+                <a16:creationId xmlns:a16="http://schemas.microsoft.com/office/drawing/2014/main" id="{C9A8B643-6D85-FEB2-F07E-F15AB87715F8}"/>
+              </a:ext>
+            </a:extLst>
+          </p:cNvPr>
+          <p:cNvPicPr>
+            <a:picLocks noChangeAspect="1"/>
+          </p:cNvPicPr>
+          <p:nvPr/>
+        </p:nvPicPr>
+        <p:blipFill>
+          <a:blip r:embed="rId3"/>
+          <a:stretch>
+            <a:fillRect/>
+          </a:stretch>
+        </p:blipFill>
+        <p:spPr>
+          <a:xfrm>
+            <a:off x="3977075" y="423278"/>
+            <a:ext cx="7820977" cy="3738100"/>
           </a:xfrm>
           <a:prstGeom prst="rect">
             <a:avLst/>
@@ -5359,7 +6223,7 @@
     </p:spTree>
     <p:extLst>
       <p:ext uri="{BB962C8B-B14F-4D97-AF65-F5344CB8AC3E}">
-        <p14:creationId xmlns:p14="http://schemas.microsoft.com/office/powerpoint/2010/main" val="593966935"/>
+        <p14:creationId xmlns:p14="http://schemas.microsoft.com/office/powerpoint/2010/main" val="242479201"/>
       </p:ext>
     </p:extLst>
   </p:cSld>
@@ -5391,7 +6255,7 @@
           <p:cNvPr id="2" name="Title 1">
             <a:extLst>
               <a:ext uri="{FF2B5EF4-FFF2-40B4-BE49-F238E27FC236}">
-                <a16:creationId xmlns:a16="http://schemas.microsoft.com/office/drawing/2014/main" id="{6B3A9909-8773-5ACC-183C-4F680AC205DF}"/>
+                <a16:creationId xmlns:a16="http://schemas.microsoft.com/office/drawing/2014/main" id="{9C84FB5B-3548-57AF-0BDE-3735ECDD4D50}"/>
               </a:ext>
             </a:extLst>
           </p:cNvPr>
@@ -5402,56 +6266,126 @@
             <p:ph type="title"/>
           </p:nvPr>
         </p:nvSpPr>
-        <p:spPr/>
-        <p:txBody>
-          <a:bodyPr/>
-          <a:lstStyle/>
-          <a:p>
-            <a:r>
-              <a:rPr lang="en-US" sz="4400"/>
-              <a:t>P aeruginosa water </a:t>
-            </a:r>
-            <a:r>
-              <a:rPr lang="en-US" sz="4400" dirty="0" err="1"/>
-              <a:t>glm</a:t>
-            </a:r>
-            <a:r>
-              <a:rPr lang="en-US" sz="4400" dirty="0"/>
-              <a:t> full model</a:t>
-            </a:r>
-            <a:endParaRPr lang="en-US" dirty="0"/>
-          </a:p>
-        </p:txBody>
-      </p:sp>
-      <p:sp>
-        <p:nvSpPr>
-          <p:cNvPr id="3" name="Content Placeholder 2">
-            <a:extLst>
-              <a:ext uri="{FF2B5EF4-FFF2-40B4-BE49-F238E27FC236}">
-                <a16:creationId xmlns:a16="http://schemas.microsoft.com/office/drawing/2014/main" id="{81D5F5E7-8F83-4BB1-DDF9-05EA4EC102D9}"/>
-              </a:ext>
-            </a:extLst>
-          </p:cNvPr>
-          <p:cNvSpPr>
-            <a:spLocks noGrp="1"/>
-          </p:cNvSpPr>
-          <p:nvPr>
-            <p:ph idx="1"/>
-          </p:nvPr>
-        </p:nvSpPr>
-        <p:spPr/>
-        <p:txBody>
-          <a:bodyPr/>
-          <a:lstStyle/>
-          <a:p>
-            <a:endParaRPr lang="en-US"/>
+        <p:spPr>
+          <a:xfrm>
+            <a:off x="0" y="0"/>
+            <a:ext cx="2084119" cy="1603513"/>
+          </a:xfrm>
+        </p:spPr>
+        <p:txBody>
+          <a:bodyPr>
+            <a:normAutofit/>
+          </a:bodyPr>
+          <a:lstStyle/>
+          <a:p>
+            <a:r>
+              <a:rPr lang="en-US" sz="2000" dirty="0" err="1"/>
+              <a:t>P_aeruginosa</a:t>
+            </a:r>
+            <a:r>
+              <a:rPr lang="en-US" sz="2000" dirty="0"/>
+              <a:t> data transformation</a:t>
+            </a:r>
+          </a:p>
+        </p:txBody>
+      </p:sp>
+      <p:pic>
+        <p:nvPicPr>
+          <p:cNvPr id="4" name="Picture 3">
+            <a:extLst>
+              <a:ext uri="{FF2B5EF4-FFF2-40B4-BE49-F238E27FC236}">
+                <a16:creationId xmlns:a16="http://schemas.microsoft.com/office/drawing/2014/main" id="{6ACAB44D-352E-B3C8-C2C8-6B424B548DDD}"/>
+              </a:ext>
+            </a:extLst>
+          </p:cNvPr>
+          <p:cNvPicPr>
+            <a:picLocks noChangeAspect="1"/>
+          </p:cNvPicPr>
+          <p:nvPr/>
+        </p:nvPicPr>
+        <p:blipFill>
+          <a:blip r:embed="rId2"/>
+          <a:stretch>
+            <a:fillRect/>
+          </a:stretch>
+        </p:blipFill>
+        <p:spPr>
+          <a:xfrm>
+            <a:off x="3490518" y="1278467"/>
+            <a:ext cx="8134138" cy="5077932"/>
+          </a:xfrm>
+          <a:prstGeom prst="rect">
+            <a:avLst/>
+          </a:prstGeom>
+        </p:spPr>
+      </p:pic>
+      <p:sp>
+        <p:nvSpPr>
+          <p:cNvPr id="3" name="Title 1">
+            <a:extLst>
+              <a:ext uri="{FF2B5EF4-FFF2-40B4-BE49-F238E27FC236}">
+                <a16:creationId xmlns:a16="http://schemas.microsoft.com/office/drawing/2014/main" id="{22DA630C-AED8-7E04-E529-622B6AFD023D}"/>
+              </a:ext>
+            </a:extLst>
+          </p:cNvPr>
+          <p:cNvSpPr txBox="1">
+            <a:spLocks/>
+          </p:cNvSpPr>
+          <p:nvPr/>
+        </p:nvSpPr>
+        <p:spPr>
+          <a:xfrm>
+            <a:off x="106878" y="1524174"/>
+            <a:ext cx="3143634" cy="3362521"/>
+          </a:xfrm>
+          <a:prstGeom prst="rect">
+            <a:avLst/>
+          </a:prstGeom>
+        </p:spPr>
+        <p:txBody>
+          <a:bodyPr vert="horz" lIns="91440" tIns="45720" rIns="91440" bIns="45720" rtlCol="0" anchor="ctr">
+            <a:noAutofit/>
+          </a:bodyPr>
+          <a:lstStyle>
+            <a:lvl1pPr algn="l" defTabSz="914400" rtl="0" eaLnBrk="1" latinLnBrk="0" hangingPunct="1">
+              <a:lnSpc>
+                <a:spcPct val="90000"/>
+              </a:lnSpc>
+              <a:spcBef>
+                <a:spcPct val="0"/>
+              </a:spcBef>
+              <a:buNone/>
+              <a:defRPr sz="4400" kern="1200">
+                <a:solidFill>
+                  <a:schemeClr val="tx1"/>
+                </a:solidFill>
+                <a:latin typeface="+mj-lt"/>
+                <a:ea typeface="+mj-ea"/>
+                <a:cs typeface="+mj-cs"/>
+              </a:defRPr>
+            </a:lvl1pPr>
+          </a:lstStyle>
+          <a:p>
+            <a:r>
+              <a:rPr lang="en-US" sz="2000" dirty="0"/>
+              <a:t>-Shapiro-Wilks normality statistic (W), range from 0 to 1, with 1 being perfectly normal</a:t>
+            </a:r>
+          </a:p>
+          <a:p>
+            <a:r>
+              <a:rPr lang="en-US" sz="2000" dirty="0"/>
+              <a:t>-Box cox does a much better job here.</a:t>
+            </a:r>
+          </a:p>
+          <a:p>
+            <a:endParaRPr lang="en-US" sz="2000" dirty="0"/>
           </a:p>
         </p:txBody>
       </p:sp>
     </p:spTree>
     <p:extLst>
       <p:ext uri="{BB962C8B-B14F-4D97-AF65-F5344CB8AC3E}">
-        <p14:creationId xmlns:p14="http://schemas.microsoft.com/office/powerpoint/2010/main" val="246760938"/>
+        <p14:creationId xmlns:p14="http://schemas.microsoft.com/office/powerpoint/2010/main" val="593966935"/>
       </p:ext>
     </p:extLst>
   </p:cSld>
@@ -5483,7 +6417,7 @@
           <p:cNvPr id="2" name="Title 1">
             <a:extLst>
               <a:ext uri="{FF2B5EF4-FFF2-40B4-BE49-F238E27FC236}">
-                <a16:creationId xmlns:a16="http://schemas.microsoft.com/office/drawing/2014/main" id="{3E4A6795-1948-05E4-E562-AFED99BDA8EB}"/>
+                <a16:creationId xmlns:a16="http://schemas.microsoft.com/office/drawing/2014/main" id="{6B3A9909-8773-5ACC-183C-4F680AC205DF}"/>
               </a:ext>
             </a:extLst>
           </p:cNvPr>
@@ -5494,38 +6428,33 @@
             <p:ph type="title"/>
           </p:nvPr>
         </p:nvSpPr>
-        <p:spPr>
-          <a:xfrm>
-            <a:off x="165093" y="365124"/>
-            <a:ext cx="2802278" cy="3063875"/>
-          </a:xfrm>
-        </p:spPr>
-        <p:txBody>
-          <a:bodyPr>
-            <a:normAutofit/>
-          </a:bodyPr>
-          <a:lstStyle/>
-          <a:p>
-            <a:r>
-              <a:rPr lang="en-US" sz="3200" dirty="0"/>
-              <a:t>P. aeruginosa water step</a:t>
-            </a:r>
-            <a:br>
-              <a:rPr lang="en-US" sz="3200" dirty="0"/>
-            </a:br>
-            <a:r>
-              <a:rPr lang="en-US" sz="3200" dirty="0"/>
-              <a:t>-still nothing significant</a:t>
-            </a:r>
+        <p:spPr/>
+        <p:txBody>
+          <a:bodyPr/>
+          <a:lstStyle/>
+          <a:p>
+            <a:r>
+              <a:rPr lang="en-US" sz="4400"/>
+              <a:t>P aeruginosa water </a:t>
+            </a:r>
+            <a:r>
+              <a:rPr lang="en-US" sz="4400" dirty="0" err="1"/>
+              <a:t>glm</a:t>
+            </a:r>
+            <a:r>
+              <a:rPr lang="en-US" sz="4400" dirty="0"/>
+              <a:t> full model</a:t>
+            </a:r>
+            <a:endParaRPr lang="en-US" dirty="0"/>
           </a:p>
         </p:txBody>
       </p:sp>
       <p:pic>
         <p:nvPicPr>
-          <p:cNvPr id="4" name="Picture 3">
-            <a:extLst>
-              <a:ext uri="{FF2B5EF4-FFF2-40B4-BE49-F238E27FC236}">
-                <a16:creationId xmlns:a16="http://schemas.microsoft.com/office/drawing/2014/main" id="{EE579431-4984-DD87-CD21-D8A00CC57FFB}"/>
+          <p:cNvPr id="5" name="Picture 4">
+            <a:extLst>
+              <a:ext uri="{FF2B5EF4-FFF2-40B4-BE49-F238E27FC236}">
+                <a16:creationId xmlns:a16="http://schemas.microsoft.com/office/drawing/2014/main" id="{6C7CFA5E-BB4D-A043-07D5-BD3D13629648}"/>
               </a:ext>
             </a:extLst>
           </p:cNvPr>
@@ -5542,18 +6471,84 @@
         </p:blipFill>
         <p:spPr>
           <a:xfrm>
-            <a:off x="3711452" y="990474"/>
-            <a:ext cx="8461645" cy="4326593"/>
+            <a:off x="3526227" y="1611774"/>
+            <a:ext cx="8482626" cy="4170959"/>
           </a:xfrm>
           <a:prstGeom prst="rect">
             <a:avLst/>
           </a:prstGeom>
         </p:spPr>
       </p:pic>
+      <p:sp>
+        <p:nvSpPr>
+          <p:cNvPr id="6" name="Title 1">
+            <a:extLst>
+              <a:ext uri="{FF2B5EF4-FFF2-40B4-BE49-F238E27FC236}">
+                <a16:creationId xmlns:a16="http://schemas.microsoft.com/office/drawing/2014/main" id="{8787BB0A-1EBD-5669-AAA4-B232DFA5E2AD}"/>
+              </a:ext>
+            </a:extLst>
+          </p:cNvPr>
+          <p:cNvSpPr txBox="1">
+            <a:spLocks/>
+          </p:cNvSpPr>
+          <p:nvPr/>
+        </p:nvSpPr>
+        <p:spPr>
+          <a:xfrm>
+            <a:off x="292093" y="1770591"/>
+            <a:ext cx="2802278" cy="3063875"/>
+          </a:xfrm>
+          <a:prstGeom prst="rect">
+            <a:avLst/>
+          </a:prstGeom>
+        </p:spPr>
+        <p:txBody>
+          <a:bodyPr vert="horz" lIns="91440" tIns="45720" rIns="91440" bIns="45720" rtlCol="0" anchor="ctr">
+            <a:normAutofit fontScale="75000" lnSpcReduction="20000"/>
+          </a:bodyPr>
+          <a:lstStyle>
+            <a:lvl1pPr algn="l" defTabSz="914400" rtl="0" eaLnBrk="1" latinLnBrk="0" hangingPunct="1">
+              <a:lnSpc>
+                <a:spcPct val="90000"/>
+              </a:lnSpc>
+              <a:spcBef>
+                <a:spcPct val="0"/>
+              </a:spcBef>
+              <a:buNone/>
+              <a:defRPr sz="4400" kern="1200">
+                <a:solidFill>
+                  <a:schemeClr val="tx1"/>
+                </a:solidFill>
+                <a:latin typeface="+mj-lt"/>
+                <a:ea typeface="+mj-ea"/>
+                <a:cs typeface="+mj-cs"/>
+              </a:defRPr>
+            </a:lvl1pPr>
+          </a:lstStyle>
+          <a:p>
+            <a:r>
+              <a:rPr lang="en-US" sz="3200" dirty="0"/>
+              <a:t>Not much works here, response is pretty normally distributed</a:t>
+            </a:r>
+          </a:p>
+          <a:p>
+            <a:r>
+              <a:rPr lang="en-US" sz="3200" dirty="0"/>
+              <a:t>- treatment type has positive coefficient for amended water but not significant</a:t>
+            </a:r>
+          </a:p>
+          <a:p>
+            <a:r>
+              <a:rPr lang="en-US" sz="3200" dirty="0"/>
+              <a:t>- time cubic is significant but not linear or quadratic</a:t>
+            </a:r>
+          </a:p>
+        </p:txBody>
+      </p:sp>
     </p:spTree>
     <p:extLst>
       <p:ext uri="{BB962C8B-B14F-4D97-AF65-F5344CB8AC3E}">
-        <p14:creationId xmlns:p14="http://schemas.microsoft.com/office/powerpoint/2010/main" val="866700415"/>
+        <p14:creationId xmlns:p14="http://schemas.microsoft.com/office/powerpoint/2010/main" val="246760938"/>
       </p:ext>
     </p:extLst>
   </p:cSld>
@@ -5585,7 +6580,7 @@
           <p:cNvPr id="2" name="Title 1">
             <a:extLst>
               <a:ext uri="{FF2B5EF4-FFF2-40B4-BE49-F238E27FC236}">
-                <a16:creationId xmlns:a16="http://schemas.microsoft.com/office/drawing/2014/main" id="{8AB59B44-7BB9-902F-4C8B-95F41F33EC3F}"/>
+                <a16:creationId xmlns:a16="http://schemas.microsoft.com/office/drawing/2014/main" id="{3E4A6795-1948-05E4-E562-AFED99BDA8EB}"/>
               </a:ext>
             </a:extLst>
           </p:cNvPr>
@@ -5596,122 +6591,96 @@
             <p:ph type="title"/>
           </p:nvPr>
         </p:nvSpPr>
-        <p:spPr/>
-        <p:txBody>
-          <a:bodyPr/>
-          <a:lstStyle/>
-          <a:p>
-            <a:r>
-              <a:rPr lang="en-US" dirty="0"/>
-              <a:t>Overall Results</a:t>
-            </a:r>
-          </a:p>
-        </p:txBody>
-      </p:sp>
-      <p:sp>
-        <p:nvSpPr>
-          <p:cNvPr id="3" name="Content Placeholder 2">
-            <a:extLst>
-              <a:ext uri="{FF2B5EF4-FFF2-40B4-BE49-F238E27FC236}">
-                <a16:creationId xmlns:a16="http://schemas.microsoft.com/office/drawing/2014/main" id="{21BB0896-5C7C-7A5B-F01C-18AE86E60326}"/>
-              </a:ext>
-            </a:extLst>
-          </p:cNvPr>
-          <p:cNvSpPr>
-            <a:spLocks noGrp="1"/>
-          </p:cNvSpPr>
-          <p:nvPr>
-            <p:ph idx="1"/>
-          </p:nvPr>
-        </p:nvSpPr>
-        <p:spPr/>
+        <p:spPr>
+          <a:xfrm>
+            <a:off x="138555" y="245533"/>
+            <a:ext cx="4877520" cy="2709333"/>
+          </a:xfrm>
+        </p:spPr>
         <p:txBody>
           <a:bodyPr>
-            <a:normAutofit fontScale="92500" lnSpcReduction="20000"/>
+            <a:normAutofit/>
           </a:bodyPr>
           <a:lstStyle/>
           <a:p>
             <a:r>
-              <a:rPr lang="en-US" dirty="0"/>
-              <a:t>Microplastics--Not sure how much detail you need.</a:t>
-            </a:r>
-          </a:p>
-          <a:p>
-            <a:pPr lvl="1"/>
-            <a:r>
-              <a:rPr lang="en-US" dirty="0"/>
-              <a:t>Time is significant for all the responses (p value in full model is significant and/or kept in the stepwise regression).</a:t>
-            </a:r>
-          </a:p>
-          <a:p>
-            <a:pPr lvl="1"/>
-            <a:r>
-              <a:rPr lang="en-US" dirty="0"/>
-              <a:t>LDPE often differentiates itself from other plastics (significant in 3 of the 4, still the lowest p value in the 4</a:t>
-            </a:r>
-            <a:r>
-              <a:rPr lang="en-US" baseline="30000" dirty="0"/>
-              <a:t>th</a:t>
-            </a:r>
-            <a:r>
-              <a:rPr lang="en-US" dirty="0"/>
-              <a:t>), but plastic type gets dropped in the stepwise for all but sul1. (Might be different with less plastic levels in the factor)</a:t>
-            </a:r>
-          </a:p>
-          <a:p>
-            <a:pPr lvl="1"/>
-            <a:r>
-              <a:rPr lang="en-US" dirty="0"/>
-              <a:t>Water type different for sul1 only, but I have not deleted the fb data at this point.</a:t>
-            </a:r>
-          </a:p>
-          <a:p>
-            <a:r>
-              <a:rPr lang="en-US" dirty="0"/>
-              <a:t>Water—</a:t>
-            </a:r>
-          </a:p>
-          <a:p>
-            <a:pPr lvl="1"/>
-            <a:r>
-              <a:rPr lang="en-US" dirty="0"/>
-              <a:t>S. </a:t>
-            </a:r>
-            <a:r>
-              <a:rPr lang="en-US" dirty="0" err="1"/>
-              <a:t>multophilia</a:t>
-            </a:r>
-            <a:r>
-              <a:rPr lang="en-US" dirty="0"/>
-              <a:t> there is a time trend but no difference between the water treatments.</a:t>
-            </a:r>
-          </a:p>
-          <a:p>
-            <a:pPr lvl="1"/>
-            <a:r>
-              <a:rPr lang="en-US" dirty="0"/>
-              <a:t>Int1 and sul1 both show time trends and water differences.</a:t>
-            </a:r>
-          </a:p>
-          <a:p>
-            <a:pPr lvl="1"/>
-            <a:r>
-              <a:rPr lang="en-US" dirty="0"/>
-              <a:t>P. aeruginosa no time trend or difference between the water treatments</a:t>
-            </a:r>
-          </a:p>
-          <a:p>
-            <a:r>
-              <a:rPr lang="en-US" dirty="0"/>
-              <a:t>Presumably time trends in the water may possibly be a bit of a confounding variable for interpreting the accumulation on microplastics over time.</a:t>
-            </a:r>
-          </a:p>
-        </p:txBody>
-      </p:sp>
+              <a:rPr lang="en-US" sz="3200" dirty="0"/>
+              <a:t>P. aeruginosa water step</a:t>
+            </a:r>
+            <a:br>
+              <a:rPr lang="en-US" sz="3200" dirty="0"/>
+            </a:br>
+            <a:r>
+              <a:rPr lang="en-US" sz="3200" dirty="0"/>
+              <a:t>-water treatment dropped in stepwise</a:t>
+            </a:r>
+          </a:p>
+        </p:txBody>
+      </p:sp>
+      <p:pic>
+        <p:nvPicPr>
+          <p:cNvPr id="5" name="Picture 4">
+            <a:extLst>
+              <a:ext uri="{FF2B5EF4-FFF2-40B4-BE49-F238E27FC236}">
+                <a16:creationId xmlns:a16="http://schemas.microsoft.com/office/drawing/2014/main" id="{73B3647B-71C6-43C7-3EB6-DB5627E29529}"/>
+              </a:ext>
+            </a:extLst>
+          </p:cNvPr>
+          <p:cNvPicPr>
+            <a:picLocks noChangeAspect="1"/>
+          </p:cNvPicPr>
+          <p:nvPr/>
+        </p:nvPicPr>
+        <p:blipFill>
+          <a:blip r:embed="rId2"/>
+          <a:stretch>
+            <a:fillRect/>
+          </a:stretch>
+        </p:blipFill>
+        <p:spPr>
+          <a:xfrm>
+            <a:off x="412839" y="3429000"/>
+            <a:ext cx="4328953" cy="3320037"/>
+          </a:xfrm>
+          <a:prstGeom prst="rect">
+            <a:avLst/>
+          </a:prstGeom>
+        </p:spPr>
+      </p:pic>
+      <p:pic>
+        <p:nvPicPr>
+          <p:cNvPr id="7" name="Picture 6">
+            <a:extLst>
+              <a:ext uri="{FF2B5EF4-FFF2-40B4-BE49-F238E27FC236}">
+                <a16:creationId xmlns:a16="http://schemas.microsoft.com/office/drawing/2014/main" id="{3D2ED3EA-C73B-78C2-0743-E2CA83FEB051}"/>
+              </a:ext>
+            </a:extLst>
+          </p:cNvPr>
+          <p:cNvPicPr>
+            <a:picLocks noChangeAspect="1"/>
+          </p:cNvPicPr>
+          <p:nvPr/>
+        </p:nvPicPr>
+        <p:blipFill>
+          <a:blip r:embed="rId3"/>
+          <a:stretch>
+            <a:fillRect/>
+          </a:stretch>
+        </p:blipFill>
+        <p:spPr>
+          <a:xfrm>
+            <a:off x="5016075" y="522221"/>
+            <a:ext cx="7037370" cy="3804245"/>
+          </a:xfrm>
+          <a:prstGeom prst="rect">
+            <a:avLst/>
+          </a:prstGeom>
+        </p:spPr>
+      </p:pic>
     </p:spTree>
     <p:extLst>
       <p:ext uri="{BB962C8B-B14F-4D97-AF65-F5344CB8AC3E}">
-        <p14:creationId xmlns:p14="http://schemas.microsoft.com/office/powerpoint/2010/main" val="1199600328"/>
+        <p14:creationId xmlns:p14="http://schemas.microsoft.com/office/powerpoint/2010/main" val="866700415"/>
       </p:ext>
     </p:extLst>
   </p:cSld>
@@ -5743,7 +6712,7 @@
           <p:cNvPr id="2" name="Title 1">
             <a:extLst>
               <a:ext uri="{FF2B5EF4-FFF2-40B4-BE49-F238E27FC236}">
-                <a16:creationId xmlns:a16="http://schemas.microsoft.com/office/drawing/2014/main" id="{B63BFC82-D15E-1395-FE19-93D1A518B75D}"/>
+                <a16:creationId xmlns:a16="http://schemas.microsoft.com/office/drawing/2014/main" id="{0164C068-83F0-5634-BF9E-87CE206D21F3}"/>
               </a:ext>
             </a:extLst>
           </p:cNvPr>
@@ -5756,17 +6725,99 @@
         </p:nvSpPr>
         <p:spPr>
           <a:xfrm>
-            <a:off x="838200" y="365125"/>
-            <a:ext cx="5257800" cy="1325563"/>
-          </a:xfrm>
-        </p:spPr>
-        <p:txBody>
-          <a:bodyPr/>
+            <a:off x="838200" y="365126"/>
+            <a:ext cx="3962400" cy="532342"/>
+          </a:xfrm>
+        </p:spPr>
+        <p:txBody>
+          <a:bodyPr>
+            <a:normAutofit fontScale="90000"/>
+          </a:bodyPr>
           <a:lstStyle/>
           <a:p>
             <a:r>
               <a:rPr lang="en-US" dirty="0"/>
-              <a:t>Microplastic data</a:t>
+              <a:t>Transformations</a:t>
+            </a:r>
+          </a:p>
+        </p:txBody>
+      </p:sp>
+      <p:sp>
+        <p:nvSpPr>
+          <p:cNvPr id="3" name="Content Placeholder 2">
+            <a:extLst>
+              <a:ext uri="{FF2B5EF4-FFF2-40B4-BE49-F238E27FC236}">
+                <a16:creationId xmlns:a16="http://schemas.microsoft.com/office/drawing/2014/main" id="{69E2E092-3154-9E9B-E5D1-7201D51ADC6E}"/>
+              </a:ext>
+            </a:extLst>
+          </p:cNvPr>
+          <p:cNvSpPr>
+            <a:spLocks noGrp="1"/>
+          </p:cNvSpPr>
+          <p:nvPr>
+            <p:ph idx="1"/>
+          </p:nvPr>
+        </p:nvSpPr>
+        <p:spPr>
+          <a:xfrm>
+            <a:off x="160866" y="1016001"/>
+            <a:ext cx="6206067" cy="5160962"/>
+          </a:xfrm>
+        </p:spPr>
+        <p:txBody>
+          <a:bodyPr>
+            <a:normAutofit fontScale="70000" lnSpcReduction="20000"/>
+          </a:bodyPr>
+          <a:lstStyle/>
+          <a:p>
+            <a:pPr marL="0" indent="0">
+              <a:buNone/>
+            </a:pPr>
+            <a:r>
+              <a:rPr lang="en-US" dirty="0"/>
+              <a:t>Normality was assessed with a Shapiro-Wilks test for untransformed data, for the optimal lambda of a box-cox transformation, natural log, and log10 transformations. The statistic is a Shapiro-Wilks W test, where W=1 is perfect normality and values approaching 1 are better than lower W scores. The transformations made the data more normal (and therefore better fits for the </a:t>
+            </a:r>
+            <a:r>
+              <a:rPr lang="en-US" dirty="0" err="1"/>
+              <a:t>glm</a:t>
+            </a:r>
+            <a:r>
+              <a:rPr lang="en-US" dirty="0"/>
+              <a:t>) compared to the untransformed data for all 8 data subsets. </a:t>
+            </a:r>
+          </a:p>
+          <a:p>
+            <a:pPr marL="0" indent="0">
+              <a:buNone/>
+            </a:pPr>
+            <a:r>
+              <a:rPr lang="en-US" dirty="0"/>
+              <a:t>Note: The normality scores for the natural log and log10 are equivalent here (though not for a goodness of fit test which we don’t need for the </a:t>
+            </a:r>
+            <a:r>
+              <a:rPr lang="en-US" dirty="0" err="1"/>
+              <a:t>glm</a:t>
+            </a:r>
+            <a:r>
+              <a:rPr lang="en-US" dirty="0"/>
+              <a:t>). Technically a log transformation is a subset of the Box-Cox transformation algorithm, though the Box-Cox does not always perform better. </a:t>
+            </a:r>
+          </a:p>
+          <a:p>
+            <a:pPr marL="0" indent="0">
+              <a:buNone/>
+            </a:pPr>
+            <a:r>
+              <a:rPr lang="en-US" dirty="0"/>
+              <a:t>Here, the log transformations had a slightly better fit 4 times and the log transformations did better the other 4 times. Therefore, I decided to just stick with the log10 transformation for the </a:t>
+            </a:r>
+            <a:r>
+              <a:rPr lang="en-US" dirty="0" err="1"/>
+              <a:t>glm</a:t>
+            </a:r>
+            <a:r>
+              <a:rPr lang="en-US" dirty="0"/>
+              <a:t> implementation since that is more typical for this field and there is little difference overall.</a:t>
             </a:r>
           </a:p>
         </p:txBody>
@@ -5776,7 +6827,7 @@
           <p:cNvPr id="5" name="Picture 4">
             <a:extLst>
               <a:ext uri="{FF2B5EF4-FFF2-40B4-BE49-F238E27FC236}">
-                <a16:creationId xmlns:a16="http://schemas.microsoft.com/office/drawing/2014/main" id="{8E13C924-C10A-C5FF-BF75-F3CC70298FD1}"/>
+                <a16:creationId xmlns:a16="http://schemas.microsoft.com/office/drawing/2014/main" id="{EB202218-3010-0D37-DABD-29957F335FB2}"/>
               </a:ext>
             </a:extLst>
           </p:cNvPr>
@@ -5793,8 +6844,8 @@
         </p:blipFill>
         <p:spPr>
           <a:xfrm>
-            <a:off x="7479084" y="190415"/>
-            <a:ext cx="3308989" cy="6477169"/>
+            <a:off x="6933093" y="413428"/>
+            <a:ext cx="3472440" cy="5763535"/>
           </a:xfrm>
           <a:prstGeom prst="rect">
             <a:avLst/>
@@ -5804,7 +6855,277 @@
     </p:spTree>
     <p:extLst>
       <p:ext uri="{BB962C8B-B14F-4D97-AF65-F5344CB8AC3E}">
-        <p14:creationId xmlns:p14="http://schemas.microsoft.com/office/powerpoint/2010/main" val="1740243741"/>
+        <p14:creationId xmlns:p14="http://schemas.microsoft.com/office/powerpoint/2010/main" val="2216983167"/>
+      </p:ext>
+    </p:extLst>
+  </p:cSld>
+  <p:clrMapOvr>
+    <a:masterClrMapping/>
+  </p:clrMapOvr>
+</p:sld>
+</file>
+
+<file path=ppt/slides/slide30.xml><?xml version="1.0" encoding="utf-8"?>
+<p:sld xmlns:a="http://schemas.openxmlformats.org/drawingml/2006/main" xmlns:r="http://schemas.openxmlformats.org/officeDocument/2006/relationships" xmlns:p="http://schemas.openxmlformats.org/presentationml/2006/main">
+  <p:cSld>
+    <p:spTree>
+      <p:nvGrpSpPr>
+        <p:cNvPr id="1" name=""/>
+        <p:cNvGrpSpPr/>
+        <p:nvPr/>
+      </p:nvGrpSpPr>
+      <p:grpSpPr>
+        <a:xfrm>
+          <a:off x="0" y="0"/>
+          <a:ext cx="0" cy="0"/>
+          <a:chOff x="0" y="0"/>
+          <a:chExt cx="0" cy="0"/>
+        </a:xfrm>
+      </p:grpSpPr>
+      <p:sp>
+        <p:nvSpPr>
+          <p:cNvPr id="2" name="Title 1">
+            <a:extLst>
+              <a:ext uri="{FF2B5EF4-FFF2-40B4-BE49-F238E27FC236}">
+                <a16:creationId xmlns:a16="http://schemas.microsoft.com/office/drawing/2014/main" id="{ACF2DE9C-1034-6234-BB19-A69EE5158664}"/>
+              </a:ext>
+            </a:extLst>
+          </p:cNvPr>
+          <p:cNvSpPr>
+            <a:spLocks noGrp="1"/>
+          </p:cNvSpPr>
+          <p:nvPr>
+            <p:ph type="title"/>
+          </p:nvPr>
+        </p:nvSpPr>
+        <p:spPr/>
+        <p:txBody>
+          <a:bodyPr/>
+          <a:lstStyle/>
+          <a:p>
+            <a:r>
+              <a:rPr lang="en-US" dirty="0"/>
+              <a:t>Full </a:t>
+            </a:r>
+            <a:r>
+              <a:rPr lang="en-US" dirty="0" err="1"/>
+              <a:t>glm</a:t>
+            </a:r>
+            <a:r>
+              <a:rPr lang="en-US" dirty="0"/>
+              <a:t> coefficients (log10)</a:t>
+            </a:r>
+          </a:p>
+        </p:txBody>
+      </p:sp>
+      <p:pic>
+        <p:nvPicPr>
+          <p:cNvPr id="7" name="Picture 6">
+            <a:extLst>
+              <a:ext uri="{FF2B5EF4-FFF2-40B4-BE49-F238E27FC236}">
+                <a16:creationId xmlns:a16="http://schemas.microsoft.com/office/drawing/2014/main" id="{9A59B292-5B99-718A-68C1-6264E375CD11}"/>
+              </a:ext>
+            </a:extLst>
+          </p:cNvPr>
+          <p:cNvPicPr>
+            <a:picLocks noChangeAspect="1"/>
+          </p:cNvPicPr>
+          <p:nvPr/>
+        </p:nvPicPr>
+        <p:blipFill>
+          <a:blip r:embed="rId2"/>
+          <a:stretch>
+            <a:fillRect/>
+          </a:stretch>
+        </p:blipFill>
+        <p:spPr>
+          <a:xfrm>
+            <a:off x="580086" y="1837267"/>
+            <a:ext cx="10458535" cy="3183466"/>
+          </a:xfrm>
+          <a:prstGeom prst="rect">
+            <a:avLst/>
+          </a:prstGeom>
+        </p:spPr>
+      </p:pic>
+    </p:spTree>
+    <p:extLst>
+      <p:ext uri="{BB962C8B-B14F-4D97-AF65-F5344CB8AC3E}">
+        <p14:creationId xmlns:p14="http://schemas.microsoft.com/office/powerpoint/2010/main" val="2488554163"/>
+      </p:ext>
+    </p:extLst>
+  </p:cSld>
+  <p:clrMapOvr>
+    <a:masterClrMapping/>
+  </p:clrMapOvr>
+</p:sld>
+</file>
+
+<file path=ppt/slides/slide31.xml><?xml version="1.0" encoding="utf-8"?>
+<p:sld xmlns:a="http://schemas.openxmlformats.org/drawingml/2006/main" xmlns:r="http://schemas.openxmlformats.org/officeDocument/2006/relationships" xmlns:p="http://schemas.openxmlformats.org/presentationml/2006/main">
+  <p:cSld>
+    <p:spTree>
+      <p:nvGrpSpPr>
+        <p:cNvPr id="1" name=""/>
+        <p:cNvGrpSpPr/>
+        <p:nvPr/>
+      </p:nvGrpSpPr>
+      <p:grpSpPr>
+        <a:xfrm>
+          <a:off x="0" y="0"/>
+          <a:ext cx="0" cy="0"/>
+          <a:chOff x="0" y="0"/>
+          <a:chExt cx="0" cy="0"/>
+        </a:xfrm>
+      </p:grpSpPr>
+      <p:sp>
+        <p:nvSpPr>
+          <p:cNvPr id="2" name="Title 1">
+            <a:extLst>
+              <a:ext uri="{FF2B5EF4-FFF2-40B4-BE49-F238E27FC236}">
+                <a16:creationId xmlns:a16="http://schemas.microsoft.com/office/drawing/2014/main" id="{8AB59B44-7BB9-902F-4C8B-95F41F33EC3F}"/>
+              </a:ext>
+            </a:extLst>
+          </p:cNvPr>
+          <p:cNvSpPr>
+            <a:spLocks noGrp="1"/>
+          </p:cNvSpPr>
+          <p:nvPr>
+            <p:ph type="title"/>
+          </p:nvPr>
+        </p:nvSpPr>
+        <p:spPr/>
+        <p:txBody>
+          <a:bodyPr/>
+          <a:lstStyle/>
+          <a:p>
+            <a:r>
+              <a:rPr lang="en-US" dirty="0"/>
+              <a:t>Overall Results</a:t>
+            </a:r>
+          </a:p>
+        </p:txBody>
+      </p:sp>
+      <p:sp>
+        <p:nvSpPr>
+          <p:cNvPr id="3" name="Content Placeholder 2">
+            <a:extLst>
+              <a:ext uri="{FF2B5EF4-FFF2-40B4-BE49-F238E27FC236}">
+                <a16:creationId xmlns:a16="http://schemas.microsoft.com/office/drawing/2014/main" id="{21BB0896-5C7C-7A5B-F01C-18AE86E60326}"/>
+              </a:ext>
+            </a:extLst>
+          </p:cNvPr>
+          <p:cNvSpPr>
+            <a:spLocks noGrp="1"/>
+          </p:cNvSpPr>
+          <p:nvPr>
+            <p:ph idx="1"/>
+          </p:nvPr>
+        </p:nvSpPr>
+        <p:spPr/>
+        <p:txBody>
+          <a:bodyPr>
+            <a:normAutofit fontScale="77500" lnSpcReduction="20000"/>
+          </a:bodyPr>
+          <a:lstStyle/>
+          <a:p>
+            <a:r>
+              <a:rPr lang="en-US" dirty="0"/>
+              <a:t>Microplastics--Not sure how much detail you need.</a:t>
+            </a:r>
+          </a:p>
+          <a:p>
+            <a:pPr lvl="1"/>
+            <a:r>
+              <a:rPr lang="en-US" dirty="0"/>
+              <a:t>Time is significant for all the responses (p value in full model is significant and/or kept in the stepwise regression), linear response generally does best but there is some support for quadratic and cubic.</a:t>
+            </a:r>
+          </a:p>
+          <a:p>
+            <a:pPr lvl="1"/>
+            <a:r>
+              <a:rPr lang="en-US" dirty="0"/>
+              <a:t>LDPE often differentiates itself from other plastics (significant in 3 of the 4, still the lowest p value in the 4</a:t>
+            </a:r>
+            <a:r>
+              <a:rPr lang="en-US" baseline="30000" dirty="0"/>
+              <a:t>th</a:t>
+            </a:r>
+            <a:r>
+              <a:rPr lang="en-US" dirty="0"/>
+              <a:t>)</a:t>
+            </a:r>
+          </a:p>
+          <a:p>
+            <a:pPr lvl="1"/>
+            <a:r>
+              <a:rPr lang="en-US" dirty="0"/>
+              <a:t>Water type matters for </a:t>
+            </a:r>
+            <a:r>
+              <a:rPr lang="en-US" dirty="0" err="1"/>
+              <a:t>multophilia</a:t>
+            </a:r>
+            <a:r>
+              <a:rPr lang="en-US" dirty="0"/>
+              <a:t> and sul1, actually a small negative (not significant) for P. a.</a:t>
+            </a:r>
+          </a:p>
+          <a:p>
+            <a:r>
+              <a:rPr lang="en-US" dirty="0"/>
+              <a:t>Water—</a:t>
+            </a:r>
+          </a:p>
+          <a:p>
+            <a:pPr lvl="1"/>
+            <a:r>
+              <a:rPr lang="en-US" dirty="0"/>
+              <a:t>S. </a:t>
+            </a:r>
+            <a:r>
+              <a:rPr lang="en-US" dirty="0" err="1"/>
+              <a:t>multophilia</a:t>
+            </a:r>
+            <a:r>
+              <a:rPr lang="en-US" dirty="0"/>
+              <a:t> there is a time trend but no difference between the water treatments.</a:t>
+            </a:r>
+          </a:p>
+          <a:p>
+            <a:pPr lvl="1"/>
+            <a:r>
+              <a:rPr lang="en-US" dirty="0"/>
+              <a:t>Int1 and sul1 both show time trends and positive water differences.</a:t>
+            </a:r>
+          </a:p>
+          <a:p>
+            <a:pPr lvl="1"/>
+            <a:r>
+              <a:rPr lang="en-US" dirty="0"/>
+              <a:t>P. aeruginosa no linear time trend (cubic pops up though) or difference between the water treatments</a:t>
+            </a:r>
+          </a:p>
+          <a:p>
+            <a:r>
+              <a:rPr lang="en-US" dirty="0"/>
+              <a:t>Presumably positive time trends in the water (</a:t>
+            </a:r>
+            <a:r>
+              <a:rPr lang="en-US"/>
+              <a:t>unexpected?) may </a:t>
+            </a:r>
+            <a:r>
+              <a:rPr lang="en-US" dirty="0"/>
+              <a:t>possibly be a bit of a confounding variable for interpreting the accumulation on microplastics over time.</a:t>
+            </a:r>
+          </a:p>
+        </p:txBody>
+      </p:sp>
+    </p:spTree>
+    <p:extLst>
+      <p:ext uri="{BB962C8B-B14F-4D97-AF65-F5344CB8AC3E}">
+        <p14:creationId xmlns:p14="http://schemas.microsoft.com/office/powerpoint/2010/main" val="1199600328"/>
       </p:ext>
     </p:extLst>
   </p:cSld>
@@ -5836,7 +7157,7 @@
           <p:cNvPr id="2" name="Title 1">
             <a:extLst>
               <a:ext uri="{FF2B5EF4-FFF2-40B4-BE49-F238E27FC236}">
-                <a16:creationId xmlns:a16="http://schemas.microsoft.com/office/drawing/2014/main" id="{9C84FB5B-3548-57AF-0BDE-3735ECDD4D50}"/>
+                <a16:creationId xmlns:a16="http://schemas.microsoft.com/office/drawing/2014/main" id="{B63BFC82-D15E-1395-FE19-93D1A518B75D}"/>
               </a:ext>
             </a:extLst>
           </p:cNvPr>
@@ -5849,109 +7170,27 @@
         </p:nvSpPr>
         <p:spPr>
           <a:xfrm>
-            <a:off x="106878" y="296883"/>
-            <a:ext cx="2731325" cy="938151"/>
-          </a:xfrm>
-        </p:spPr>
-        <p:txBody>
-          <a:bodyPr>
-            <a:normAutofit/>
-          </a:bodyPr>
-          <a:lstStyle/>
-          <a:p>
-            <a:r>
-              <a:rPr lang="en-US" sz="2000" dirty="0"/>
-              <a:t>Microplastics: </a:t>
-            </a:r>
-            <a:r>
-              <a:rPr lang="en-US" sz="2000" dirty="0" err="1"/>
-              <a:t>S_maltophilia</a:t>
-            </a:r>
-            <a:r>
-              <a:rPr lang="en-US" sz="2000" dirty="0"/>
-              <a:t> data transformation</a:t>
-            </a:r>
-          </a:p>
-        </p:txBody>
-      </p:sp>
-      <p:sp>
-        <p:nvSpPr>
-          <p:cNvPr id="3" name="Title 1">
-            <a:extLst>
-              <a:ext uri="{FF2B5EF4-FFF2-40B4-BE49-F238E27FC236}">
-                <a16:creationId xmlns:a16="http://schemas.microsoft.com/office/drawing/2014/main" id="{246097DE-5335-6BB6-24A4-609029F00200}"/>
-              </a:ext>
-            </a:extLst>
-          </p:cNvPr>
-          <p:cNvSpPr txBox="1">
-            <a:spLocks/>
-          </p:cNvSpPr>
-          <p:nvPr/>
-        </p:nvSpPr>
-        <p:spPr>
-          <a:xfrm>
-            <a:off x="106878" y="1524174"/>
-            <a:ext cx="3143634" cy="3362521"/>
-          </a:xfrm>
-          <a:prstGeom prst="rect">
-            <a:avLst/>
-          </a:prstGeom>
-        </p:spPr>
-        <p:txBody>
-          <a:bodyPr vert="horz" lIns="91440" tIns="45720" rIns="91440" bIns="45720" rtlCol="0" anchor="ctr">
-            <a:noAutofit/>
-          </a:bodyPr>
-          <a:lstStyle>
-            <a:lvl1pPr algn="l" defTabSz="914400" rtl="0" eaLnBrk="1" latinLnBrk="0" hangingPunct="1">
-              <a:lnSpc>
-                <a:spcPct val="90000"/>
-              </a:lnSpc>
-              <a:spcBef>
-                <a:spcPct val="0"/>
-              </a:spcBef>
-              <a:buNone/>
-              <a:defRPr sz="4400" kern="1200">
-                <a:solidFill>
-                  <a:schemeClr val="tx1"/>
-                </a:solidFill>
-                <a:latin typeface="+mj-lt"/>
-                <a:ea typeface="+mj-ea"/>
-                <a:cs typeface="+mj-cs"/>
-              </a:defRPr>
-            </a:lvl1pPr>
-          </a:lstStyle>
-          <a:p>
-            <a:r>
-              <a:rPr lang="en-US" sz="2000" dirty="0"/>
-              <a:t>-Shapiro-Wilks normality statistic (W), range from 0 to 1, with 1 being perfectly normal</a:t>
-            </a:r>
-          </a:p>
-          <a:p>
-            <a:r>
-              <a:rPr lang="en-US" sz="2000" dirty="0"/>
-              <a:t>-All transformations fail normality at p&lt;0.05</a:t>
-            </a:r>
-          </a:p>
-          <a:p>
-            <a:r>
-              <a:rPr lang="en-US" sz="2000" dirty="0"/>
-              <a:t>-The box-cox transformation does a bit better inducing normality</a:t>
-            </a:r>
-          </a:p>
-          <a:p>
-            <a:r>
-              <a:rPr lang="en-US" sz="2000" dirty="0"/>
-              <a:t>-ln and log10 essentially equivalent, not too far behind</a:t>
+            <a:off x="838200" y="365125"/>
+            <a:ext cx="5257800" cy="1325563"/>
+          </a:xfrm>
+        </p:spPr>
+        <p:txBody>
+          <a:bodyPr/>
+          <a:lstStyle/>
+          <a:p>
+            <a:r>
+              <a:rPr lang="en-US" dirty="0"/>
+              <a:t>Microplastic data</a:t>
             </a:r>
           </a:p>
         </p:txBody>
       </p:sp>
       <p:pic>
         <p:nvPicPr>
-          <p:cNvPr id="5" name="Picture 4">
-            <a:extLst>
-              <a:ext uri="{FF2B5EF4-FFF2-40B4-BE49-F238E27FC236}">
-                <a16:creationId xmlns:a16="http://schemas.microsoft.com/office/drawing/2014/main" id="{7A020331-2431-8D00-9559-B3835322D9C4}"/>
+          <p:cNvPr id="4" name="Picture 3">
+            <a:extLst>
+              <a:ext uri="{FF2B5EF4-FFF2-40B4-BE49-F238E27FC236}">
+                <a16:creationId xmlns:a16="http://schemas.microsoft.com/office/drawing/2014/main" id="{DD446A9D-A25C-E05F-6209-211D3BEFC32F}"/>
               </a:ext>
             </a:extLst>
           </p:cNvPr>
@@ -5968,8 +7207,8 @@
         </p:blipFill>
         <p:spPr>
           <a:xfrm>
-            <a:off x="3319152" y="389154"/>
-            <a:ext cx="8499701" cy="5708825"/>
+            <a:off x="2586413" y="1690688"/>
+            <a:ext cx="8361649" cy="3976231"/>
           </a:xfrm>
           <a:prstGeom prst="rect">
             <a:avLst/>
@@ -5979,7 +7218,7 @@
     </p:spTree>
     <p:extLst>
       <p:ext uri="{BB962C8B-B14F-4D97-AF65-F5344CB8AC3E}">
-        <p14:creationId xmlns:p14="http://schemas.microsoft.com/office/powerpoint/2010/main" val="4013227324"/>
+        <p14:creationId xmlns:p14="http://schemas.microsoft.com/office/powerpoint/2010/main" val="1740243741"/>
       </p:ext>
     </p:extLst>
   </p:cSld>
@@ -6011,7 +7250,7 @@
           <p:cNvPr id="2" name="Title 1">
             <a:extLst>
               <a:ext uri="{FF2B5EF4-FFF2-40B4-BE49-F238E27FC236}">
-                <a16:creationId xmlns:a16="http://schemas.microsoft.com/office/drawing/2014/main" id="{6033E2CD-3B38-B2CD-FA4F-FFF1AE6768E6}"/>
+                <a16:creationId xmlns:a16="http://schemas.microsoft.com/office/drawing/2014/main" id="{9C84FB5B-3548-57AF-0BDE-3735ECDD4D50}"/>
               </a:ext>
             </a:extLst>
           </p:cNvPr>
@@ -6022,65 +7261,102 @@
             <p:ph type="title"/>
           </p:nvPr>
         </p:nvSpPr>
-        <p:spPr/>
-        <p:txBody>
-          <a:bodyPr/>
-          <a:lstStyle/>
-          <a:p>
-            <a:r>
-              <a:rPr lang="en-US" sz="4400" dirty="0"/>
-              <a:t>S </a:t>
-            </a:r>
-            <a:r>
-              <a:rPr lang="en-US" sz="4400" dirty="0" err="1"/>
-              <a:t>maltophilia</a:t>
-            </a:r>
-            <a:r>
-              <a:rPr lang="en-US" sz="4400" dirty="0"/>
-              <a:t> </a:t>
-            </a:r>
-            <a:r>
-              <a:rPr lang="en-US" sz="4400" dirty="0" err="1"/>
-              <a:t>mp</a:t>
-            </a:r>
-            <a:r>
-              <a:rPr lang="en-US" sz="4400" dirty="0"/>
-              <a:t> </a:t>
-            </a:r>
-            <a:r>
-              <a:rPr lang="en-US" sz="4400" dirty="0" err="1"/>
-              <a:t>glm</a:t>
-            </a:r>
-            <a:r>
-              <a:rPr lang="en-US" sz="4400" dirty="0"/>
-              <a:t> full model</a:t>
-            </a:r>
-            <a:endParaRPr lang="en-US" dirty="0"/>
-          </a:p>
-        </p:txBody>
-      </p:sp>
-      <p:sp>
-        <p:nvSpPr>
-          <p:cNvPr id="3" name="Content Placeholder 2">
-            <a:extLst>
-              <a:ext uri="{FF2B5EF4-FFF2-40B4-BE49-F238E27FC236}">
-                <a16:creationId xmlns:a16="http://schemas.microsoft.com/office/drawing/2014/main" id="{E5E1B320-668C-B33E-59D6-A8DB161D2280}"/>
-              </a:ext>
-            </a:extLst>
-          </p:cNvPr>
-          <p:cNvSpPr>
-            <a:spLocks noGrp="1"/>
-          </p:cNvSpPr>
-          <p:nvPr>
-            <p:ph idx="1"/>
-          </p:nvPr>
-        </p:nvSpPr>
-        <p:spPr/>
-        <p:txBody>
-          <a:bodyPr/>
-          <a:lstStyle/>
-          <a:p>
-            <a:endParaRPr lang="en-US"/>
+        <p:spPr>
+          <a:xfrm>
+            <a:off x="106878" y="296883"/>
+            <a:ext cx="2731325" cy="938151"/>
+          </a:xfrm>
+        </p:spPr>
+        <p:txBody>
+          <a:bodyPr>
+            <a:normAutofit/>
+          </a:bodyPr>
+          <a:lstStyle/>
+          <a:p>
+            <a:r>
+              <a:rPr lang="en-US" sz="2000" dirty="0"/>
+              <a:t>Microplastics: </a:t>
+            </a:r>
+            <a:r>
+              <a:rPr lang="en-US" sz="2000" dirty="0" err="1"/>
+              <a:t>S_maltophilia</a:t>
+            </a:r>
+            <a:r>
+              <a:rPr lang="en-US" sz="2000" dirty="0"/>
+              <a:t> data transformation</a:t>
+            </a:r>
+          </a:p>
+        </p:txBody>
+      </p:sp>
+      <p:sp>
+        <p:nvSpPr>
+          <p:cNvPr id="3" name="Title 1">
+            <a:extLst>
+              <a:ext uri="{FF2B5EF4-FFF2-40B4-BE49-F238E27FC236}">
+                <a16:creationId xmlns:a16="http://schemas.microsoft.com/office/drawing/2014/main" id="{246097DE-5335-6BB6-24A4-609029F00200}"/>
+              </a:ext>
+            </a:extLst>
+          </p:cNvPr>
+          <p:cNvSpPr txBox="1">
+            <a:spLocks/>
+          </p:cNvSpPr>
+          <p:nvPr/>
+        </p:nvSpPr>
+        <p:spPr>
+          <a:xfrm>
+            <a:off x="106878" y="1524174"/>
+            <a:ext cx="3143634" cy="3362521"/>
+          </a:xfrm>
+          <a:prstGeom prst="rect">
+            <a:avLst/>
+          </a:prstGeom>
+        </p:spPr>
+        <p:txBody>
+          <a:bodyPr vert="horz" lIns="91440" tIns="45720" rIns="91440" bIns="45720" rtlCol="0" anchor="ctr">
+            <a:noAutofit/>
+          </a:bodyPr>
+          <a:lstStyle>
+            <a:lvl1pPr algn="l" defTabSz="914400" rtl="0" eaLnBrk="1" latinLnBrk="0" hangingPunct="1">
+              <a:lnSpc>
+                <a:spcPct val="90000"/>
+              </a:lnSpc>
+              <a:spcBef>
+                <a:spcPct val="0"/>
+              </a:spcBef>
+              <a:buNone/>
+              <a:defRPr sz="4400" kern="1200">
+                <a:solidFill>
+                  <a:schemeClr val="tx1"/>
+                </a:solidFill>
+                <a:latin typeface="+mj-lt"/>
+                <a:ea typeface="+mj-ea"/>
+                <a:cs typeface="+mj-cs"/>
+              </a:defRPr>
+            </a:lvl1pPr>
+          </a:lstStyle>
+          <a:p>
+            <a:r>
+              <a:rPr lang="en-US" sz="2000" dirty="0"/>
+              <a:t>-Shapiro-Wilks normality statistic (W), range from 0 to 1, with 1 being perfectly normal</a:t>
+            </a:r>
+          </a:p>
+          <a:p>
+            <a:r>
+              <a:rPr lang="en-US" sz="2000" dirty="0"/>
+              <a:t>-All transformations fail normality at p&lt;0.05</a:t>
+            </a:r>
+          </a:p>
+          <a:p>
+            <a:r>
+              <a:rPr lang="en-US" sz="2000" dirty="0"/>
+              <a:t>-The box-cox transformation does a bit better inducing normality</a:t>
+            </a:r>
+          </a:p>
+          <a:p>
+            <a:r>
+              <a:rPr lang="en-US" sz="2000" dirty="0"/>
+              <a:t>-ln and log10 essentially equivalent, not too far behind</a:t>
+            </a:r>
           </a:p>
         </p:txBody>
       </p:sp>
@@ -6089,7 +7365,7 @@
           <p:cNvPr id="5" name="Picture 4">
             <a:extLst>
               <a:ext uri="{FF2B5EF4-FFF2-40B4-BE49-F238E27FC236}">
-                <a16:creationId xmlns:a16="http://schemas.microsoft.com/office/drawing/2014/main" id="{29CA2DB1-E707-C177-FEAF-6E1607A8D9E5}"/>
+                <a16:creationId xmlns:a16="http://schemas.microsoft.com/office/drawing/2014/main" id="{7A020331-2431-8D00-9559-B3835322D9C4}"/>
               </a:ext>
             </a:extLst>
           </p:cNvPr>
@@ -6106,8 +7382,8 @@
         </p:blipFill>
         <p:spPr>
           <a:xfrm>
-            <a:off x="3511416" y="1635033"/>
-            <a:ext cx="6998733" cy="4857842"/>
+            <a:off x="3319152" y="389154"/>
+            <a:ext cx="8499701" cy="5708825"/>
           </a:xfrm>
           <a:prstGeom prst="rect">
             <a:avLst/>
@@ -6117,7 +7393,7 @@
     </p:spTree>
     <p:extLst>
       <p:ext uri="{BB962C8B-B14F-4D97-AF65-F5344CB8AC3E}">
-        <p14:creationId xmlns:p14="http://schemas.microsoft.com/office/powerpoint/2010/main" val="4044919194"/>
+        <p14:creationId xmlns:p14="http://schemas.microsoft.com/office/powerpoint/2010/main" val="4013227324"/>
       </p:ext>
     </p:extLst>
   </p:cSld>
@@ -6149,7 +7425,7 @@
           <p:cNvPr id="2" name="Title 1">
             <a:extLst>
               <a:ext uri="{FF2B5EF4-FFF2-40B4-BE49-F238E27FC236}">
-                <a16:creationId xmlns:a16="http://schemas.microsoft.com/office/drawing/2014/main" id="{3E4A6795-1948-05E4-E562-AFED99BDA8EB}"/>
+                <a16:creationId xmlns:a16="http://schemas.microsoft.com/office/drawing/2014/main" id="{6033E2CD-3B38-B2CD-FA4F-FFF1AE6768E6}"/>
               </a:ext>
             </a:extLst>
           </p:cNvPr>
@@ -6160,52 +7436,92 @@
             <p:ph type="title"/>
           </p:nvPr>
         </p:nvSpPr>
-        <p:spPr>
-          <a:xfrm>
-            <a:off x="165093" y="365124"/>
-            <a:ext cx="2802278" cy="3063875"/>
-          </a:xfrm>
-        </p:spPr>
-        <p:txBody>
-          <a:bodyPr>
-            <a:normAutofit/>
-          </a:bodyPr>
-          <a:lstStyle/>
-          <a:p>
-            <a:r>
-              <a:rPr lang="en-US" sz="3200" dirty="0"/>
+        <p:spPr/>
+        <p:txBody>
+          <a:bodyPr/>
+          <a:lstStyle/>
+          <a:p>
+            <a:r>
+              <a:rPr lang="en-US" sz="4400" dirty="0"/>
               <a:t>S </a:t>
             </a:r>
             <a:r>
-              <a:rPr lang="en-US" sz="3200" dirty="0" err="1"/>
+              <a:rPr lang="en-US" sz="4400" dirty="0" err="1"/>
               <a:t>maltophilia</a:t>
             </a:r>
             <a:r>
-              <a:rPr lang="en-US" sz="3200" dirty="0"/>
+              <a:rPr lang="en-US" sz="4400" dirty="0"/>
               <a:t> </a:t>
             </a:r>
             <a:r>
-              <a:rPr lang="en-US" sz="3200" dirty="0" err="1"/>
+              <a:rPr lang="en-US" sz="4400" dirty="0" err="1"/>
               <a:t>mp</a:t>
             </a:r>
             <a:r>
-              <a:rPr lang="en-US" sz="3200" dirty="0"/>
+              <a:rPr lang="en-US" sz="4400" dirty="0"/>
               <a:t> </a:t>
             </a:r>
             <a:r>
-              <a:rPr lang="en-US" sz="3200" dirty="0" err="1"/>
+              <a:rPr lang="en-US" sz="4400" dirty="0" err="1"/>
               <a:t>glm</a:t>
             </a:r>
             <a:r>
-              <a:rPr lang="en-US" sz="3200" dirty="0"/>
-              <a:t> step</a:t>
-            </a:r>
-            <a:br>
-              <a:rPr lang="en-US" sz="3200" dirty="0"/>
-            </a:br>
-            <a:r>
-              <a:rPr lang="en-US" sz="3200" dirty="0"/>
-              <a:t>-time and water treatment variable kept</a:t>
+              <a:rPr lang="en-US" sz="4400" dirty="0"/>
+              <a:t> full model</a:t>
+            </a:r>
+            <a:endParaRPr lang="en-US" dirty="0"/>
+          </a:p>
+        </p:txBody>
+      </p:sp>
+      <p:sp>
+        <p:nvSpPr>
+          <p:cNvPr id="3" name="Content Placeholder 2">
+            <a:extLst>
+              <a:ext uri="{FF2B5EF4-FFF2-40B4-BE49-F238E27FC236}">
+                <a16:creationId xmlns:a16="http://schemas.microsoft.com/office/drawing/2014/main" id="{E5E1B320-668C-B33E-59D6-A8DB161D2280}"/>
+              </a:ext>
+            </a:extLst>
+          </p:cNvPr>
+          <p:cNvSpPr>
+            <a:spLocks noGrp="1"/>
+          </p:cNvSpPr>
+          <p:nvPr>
+            <p:ph idx="1"/>
+          </p:nvPr>
+        </p:nvSpPr>
+        <p:spPr>
+          <a:xfrm>
+            <a:off x="157851" y="1554691"/>
+            <a:ext cx="4439549" cy="4351338"/>
+          </a:xfrm>
+        </p:spPr>
+        <p:txBody>
+          <a:bodyPr/>
+          <a:lstStyle/>
+          <a:p>
+            <a:r>
+              <a:rPr lang="en-US" dirty="0"/>
+              <a:t>Mixed on plastic type, only </a:t>
+            </a:r>
+            <a:r>
+              <a:rPr lang="en-US" dirty="0" err="1"/>
+              <a:t>ldpe</a:t>
+            </a:r>
+            <a:r>
+              <a:rPr lang="en-US" dirty="0"/>
+              <a:t> close to significance</a:t>
+            </a:r>
+          </a:p>
+          <a:p>
+            <a:r>
+              <a:rPr lang="en-US" dirty="0"/>
+              <a:t>Treatment significant</a:t>
+            </a:r>
+          </a:p>
+          <a:p>
+            <a:r>
+              <a:rPr lang="en-US" dirty="0"/>
+              <a:t>Linear with time most significant</a:t>
             </a:r>
           </a:p>
         </p:txBody>
@@ -6215,7 +7531,7 @@
           <p:cNvPr id="5" name="Picture 4">
             <a:extLst>
               <a:ext uri="{FF2B5EF4-FFF2-40B4-BE49-F238E27FC236}">
-                <a16:creationId xmlns:a16="http://schemas.microsoft.com/office/drawing/2014/main" id="{E4347DE8-05D8-6632-E600-2A7659D602AC}"/>
+                <a16:creationId xmlns:a16="http://schemas.microsoft.com/office/drawing/2014/main" id="{29CA2DB1-E707-C177-FEAF-6E1607A8D9E5}"/>
               </a:ext>
             </a:extLst>
           </p:cNvPr>
@@ -6232,38 +7548,8 @@
         </p:blipFill>
         <p:spPr>
           <a:xfrm>
-            <a:off x="165093" y="3428999"/>
-            <a:ext cx="5829600" cy="2463927"/>
-          </a:xfrm>
-          <a:prstGeom prst="rect">
-            <a:avLst/>
-          </a:prstGeom>
-        </p:spPr>
-      </p:pic>
-      <p:pic>
-        <p:nvPicPr>
-          <p:cNvPr id="7" name="Picture 6">
-            <a:extLst>
-              <a:ext uri="{FF2B5EF4-FFF2-40B4-BE49-F238E27FC236}">
-                <a16:creationId xmlns:a16="http://schemas.microsoft.com/office/drawing/2014/main" id="{D7AACE48-0E56-7181-9817-0B91E7D4AE90}"/>
-              </a:ext>
-            </a:extLst>
-          </p:cNvPr>
-          <p:cNvPicPr>
-            <a:picLocks noChangeAspect="1"/>
-          </p:cNvPicPr>
-          <p:nvPr/>
-        </p:nvPicPr>
-        <p:blipFill>
-          <a:blip r:embed="rId3"/>
-          <a:stretch>
-            <a:fillRect/>
-          </a:stretch>
-        </p:blipFill>
-        <p:spPr>
-          <a:xfrm>
-            <a:off x="6043140" y="524713"/>
-            <a:ext cx="5620347" cy="2972570"/>
+            <a:off x="5035416" y="1690688"/>
+            <a:ext cx="6998733" cy="4857842"/>
           </a:xfrm>
           <a:prstGeom prst="rect">
             <a:avLst/>
@@ -6273,7 +7559,7 @@
     </p:spTree>
     <p:extLst>
       <p:ext uri="{BB962C8B-B14F-4D97-AF65-F5344CB8AC3E}">
-        <p14:creationId xmlns:p14="http://schemas.microsoft.com/office/powerpoint/2010/main" val="3891756154"/>
+        <p14:creationId xmlns:p14="http://schemas.microsoft.com/office/powerpoint/2010/main" val="4044919194"/>
       </p:ext>
     </p:extLst>
   </p:cSld>
@@ -6305,7 +7591,7 @@
           <p:cNvPr id="2" name="Title 1">
             <a:extLst>
               <a:ext uri="{FF2B5EF4-FFF2-40B4-BE49-F238E27FC236}">
-                <a16:creationId xmlns:a16="http://schemas.microsoft.com/office/drawing/2014/main" id="{9C84FB5B-3548-57AF-0BDE-3735ECDD4D50}"/>
+                <a16:creationId xmlns:a16="http://schemas.microsoft.com/office/drawing/2014/main" id="{3E4A6795-1948-05E4-E562-AFED99BDA8EB}"/>
               </a:ext>
             </a:extLst>
           </p:cNvPr>
@@ -6318,29 +7604,67 @@
         </p:nvSpPr>
         <p:spPr>
           <a:xfrm>
-            <a:off x="1" y="0"/>
-            <a:ext cx="2535382" cy="1603513"/>
+            <a:off x="165092" y="365124"/>
+            <a:ext cx="4305307" cy="3063875"/>
           </a:xfrm>
         </p:spPr>
         <p:txBody>
           <a:bodyPr>
-            <a:normAutofit/>
+            <a:normAutofit fontScale="90000"/>
           </a:bodyPr>
           <a:lstStyle/>
           <a:p>
             <a:r>
-              <a:rPr lang="en-US" sz="2000" dirty="0"/>
-              <a:t>intI1 data transformation</a:t>
+              <a:rPr lang="en-US" sz="3200" dirty="0"/>
+              <a:t>S </a:t>
+            </a:r>
+            <a:r>
+              <a:rPr lang="en-US" sz="3200" dirty="0" err="1"/>
+              <a:t>maltophilia</a:t>
+            </a:r>
+            <a:r>
+              <a:rPr lang="en-US" sz="3200" dirty="0"/>
+              <a:t> </a:t>
+            </a:r>
+            <a:r>
+              <a:rPr lang="en-US" sz="3200" dirty="0" err="1"/>
+              <a:t>mp</a:t>
+            </a:r>
+            <a:r>
+              <a:rPr lang="en-US" sz="3200" dirty="0"/>
+              <a:t> </a:t>
+            </a:r>
+            <a:r>
+              <a:rPr lang="en-US" sz="3200" dirty="0" err="1"/>
+              <a:t>glm</a:t>
+            </a:r>
+            <a:r>
+              <a:rPr lang="en-US" sz="3200" dirty="0"/>
+              <a:t> step</a:t>
+            </a:r>
+            <a:br>
+              <a:rPr lang="en-US" sz="3200" dirty="0"/>
+            </a:br>
+            <a:r>
+              <a:rPr lang="en-US" sz="3200" dirty="0"/>
+              <a:t>-time and water treatment variable kept</a:t>
+            </a:r>
+            <a:br>
+              <a:rPr lang="en-US" sz="3200" dirty="0"/>
+            </a:br>
+            <a:r>
+              <a:rPr lang="en-US" sz="3200" dirty="0"/>
+              <a:t>-plastic type is dropped by the step wise but AIC difference is less than 1 so close to being included</a:t>
             </a:r>
           </a:p>
         </p:txBody>
       </p:sp>
       <p:pic>
         <p:nvPicPr>
-          <p:cNvPr id="4" name="Picture 3">
-            <a:extLst>
-              <a:ext uri="{FF2B5EF4-FFF2-40B4-BE49-F238E27FC236}">
-                <a16:creationId xmlns:a16="http://schemas.microsoft.com/office/drawing/2014/main" id="{9A16E570-3B19-BB27-044F-B6DDF2B8187A}"/>
+          <p:cNvPr id="5" name="Picture 4">
+            <a:extLst>
+              <a:ext uri="{FF2B5EF4-FFF2-40B4-BE49-F238E27FC236}">
+                <a16:creationId xmlns:a16="http://schemas.microsoft.com/office/drawing/2014/main" id="{E4347DE8-05D8-6632-E600-2A7659D602AC}"/>
               </a:ext>
             </a:extLst>
           </p:cNvPr>
@@ -6357,8 +7681,38 @@
         </p:blipFill>
         <p:spPr>
           <a:xfrm>
-            <a:off x="2179122" y="356345"/>
-            <a:ext cx="9649296" cy="6280361"/>
+            <a:off x="0" y="3920066"/>
+            <a:ext cx="5829600" cy="2463927"/>
+          </a:xfrm>
+          <a:prstGeom prst="rect">
+            <a:avLst/>
+          </a:prstGeom>
+        </p:spPr>
+      </p:pic>
+      <p:pic>
+        <p:nvPicPr>
+          <p:cNvPr id="7" name="Picture 6">
+            <a:extLst>
+              <a:ext uri="{FF2B5EF4-FFF2-40B4-BE49-F238E27FC236}">
+                <a16:creationId xmlns:a16="http://schemas.microsoft.com/office/drawing/2014/main" id="{D7AACE48-0E56-7181-9817-0B91E7D4AE90}"/>
+              </a:ext>
+            </a:extLst>
+          </p:cNvPr>
+          <p:cNvPicPr>
+            <a:picLocks noChangeAspect="1"/>
+          </p:cNvPicPr>
+          <p:nvPr/>
+        </p:nvPicPr>
+        <p:blipFill>
+          <a:blip r:embed="rId3"/>
+          <a:stretch>
+            <a:fillRect/>
+          </a:stretch>
+        </p:blipFill>
+        <p:spPr>
+          <a:xfrm>
+            <a:off x="6043140" y="524713"/>
+            <a:ext cx="5620347" cy="2972570"/>
           </a:xfrm>
           <a:prstGeom prst="rect">
             <a:avLst/>
@@ -6368,7 +7722,7 @@
     </p:spTree>
     <p:extLst>
       <p:ext uri="{BB962C8B-B14F-4D97-AF65-F5344CB8AC3E}">
-        <p14:creationId xmlns:p14="http://schemas.microsoft.com/office/powerpoint/2010/main" val="450193634"/>
+        <p14:creationId xmlns:p14="http://schemas.microsoft.com/office/powerpoint/2010/main" val="3891756154"/>
       </p:ext>
     </p:extLst>
   </p:cSld>
@@ -6400,7 +7754,7 @@
           <p:cNvPr id="2" name="Title 1">
             <a:extLst>
               <a:ext uri="{FF2B5EF4-FFF2-40B4-BE49-F238E27FC236}">
-                <a16:creationId xmlns:a16="http://schemas.microsoft.com/office/drawing/2014/main" id="{21F618E0-6833-2382-088A-8454E0D4DCAD}"/>
+                <a16:creationId xmlns:a16="http://schemas.microsoft.com/office/drawing/2014/main" id="{9C84FB5B-3548-57AF-0BDE-3735ECDD4D50}"/>
               </a:ext>
             </a:extLst>
           </p:cNvPr>
@@ -6411,64 +7765,128 @@
             <p:ph type="title"/>
           </p:nvPr>
         </p:nvSpPr>
-        <p:spPr/>
-        <p:txBody>
-          <a:bodyPr/>
-          <a:lstStyle/>
-          <a:p>
-            <a:r>
-              <a:rPr lang="en-US" sz="4400" dirty="0"/>
-              <a:t>Int1 </a:t>
-            </a:r>
-            <a:r>
-              <a:rPr lang="en-US" sz="4400" dirty="0" err="1"/>
-              <a:t>mp</a:t>
-            </a:r>
-            <a:r>
-              <a:rPr lang="en-US" sz="4400" dirty="0"/>
-              <a:t> </a:t>
-            </a:r>
-            <a:r>
-              <a:rPr lang="en-US" sz="4400" dirty="0" err="1"/>
-              <a:t>glm</a:t>
-            </a:r>
-            <a:r>
-              <a:rPr lang="en-US" sz="4400" dirty="0"/>
-              <a:t> full model</a:t>
-            </a:r>
-            <a:endParaRPr lang="en-US" dirty="0"/>
-          </a:p>
-        </p:txBody>
-      </p:sp>
-      <p:sp>
-        <p:nvSpPr>
-          <p:cNvPr id="3" name="Content Placeholder 2">
-            <a:extLst>
-              <a:ext uri="{FF2B5EF4-FFF2-40B4-BE49-F238E27FC236}">
-                <a16:creationId xmlns:a16="http://schemas.microsoft.com/office/drawing/2014/main" id="{86A7E102-9688-5D5C-4B3D-CD56DAAE7A4F}"/>
-              </a:ext>
-            </a:extLst>
-          </p:cNvPr>
-          <p:cNvSpPr>
-            <a:spLocks noGrp="1"/>
-          </p:cNvSpPr>
-          <p:nvPr>
-            <p:ph idx="1"/>
-          </p:nvPr>
-        </p:nvSpPr>
-        <p:spPr/>
-        <p:txBody>
-          <a:bodyPr/>
-          <a:lstStyle/>
-          <a:p>
-            <a:endParaRPr lang="en-US"/>
+        <p:spPr>
+          <a:xfrm>
+            <a:off x="1" y="0"/>
+            <a:ext cx="2535382" cy="1603513"/>
+          </a:xfrm>
+        </p:spPr>
+        <p:txBody>
+          <a:bodyPr>
+            <a:normAutofit/>
+          </a:bodyPr>
+          <a:lstStyle/>
+          <a:p>
+            <a:r>
+              <a:rPr lang="en-US" sz="2000" dirty="0"/>
+              <a:t>intI1 data transformation</a:t>
+            </a:r>
+          </a:p>
+        </p:txBody>
+      </p:sp>
+      <p:pic>
+        <p:nvPicPr>
+          <p:cNvPr id="4" name="Picture 3">
+            <a:extLst>
+              <a:ext uri="{FF2B5EF4-FFF2-40B4-BE49-F238E27FC236}">
+                <a16:creationId xmlns:a16="http://schemas.microsoft.com/office/drawing/2014/main" id="{9A16E570-3B19-BB27-044F-B6DDF2B8187A}"/>
+              </a:ext>
+            </a:extLst>
+          </p:cNvPr>
+          <p:cNvPicPr>
+            <a:picLocks noChangeAspect="1"/>
+          </p:cNvPicPr>
+          <p:nvPr/>
+        </p:nvPicPr>
+        <p:blipFill>
+          <a:blip r:embed="rId2"/>
+          <a:stretch>
+            <a:fillRect/>
+          </a:stretch>
+        </p:blipFill>
+        <p:spPr>
+          <a:xfrm>
+            <a:off x="3031670" y="838200"/>
+            <a:ext cx="8805214" cy="5730980"/>
+          </a:xfrm>
+          <a:prstGeom prst="rect">
+            <a:avLst/>
+          </a:prstGeom>
+        </p:spPr>
+      </p:pic>
+      <p:sp>
+        <p:nvSpPr>
+          <p:cNvPr id="3" name="Title 1">
+            <a:extLst>
+              <a:ext uri="{FF2B5EF4-FFF2-40B4-BE49-F238E27FC236}">
+                <a16:creationId xmlns:a16="http://schemas.microsoft.com/office/drawing/2014/main" id="{4A7A38BE-5360-87AE-A449-E5E06A3EEFB6}"/>
+              </a:ext>
+            </a:extLst>
+          </p:cNvPr>
+          <p:cNvSpPr txBox="1">
+            <a:spLocks/>
+          </p:cNvSpPr>
+          <p:nvPr/>
+        </p:nvSpPr>
+        <p:spPr>
+          <a:xfrm>
+            <a:off x="106878" y="1524174"/>
+            <a:ext cx="3143634" cy="3362521"/>
+          </a:xfrm>
+          <a:prstGeom prst="rect">
+            <a:avLst/>
+          </a:prstGeom>
+        </p:spPr>
+        <p:txBody>
+          <a:bodyPr vert="horz" lIns="91440" tIns="45720" rIns="91440" bIns="45720" rtlCol="0" anchor="ctr">
+            <a:noAutofit/>
+          </a:bodyPr>
+          <a:lstStyle>
+            <a:lvl1pPr algn="l" defTabSz="914400" rtl="0" eaLnBrk="1" latinLnBrk="0" hangingPunct="1">
+              <a:lnSpc>
+                <a:spcPct val="90000"/>
+              </a:lnSpc>
+              <a:spcBef>
+                <a:spcPct val="0"/>
+              </a:spcBef>
+              <a:buNone/>
+              <a:defRPr sz="4400" kern="1200">
+                <a:solidFill>
+                  <a:schemeClr val="tx1"/>
+                </a:solidFill>
+                <a:latin typeface="+mj-lt"/>
+                <a:ea typeface="+mj-ea"/>
+                <a:cs typeface="+mj-cs"/>
+              </a:defRPr>
+            </a:lvl1pPr>
+          </a:lstStyle>
+          <a:p>
+            <a:r>
+              <a:rPr lang="en-US" sz="2000" dirty="0"/>
+              <a:t>-Shapiro-Wilks normality statistic (W), range from 0 to 1, with 1 being perfectly normal</a:t>
+            </a:r>
+          </a:p>
+          <a:p>
+            <a:r>
+              <a:rPr lang="en-US" sz="2000" dirty="0"/>
+              <a:t>-All transformations fail normality at p&lt;0.05</a:t>
+            </a:r>
+          </a:p>
+          <a:p>
+            <a:r>
+              <a:rPr lang="en-US" sz="2000" dirty="0"/>
+              <a:t>-The log transformations do a bit better inducing normality, but neither do a great job</a:t>
+            </a:r>
+          </a:p>
+          <a:p>
+            <a:endParaRPr lang="en-US" sz="2000" dirty="0"/>
           </a:p>
         </p:txBody>
       </p:sp>
     </p:spTree>
     <p:extLst>
       <p:ext uri="{BB962C8B-B14F-4D97-AF65-F5344CB8AC3E}">
-        <p14:creationId xmlns:p14="http://schemas.microsoft.com/office/powerpoint/2010/main" val="110958210"/>
+        <p14:creationId xmlns:p14="http://schemas.microsoft.com/office/powerpoint/2010/main" val="450193634"/>
       </p:ext>
     </p:extLst>
   </p:cSld>
@@ -6500,7 +7918,7 @@
           <p:cNvPr id="2" name="Title 1">
             <a:extLst>
               <a:ext uri="{FF2B5EF4-FFF2-40B4-BE49-F238E27FC236}">
-                <a16:creationId xmlns:a16="http://schemas.microsoft.com/office/drawing/2014/main" id="{3E4A6795-1948-05E4-E562-AFED99BDA8EB}"/>
+                <a16:creationId xmlns:a16="http://schemas.microsoft.com/office/drawing/2014/main" id="{21F618E0-6833-2382-088A-8454E0D4DCAD}"/>
               </a:ext>
             </a:extLst>
           </p:cNvPr>
@@ -6513,44 +7931,44 @@
         </p:nvSpPr>
         <p:spPr>
           <a:xfrm>
-            <a:off x="165093" y="365124"/>
-            <a:ext cx="2802278" cy="3063875"/>
-          </a:xfrm>
-        </p:spPr>
-        <p:txBody>
-          <a:bodyPr>
-            <a:normAutofit/>
-          </a:bodyPr>
-          <a:lstStyle/>
-          <a:p>
-            <a:r>
-              <a:rPr lang="en-US" sz="3200" dirty="0"/>
+            <a:off x="773545" y="134216"/>
+            <a:ext cx="10515600" cy="1325563"/>
+          </a:xfrm>
+        </p:spPr>
+        <p:txBody>
+          <a:bodyPr/>
+          <a:lstStyle/>
+          <a:p>
+            <a:r>
+              <a:rPr lang="en-US" sz="4400" dirty="0"/>
               <a:t>Int1 </a:t>
             </a:r>
             <a:r>
-              <a:rPr lang="en-US" sz="3200" dirty="0" err="1"/>
+              <a:rPr lang="en-US" sz="4400" dirty="0" err="1"/>
               <a:t>mp</a:t>
             </a:r>
             <a:r>
-              <a:rPr lang="en-US" sz="3200" dirty="0"/>
-              <a:t> step</a:t>
-            </a:r>
-            <a:br>
-              <a:rPr lang="en-US" sz="3200" dirty="0"/>
-            </a:br>
-            <a:r>
-              <a:rPr lang="en-US" sz="3200" dirty="0"/>
-              <a:t>- only time kept, linear or quadratic</a:t>
-            </a:r>
+              <a:rPr lang="en-US" sz="4400" dirty="0"/>
+              <a:t> </a:t>
+            </a:r>
+            <a:r>
+              <a:rPr lang="en-US" sz="4400" dirty="0" err="1"/>
+              <a:t>glm</a:t>
+            </a:r>
+            <a:r>
+              <a:rPr lang="en-US" sz="4400" dirty="0"/>
+              <a:t> full model</a:t>
+            </a:r>
+            <a:endParaRPr lang="en-US" dirty="0"/>
           </a:p>
         </p:txBody>
       </p:sp>
       <p:pic>
         <p:nvPicPr>
-          <p:cNvPr id="4" name="Picture 3">
-            <a:extLst>
-              <a:ext uri="{FF2B5EF4-FFF2-40B4-BE49-F238E27FC236}">
-                <a16:creationId xmlns:a16="http://schemas.microsoft.com/office/drawing/2014/main" id="{50525DB7-EF23-5B9F-21B1-0D11D081758C}"/>
+          <p:cNvPr id="5" name="Picture 4">
+            <a:extLst>
+              <a:ext uri="{FF2B5EF4-FFF2-40B4-BE49-F238E27FC236}">
+                <a16:creationId xmlns:a16="http://schemas.microsoft.com/office/drawing/2014/main" id="{32B5C9F0-C908-C56D-712B-8B60CE87F1C1}"/>
               </a:ext>
             </a:extLst>
           </p:cNvPr>
@@ -6567,18 +7985,71 @@
         </p:blipFill>
         <p:spPr>
           <a:xfrm>
-            <a:off x="2628094" y="930416"/>
-            <a:ext cx="9563906" cy="4708384"/>
+            <a:off x="5331681" y="1554691"/>
+            <a:ext cx="5672572" cy="4312887"/>
           </a:xfrm>
           <a:prstGeom prst="rect">
             <a:avLst/>
           </a:prstGeom>
         </p:spPr>
       </p:pic>
+      <p:sp>
+        <p:nvSpPr>
+          <p:cNvPr id="8" name="Content Placeholder 2">
+            <a:extLst>
+              <a:ext uri="{FF2B5EF4-FFF2-40B4-BE49-F238E27FC236}">
+                <a16:creationId xmlns:a16="http://schemas.microsoft.com/office/drawing/2014/main" id="{8A5F503F-3869-0BDE-1C8E-ED12EDDD99AE}"/>
+              </a:ext>
+            </a:extLst>
+          </p:cNvPr>
+          <p:cNvSpPr>
+            <a:spLocks noGrp="1"/>
+          </p:cNvSpPr>
+          <p:nvPr>
+            <p:ph idx="1"/>
+          </p:nvPr>
+        </p:nvSpPr>
+        <p:spPr>
+          <a:xfrm>
+            <a:off x="157851" y="1554691"/>
+            <a:ext cx="4439549" cy="4351338"/>
+          </a:xfrm>
+        </p:spPr>
+        <p:txBody>
+          <a:bodyPr/>
+          <a:lstStyle/>
+          <a:p>
+            <a:r>
+              <a:rPr lang="en-US" dirty="0"/>
+              <a:t>Mixed on plastic type again, </a:t>
+            </a:r>
+            <a:r>
+              <a:rPr lang="en-US" dirty="0" err="1"/>
+              <a:t>ldpe</a:t>
+            </a:r>
+            <a:r>
+              <a:rPr lang="en-US" dirty="0"/>
+              <a:t> is significant</a:t>
+            </a:r>
+          </a:p>
+          <a:p>
+            <a:r>
+              <a:rPr lang="en-US" dirty="0"/>
+              <a:t>Treatment a small (and insignificant) positive bump for amended water</a:t>
+            </a:r>
+          </a:p>
+          <a:p>
+            <a:r>
+              <a:rPr lang="en-US" dirty="0"/>
+              <a:t>Linear with time most significant (again)</a:t>
+            </a:r>
+          </a:p>
+        </p:txBody>
+      </p:sp>
     </p:spTree>
     <p:extLst>
       <p:ext uri="{BB962C8B-B14F-4D97-AF65-F5344CB8AC3E}">
-        <p14:creationId xmlns:p14="http://schemas.microsoft.com/office/powerpoint/2010/main" val="746536640"/>
+        <p14:creationId xmlns:p14="http://schemas.microsoft.com/office/powerpoint/2010/main" val="110958210"/>
       </p:ext>
     </p:extLst>
   </p:cSld>

</xml_diff>